<commit_message>
Modified system-model to match overleaf
</commit_message>
<xml_diff>
--- a/system-model.pptx
+++ b/system-model.pptx
@@ -270,7 +270,7 @@
           <a:p>
             <a:fld id="{0F4F3A10-1BBF-094E-8EF1-BA4BA81AAF48}" type="datetimeFigureOut">
               <a:rPr lang="en-US" smtClean="0"/>
-              <a:t>6/26/25</a:t>
+              <a:t>7/16/25</a:t>
             </a:fld>
             <a:endParaRPr lang="en-US"/>
           </a:p>
@@ -468,7 +468,7 @@
           <a:p>
             <a:fld id="{0F4F3A10-1BBF-094E-8EF1-BA4BA81AAF48}" type="datetimeFigureOut">
               <a:rPr lang="en-US" smtClean="0"/>
-              <a:t>6/26/25</a:t>
+              <a:t>7/16/25</a:t>
             </a:fld>
             <a:endParaRPr lang="en-US"/>
           </a:p>
@@ -676,7 +676,7 @@
           <a:p>
             <a:fld id="{0F4F3A10-1BBF-094E-8EF1-BA4BA81AAF48}" type="datetimeFigureOut">
               <a:rPr lang="en-US" smtClean="0"/>
-              <a:t>6/26/25</a:t>
+              <a:t>7/16/25</a:t>
             </a:fld>
             <a:endParaRPr lang="en-US"/>
           </a:p>
@@ -874,7 +874,7 @@
           <a:p>
             <a:fld id="{0F4F3A10-1BBF-094E-8EF1-BA4BA81AAF48}" type="datetimeFigureOut">
               <a:rPr lang="en-US" smtClean="0"/>
-              <a:t>6/26/25</a:t>
+              <a:t>7/16/25</a:t>
             </a:fld>
             <a:endParaRPr lang="en-US"/>
           </a:p>
@@ -1149,7 +1149,7 @@
           <a:p>
             <a:fld id="{0F4F3A10-1BBF-094E-8EF1-BA4BA81AAF48}" type="datetimeFigureOut">
               <a:rPr lang="en-US" smtClean="0"/>
-              <a:t>6/26/25</a:t>
+              <a:t>7/16/25</a:t>
             </a:fld>
             <a:endParaRPr lang="en-US"/>
           </a:p>
@@ -1414,7 +1414,7 @@
           <a:p>
             <a:fld id="{0F4F3A10-1BBF-094E-8EF1-BA4BA81AAF48}" type="datetimeFigureOut">
               <a:rPr lang="en-US" smtClean="0"/>
-              <a:t>6/26/25</a:t>
+              <a:t>7/16/25</a:t>
             </a:fld>
             <a:endParaRPr lang="en-US"/>
           </a:p>
@@ -1826,7 +1826,7 @@
           <a:p>
             <a:fld id="{0F4F3A10-1BBF-094E-8EF1-BA4BA81AAF48}" type="datetimeFigureOut">
               <a:rPr lang="en-US" smtClean="0"/>
-              <a:t>6/26/25</a:t>
+              <a:t>7/16/25</a:t>
             </a:fld>
             <a:endParaRPr lang="en-US"/>
           </a:p>
@@ -1967,7 +1967,7 @@
           <a:p>
             <a:fld id="{0F4F3A10-1BBF-094E-8EF1-BA4BA81AAF48}" type="datetimeFigureOut">
               <a:rPr lang="en-US" smtClean="0"/>
-              <a:t>6/26/25</a:t>
+              <a:t>7/16/25</a:t>
             </a:fld>
             <a:endParaRPr lang="en-US"/>
           </a:p>
@@ -2080,7 +2080,7 @@
           <a:p>
             <a:fld id="{0F4F3A10-1BBF-094E-8EF1-BA4BA81AAF48}" type="datetimeFigureOut">
               <a:rPr lang="en-US" smtClean="0"/>
-              <a:t>6/26/25</a:t>
+              <a:t>7/16/25</a:t>
             </a:fld>
             <a:endParaRPr lang="en-US"/>
           </a:p>
@@ -2391,7 +2391,7 @@
           <a:p>
             <a:fld id="{0F4F3A10-1BBF-094E-8EF1-BA4BA81AAF48}" type="datetimeFigureOut">
               <a:rPr lang="en-US" smtClean="0"/>
-              <a:t>6/26/25</a:t>
+              <a:t>7/16/25</a:t>
             </a:fld>
             <a:endParaRPr lang="en-US"/>
           </a:p>
@@ -2679,7 +2679,7 @@
           <a:p>
             <a:fld id="{0F4F3A10-1BBF-094E-8EF1-BA4BA81AAF48}" type="datetimeFigureOut">
               <a:rPr lang="en-US" smtClean="0"/>
-              <a:t>6/26/25</a:t>
+              <a:t>7/16/25</a:t>
             </a:fld>
             <a:endParaRPr lang="en-US"/>
           </a:p>
@@ -2920,7 +2920,7 @@
           <a:p>
             <a:fld id="{0F4F3A10-1BBF-094E-8EF1-BA4BA81AAF48}" type="datetimeFigureOut">
               <a:rPr lang="en-US" smtClean="0"/>
-              <a:t>6/26/25</a:t>
+              <a:t>7/16/25</a:t>
             </a:fld>
             <a:endParaRPr lang="en-US"/>
           </a:p>
@@ -4060,7 +4060,7 @@
                 <a:latin typeface="Times New Roman" panose="02020603050405020304" pitchFamily="18" charset="0"/>
                 <a:cs typeface="Times New Roman" panose="02020603050405020304" pitchFamily="18" charset="0"/>
               </a:rPr>
-              <a:t>a</a:t>
+              <a:t>A</a:t>
             </a:r>
             <a:r>
               <a:rPr lang="en-US" dirty="0">
@@ -4112,7 +4112,7 @@
                 <a:latin typeface="Times New Roman" panose="02020603050405020304" pitchFamily="18" charset="0"/>
                 <a:cs typeface="Times New Roman" panose="02020603050405020304" pitchFamily="18" charset="0"/>
               </a:rPr>
-              <a:t>b</a:t>
+              <a:t>B</a:t>
             </a:r>
             <a:r>
               <a:rPr lang="en-US" dirty="0">
@@ -4444,9 +4444,10 @@
               <a:t>Base station (</a:t>
             </a:r>
             <a:r>
-              <a:rPr lang="en-US" i="1" dirty="0">
-                <a:latin typeface="Times New Roman" panose="02020603050405020304" pitchFamily="18" charset="0"/>
-                <a:cs typeface="Times New Roman" panose="02020603050405020304" pitchFamily="18" charset="0"/>
+              <a:rPr lang="en-US" dirty="0">
+                <a:latin typeface="CMU SANS SERIF" panose="02000603000000000000" pitchFamily="2" charset="0"/>
+                <a:ea typeface="CMU SANS SERIF" panose="02000603000000000000" pitchFamily="2" charset="0"/>
+                <a:cs typeface="CMU SANS SERIF" panose="02000603000000000000" pitchFamily="2" charset="0"/>
               </a:rPr>
               <a:t>B</a:t>
             </a:r>
@@ -4496,9 +4497,10 @@
               <a:t>UAV (</a:t>
             </a:r>
             <a:r>
-              <a:rPr lang="en-US" i="1" dirty="0">
-                <a:latin typeface="Times New Roman" panose="02020603050405020304" pitchFamily="18" charset="0"/>
-                <a:cs typeface="Times New Roman" panose="02020603050405020304" pitchFamily="18" charset="0"/>
+              <a:rPr lang="en-US" dirty="0">
+                <a:latin typeface="CMU SANS SERIF" panose="02000603000000000000" pitchFamily="2" charset="0"/>
+                <a:ea typeface="CMU SANS SERIF" panose="02000603000000000000" pitchFamily="2" charset="0"/>
+                <a:cs typeface="CMU SANS SERIF" panose="02000603000000000000" pitchFamily="2" charset="0"/>
               </a:rPr>
               <a:t>U</a:t>
             </a:r>
@@ -4548,9 +4550,10 @@
               <a:t>Ground user (</a:t>
             </a:r>
             <a:r>
-              <a:rPr lang="en-US" i="1" dirty="0">
-                <a:latin typeface="Times New Roman" panose="02020603050405020304" pitchFamily="18" charset="0"/>
-                <a:cs typeface="Times New Roman" panose="02020603050405020304" pitchFamily="18" charset="0"/>
+              <a:rPr lang="en-US" dirty="0">
+                <a:latin typeface="CMU SANS SERIF" panose="02000603000000000000" pitchFamily="2" charset="0"/>
+                <a:ea typeface="CMU SANS SERIF" panose="02000603000000000000" pitchFamily="2" charset="0"/>
+                <a:cs typeface="CMU SANS SERIF" panose="02000603000000000000" pitchFamily="2" charset="0"/>
               </a:rPr>
               <a:t>G</a:t>
             </a:r>

</xml_diff>

<commit_message>
Modified system model to match new notation
</commit_message>
<xml_diff>
--- a/system-model.pptx
+++ b/system-model.pptx
@@ -270,7 +270,7 @@
           <a:p>
             <a:fld id="{0F4F3A10-1BBF-094E-8EF1-BA4BA81AAF48}" type="datetimeFigureOut">
               <a:rPr lang="en-US" smtClean="0"/>
-              <a:t>7/21/25</a:t>
+              <a:t>7/25/25</a:t>
             </a:fld>
             <a:endParaRPr lang="en-US"/>
           </a:p>
@@ -468,7 +468,7 @@
           <a:p>
             <a:fld id="{0F4F3A10-1BBF-094E-8EF1-BA4BA81AAF48}" type="datetimeFigureOut">
               <a:rPr lang="en-US" smtClean="0"/>
-              <a:t>7/21/25</a:t>
+              <a:t>7/25/25</a:t>
             </a:fld>
             <a:endParaRPr lang="en-US"/>
           </a:p>
@@ -676,7 +676,7 @@
           <a:p>
             <a:fld id="{0F4F3A10-1BBF-094E-8EF1-BA4BA81AAF48}" type="datetimeFigureOut">
               <a:rPr lang="en-US" smtClean="0"/>
-              <a:t>7/21/25</a:t>
+              <a:t>7/25/25</a:t>
             </a:fld>
             <a:endParaRPr lang="en-US"/>
           </a:p>
@@ -874,7 +874,7 @@
           <a:p>
             <a:fld id="{0F4F3A10-1BBF-094E-8EF1-BA4BA81AAF48}" type="datetimeFigureOut">
               <a:rPr lang="en-US" smtClean="0"/>
-              <a:t>7/21/25</a:t>
+              <a:t>7/25/25</a:t>
             </a:fld>
             <a:endParaRPr lang="en-US"/>
           </a:p>
@@ -1149,7 +1149,7 @@
           <a:p>
             <a:fld id="{0F4F3A10-1BBF-094E-8EF1-BA4BA81AAF48}" type="datetimeFigureOut">
               <a:rPr lang="en-US" smtClean="0"/>
-              <a:t>7/21/25</a:t>
+              <a:t>7/25/25</a:t>
             </a:fld>
             <a:endParaRPr lang="en-US"/>
           </a:p>
@@ -1414,7 +1414,7 @@
           <a:p>
             <a:fld id="{0F4F3A10-1BBF-094E-8EF1-BA4BA81AAF48}" type="datetimeFigureOut">
               <a:rPr lang="en-US" smtClean="0"/>
-              <a:t>7/21/25</a:t>
+              <a:t>7/25/25</a:t>
             </a:fld>
             <a:endParaRPr lang="en-US"/>
           </a:p>
@@ -1826,7 +1826,7 @@
           <a:p>
             <a:fld id="{0F4F3A10-1BBF-094E-8EF1-BA4BA81AAF48}" type="datetimeFigureOut">
               <a:rPr lang="en-US" smtClean="0"/>
-              <a:t>7/21/25</a:t>
+              <a:t>7/25/25</a:t>
             </a:fld>
             <a:endParaRPr lang="en-US"/>
           </a:p>
@@ -1967,7 +1967,7 @@
           <a:p>
             <a:fld id="{0F4F3A10-1BBF-094E-8EF1-BA4BA81AAF48}" type="datetimeFigureOut">
               <a:rPr lang="en-US" smtClean="0"/>
-              <a:t>7/21/25</a:t>
+              <a:t>7/25/25</a:t>
             </a:fld>
             <a:endParaRPr lang="en-US"/>
           </a:p>
@@ -2080,7 +2080,7 @@
           <a:p>
             <a:fld id="{0F4F3A10-1BBF-094E-8EF1-BA4BA81AAF48}" type="datetimeFigureOut">
               <a:rPr lang="en-US" smtClean="0"/>
-              <a:t>7/21/25</a:t>
+              <a:t>7/25/25</a:t>
             </a:fld>
             <a:endParaRPr lang="en-US"/>
           </a:p>
@@ -2391,7 +2391,7 @@
           <a:p>
             <a:fld id="{0F4F3A10-1BBF-094E-8EF1-BA4BA81AAF48}" type="datetimeFigureOut">
               <a:rPr lang="en-US" smtClean="0"/>
-              <a:t>7/21/25</a:t>
+              <a:t>7/25/25</a:t>
             </a:fld>
             <a:endParaRPr lang="en-US"/>
           </a:p>
@@ -2679,7 +2679,7 @@
           <a:p>
             <a:fld id="{0F4F3A10-1BBF-094E-8EF1-BA4BA81AAF48}" type="datetimeFigureOut">
               <a:rPr lang="en-US" smtClean="0"/>
-              <a:t>7/21/25</a:t>
+              <a:t>7/25/25</a:t>
             </a:fld>
             <a:endParaRPr lang="en-US"/>
           </a:p>
@@ -2920,7 +2920,7 @@
           <a:p>
             <a:fld id="{0F4F3A10-1BBF-094E-8EF1-BA4BA81AAF48}" type="datetimeFigureOut">
               <a:rPr lang="en-US" smtClean="0"/>
-              <a:t>7/21/25</a:t>
+              <a:t>7/25/25</a:t>
             </a:fld>
             <a:endParaRPr lang="en-US"/>
           </a:p>
@@ -4088,8 +4088,8 @@
         </p:nvSpPr>
         <p:spPr>
           <a:xfrm>
-            <a:off x="10617220" y="4464574"/>
-            <a:ext cx="920023" cy="369332"/>
+            <a:off x="10495077" y="4473615"/>
+            <a:ext cx="1062321" cy="369332"/>
           </a:xfrm>
           <a:prstGeom prst="rect">
             <a:avLst/>
@@ -4110,11 +4110,18 @@
               <a:t>(</a:t>
             </a:r>
             <a:r>
-              <a:rPr lang="en-US" i="1" dirty="0">
+              <a:rPr lang="en-US" i="1" dirty="0" err="1">
                 <a:latin typeface="Times New Roman" panose="02020603050405020304" pitchFamily="18" charset="0"/>
                 <a:cs typeface="Times New Roman" panose="02020603050405020304" pitchFamily="18" charset="0"/>
               </a:rPr>
               <a:t>x</a:t>
+            </a:r>
+            <a:r>
+              <a:rPr lang="en-US" i="1" baseline="-25000" dirty="0" err="1">
+                <a:latin typeface="Times New Roman" panose="02020603050405020304" pitchFamily="18" charset="0"/>
+                <a:cs typeface="Times New Roman" panose="02020603050405020304" pitchFamily="18" charset="0"/>
+              </a:rPr>
+              <a:t>k</a:t>
             </a:r>
             <a:r>
               <a:rPr lang="en-US" dirty="0">
@@ -4124,11 +4131,18 @@
               <a:t>, 0, </a:t>
             </a:r>
             <a:r>
-              <a:rPr lang="en-US" i="1" dirty="0">
+              <a:rPr lang="en-US" i="1" dirty="0" err="1">
                 <a:latin typeface="Times New Roman" panose="02020603050405020304" pitchFamily="18" charset="0"/>
                 <a:cs typeface="Times New Roman" panose="02020603050405020304" pitchFamily="18" charset="0"/>
               </a:rPr>
               <a:t>z</a:t>
+            </a:r>
+            <a:r>
+              <a:rPr lang="en-US" i="1" baseline="-25000" dirty="0" err="1">
+                <a:latin typeface="Times New Roman" panose="02020603050405020304" pitchFamily="18" charset="0"/>
+                <a:cs typeface="Times New Roman" panose="02020603050405020304" pitchFamily="18" charset="0"/>
+              </a:rPr>
+              <a:t>k</a:t>
             </a:r>
             <a:r>
               <a:rPr lang="en-US" dirty="0">
@@ -4154,8 +4168,8 @@
         </p:nvSpPr>
         <p:spPr>
           <a:xfrm rot="16200000">
-            <a:off x="6701276" y="1715150"/>
-            <a:ext cx="185153" cy="1374290"/>
+            <a:off x="6725154" y="1636114"/>
+            <a:ext cx="128681" cy="1374290"/>
           </a:xfrm>
           <a:prstGeom prst="leftBrace">
             <a:avLst/>
@@ -4203,8 +4217,8 @@
         </p:nvSpPr>
         <p:spPr>
           <a:xfrm>
-            <a:off x="6670570" y="2402295"/>
-            <a:ext cx="246563" cy="338554"/>
+            <a:off x="6635846" y="2309698"/>
+            <a:ext cx="413136" cy="338554"/>
           </a:xfrm>
           <a:prstGeom prst="rect">
             <a:avLst/>
@@ -4226,6 +4240,16 @@
                 <a:cs typeface="Times New Roman" panose="02020603050405020304" pitchFamily="18" charset="0"/>
               </a:rPr>
               <a:t>r</a:t>
+            </a:r>
+            <a:r>
+              <a:rPr lang="en-US" sz="1600" i="1" baseline="-25000" dirty="0">
+                <a:solidFill>
+                  <a:srgbClr val="0070C0"/>
+                </a:solidFill>
+                <a:latin typeface="Times New Roman" panose="02020603050405020304" pitchFamily="18" charset="0"/>
+                <a:cs typeface="Times New Roman" panose="02020603050405020304" pitchFamily="18" charset="0"/>
+              </a:rPr>
+              <a:t>Q</a:t>
             </a:r>
           </a:p>
         </p:txBody>
@@ -4347,10 +4371,10 @@
               <a:t>Base station (</a:t>
             </a:r>
             <a:r>
-              <a:rPr lang="en-US" dirty="0">
-                <a:latin typeface="CMU SANS SERIF" panose="02000603000000000000" pitchFamily="2" charset="0"/>
+              <a:rPr lang="en-US" i="1" dirty="0">
+                <a:latin typeface="Times New Roman" panose="02020603050405020304" pitchFamily="18" charset="0"/>
                 <a:ea typeface="CMU SANS SERIF" panose="02000603000000000000" pitchFamily="2" charset="0"/>
-                <a:cs typeface="CMU SANS SERIF" panose="02000603000000000000" pitchFamily="2" charset="0"/>
+                <a:cs typeface="Times New Roman" panose="02020603050405020304" pitchFamily="18" charset="0"/>
               </a:rPr>
               <a:t>B</a:t>
             </a:r>
@@ -4379,7 +4403,7 @@
         <p:spPr>
           <a:xfrm>
             <a:off x="5690501" y="1054654"/>
-            <a:ext cx="1029193" cy="369332"/>
+            <a:ext cx="1032399" cy="369332"/>
           </a:xfrm>
           <a:prstGeom prst="rect">
             <a:avLst/>
@@ -4400,12 +4424,12 @@
               <a:t>UAV (</a:t>
             </a:r>
             <a:r>
-              <a:rPr lang="en-US" dirty="0">
-                <a:latin typeface="CMU SANS SERIF" panose="02000603000000000000" pitchFamily="2" charset="0"/>
+              <a:rPr lang="en-US" i="1" dirty="0">
+                <a:latin typeface="Times New Roman" panose="02020603050405020304" pitchFamily="18" charset="0"/>
                 <a:ea typeface="CMU SANS SERIF" panose="02000603000000000000" pitchFamily="2" charset="0"/>
-                <a:cs typeface="CMU SANS SERIF" panose="02000603000000000000" pitchFamily="2" charset="0"/>
+                <a:cs typeface="Times New Roman" panose="02020603050405020304" pitchFamily="18" charset="0"/>
               </a:rPr>
-              <a:t>U</a:t>
+              <a:t>Q</a:t>
             </a:r>
             <a:r>
               <a:rPr lang="en-US" dirty="0">
@@ -4431,8 +4455,8 @@
         </p:nvSpPr>
         <p:spPr>
           <a:xfrm>
-            <a:off x="10144394" y="4165039"/>
-            <a:ext cx="1659429" cy="369332"/>
+            <a:off x="10338566" y="4165039"/>
+            <a:ext cx="1332416" cy="369332"/>
           </a:xfrm>
           <a:prstGeom prst="rect">
             <a:avLst/>
@@ -4450,23 +4474,186 @@
                 <a:latin typeface="Times New Roman" panose="02020603050405020304" pitchFamily="18" charset="0"/>
                 <a:cs typeface="Times New Roman" panose="02020603050405020304" pitchFamily="18" charset="0"/>
               </a:rPr>
-              <a:t>Ground user (</a:t>
-            </a:r>
-            <a:r>
-              <a:rPr lang="en-US" i="1" dirty="0">
-                <a:latin typeface="Times New Roman" panose="02020603050405020304" pitchFamily="18" charset="0"/>
-                <a:ea typeface="CMU SANS SERIF" panose="02000603000000000000" pitchFamily="2" charset="0"/>
-                <a:cs typeface="Times New Roman" panose="02020603050405020304" pitchFamily="18" charset="0"/>
-              </a:rPr>
-              <a:t>g</a:t>
-            </a:r>
-            <a:r>
-              <a:rPr lang="en-US" dirty="0">
+              <a:t>Ground user</a:t>
+            </a:r>
+          </a:p>
+        </p:txBody>
+      </p:sp>
+      <p:cxnSp>
+        <p:nvCxnSpPr>
+          <p:cNvPr id="3" name="Straight Arrow Connector 2">
+            <a:extLst>
+              <a:ext uri="{FF2B5EF4-FFF2-40B4-BE49-F238E27FC236}">
+                <a16:creationId xmlns:a16="http://schemas.microsoft.com/office/drawing/2014/main" id="{5340EA39-B85E-9F34-0B98-410003FCBBFD}"/>
+              </a:ext>
+            </a:extLst>
+          </p:cNvPr>
+          <p:cNvCxnSpPr>
+            <a:cxnSpLocks/>
+          </p:cNvCxnSpPr>
+          <p:nvPr/>
+        </p:nvCxnSpPr>
+        <p:spPr>
+          <a:xfrm flipH="1" flipV="1">
+            <a:off x="7582479" y="2569771"/>
+            <a:ext cx="2445511" cy="1776886"/>
+          </a:xfrm>
+          <a:prstGeom prst="straightConnector1">
+            <a:avLst/>
+          </a:prstGeom>
+          <a:ln>
+            <a:solidFill>
+              <a:schemeClr val="accent1">
+                <a:alpha val="74892"/>
+              </a:schemeClr>
+            </a:solidFill>
+            <a:prstDash val="sysDash"/>
+            <a:tailEnd type="triangle"/>
+          </a:ln>
+        </p:spPr>
+        <p:style>
+          <a:lnRef idx="2">
+            <a:schemeClr val="accent1"/>
+          </a:lnRef>
+          <a:fillRef idx="0">
+            <a:schemeClr val="accent1"/>
+          </a:fillRef>
+          <a:effectRef idx="1">
+            <a:schemeClr val="accent1"/>
+          </a:effectRef>
+          <a:fontRef idx="minor">
+            <a:schemeClr val="tx1"/>
+          </a:fontRef>
+        </p:style>
+      </p:cxnSp>
+      <p:cxnSp>
+        <p:nvCxnSpPr>
+          <p:cNvPr id="7" name="Straight Arrow Connector 6">
+            <a:extLst>
+              <a:ext uri="{FF2B5EF4-FFF2-40B4-BE49-F238E27FC236}">
+                <a16:creationId xmlns:a16="http://schemas.microsoft.com/office/drawing/2014/main" id="{ECA30ED3-5C7C-5853-A684-D33A61515DEB}"/>
+              </a:ext>
+            </a:extLst>
+          </p:cNvPr>
+          <p:cNvCxnSpPr>
+            <a:cxnSpLocks/>
+          </p:cNvCxnSpPr>
+          <p:nvPr/>
+        </p:nvCxnSpPr>
+        <p:spPr>
+          <a:xfrm flipH="1">
+            <a:off x="1870195" y="2569771"/>
+            <a:ext cx="2441182" cy="1776886"/>
+          </a:xfrm>
+          <a:prstGeom prst="straightConnector1">
+            <a:avLst/>
+          </a:prstGeom>
+          <a:ln>
+            <a:solidFill>
+              <a:schemeClr val="accent1">
+                <a:alpha val="75000"/>
+              </a:schemeClr>
+            </a:solidFill>
+            <a:prstDash val="sysDash"/>
+            <a:tailEnd type="triangle"/>
+          </a:ln>
+        </p:spPr>
+        <p:style>
+          <a:lnRef idx="2">
+            <a:schemeClr val="accent1"/>
+          </a:lnRef>
+          <a:fillRef idx="0">
+            <a:schemeClr val="accent1"/>
+          </a:fillRef>
+          <a:effectRef idx="1">
+            <a:schemeClr val="accent1"/>
+          </a:effectRef>
+          <a:fontRef idx="minor">
+            <a:schemeClr val="tx1"/>
+          </a:fontRef>
+        </p:style>
+      </p:cxnSp>
+      <p:sp>
+        <p:nvSpPr>
+          <p:cNvPr id="20" name="TextBox 19">
+            <a:extLst>
+              <a:ext uri="{FF2B5EF4-FFF2-40B4-BE49-F238E27FC236}">
+                <a16:creationId xmlns:a16="http://schemas.microsoft.com/office/drawing/2014/main" id="{029C854E-B3B6-7B58-0B06-800B5879BC0D}"/>
+              </a:ext>
+            </a:extLst>
+          </p:cNvPr>
+          <p:cNvSpPr txBox="1"/>
+          <p:nvPr/>
+        </p:nvSpPr>
+        <p:spPr>
+          <a:xfrm>
+            <a:off x="8851751" y="3059668"/>
+            <a:ext cx="305499" cy="369332"/>
+          </a:xfrm>
+          <a:prstGeom prst="rect">
+            <a:avLst/>
+          </a:prstGeom>
+          <a:noFill/>
+        </p:spPr>
+        <p:txBody>
+          <a:bodyPr wrap="square" rtlCol="0">
+            <a:spAutoFit/>
+          </a:bodyPr>
+          <a:lstStyle/>
+          <a:p>
+            <a:r>
+              <a:rPr lang="el-GR" dirty="0">
                 <a:latin typeface="Times New Roman" panose="02020603050405020304" pitchFamily="18" charset="0"/>
                 <a:cs typeface="Times New Roman" panose="02020603050405020304" pitchFamily="18" charset="0"/>
               </a:rPr>
-              <a:t>)</a:t>
-            </a:r>
+              <a:t>μ</a:t>
+            </a:r>
+            <a:endParaRPr lang="en-US" dirty="0">
+              <a:latin typeface="Times New Roman" panose="02020603050405020304" pitchFamily="18" charset="0"/>
+              <a:cs typeface="Times New Roman" panose="02020603050405020304" pitchFamily="18" charset="0"/>
+            </a:endParaRPr>
+          </a:p>
+        </p:txBody>
+      </p:sp>
+      <p:sp>
+        <p:nvSpPr>
+          <p:cNvPr id="21" name="TextBox 20">
+            <a:extLst>
+              <a:ext uri="{FF2B5EF4-FFF2-40B4-BE49-F238E27FC236}">
+                <a16:creationId xmlns:a16="http://schemas.microsoft.com/office/drawing/2014/main" id="{130BA3C8-C5BB-8819-4527-AEDFCCF8C79E}"/>
+              </a:ext>
+            </a:extLst>
+          </p:cNvPr>
+          <p:cNvSpPr txBox="1"/>
+          <p:nvPr/>
+        </p:nvSpPr>
+        <p:spPr>
+          <a:xfrm>
+            <a:off x="2811684" y="3059668"/>
+            <a:ext cx="305499" cy="369332"/>
+          </a:xfrm>
+          <a:prstGeom prst="rect">
+            <a:avLst/>
+          </a:prstGeom>
+          <a:noFill/>
+        </p:spPr>
+        <p:txBody>
+          <a:bodyPr wrap="square" rtlCol="0">
+            <a:spAutoFit/>
+          </a:bodyPr>
+          <a:lstStyle/>
+          <a:p>
+            <a:r>
+              <a:rPr lang="el-GR" dirty="0">
+                <a:latin typeface="Times New Roman" panose="02020603050405020304" pitchFamily="18" charset="0"/>
+                <a:cs typeface="Times New Roman" panose="02020603050405020304" pitchFamily="18" charset="0"/>
+              </a:rPr>
+              <a:t>τ</a:t>
+            </a:r>
+            <a:endParaRPr lang="en-US" dirty="0">
+              <a:latin typeface="Times New Roman" panose="02020603050405020304" pitchFamily="18" charset="0"/>
+              <a:cs typeface="Times New Roman" panose="02020603050405020304" pitchFamily="18" charset="0"/>
+            </a:endParaRPr>
           </a:p>
         </p:txBody>
       </p:sp>

</xml_diff>

<commit_message>
Added slide with axes
</commit_message>
<xml_diff>
--- a/system-model.pptx
+++ b/system-model.pptx
@@ -4,8 +4,12 @@
   <p:sldMasterIdLst>
     <p:sldMasterId id="2147483648" r:id="rId1"/>
   </p:sldMasterIdLst>
+  <p:notesMasterIdLst>
+    <p:notesMasterId r:id="rId4"/>
+  </p:notesMasterIdLst>
   <p:sldIdLst>
     <p:sldId id="257" r:id="rId2"/>
+    <p:sldId id="258" r:id="rId3"/>
   </p:sldIdLst>
   <p:sldSz cx="12192000" cy="6858000"/>
   <p:notesSz cx="6858000" cy="9144000"/>
@@ -123,6 +127,439 @@
 </p:presentation>
 </file>
 
+<file path=ppt/notesMasters/notesMaster1.xml><?xml version="1.0" encoding="utf-8"?>
+<p:notesMaster xmlns:a="http://schemas.openxmlformats.org/drawingml/2006/main" xmlns:r="http://schemas.openxmlformats.org/officeDocument/2006/relationships" xmlns:p="http://schemas.openxmlformats.org/presentationml/2006/main">
+  <p:cSld>
+    <p:bg>
+      <p:bgRef idx="1001">
+        <a:schemeClr val="bg1"/>
+      </p:bgRef>
+    </p:bg>
+    <p:spTree>
+      <p:nvGrpSpPr>
+        <p:cNvPr id="1" name=""/>
+        <p:cNvGrpSpPr/>
+        <p:nvPr/>
+      </p:nvGrpSpPr>
+      <p:grpSpPr>
+        <a:xfrm>
+          <a:off x="0" y="0"/>
+          <a:ext cx="0" cy="0"/>
+          <a:chOff x="0" y="0"/>
+          <a:chExt cx="0" cy="0"/>
+        </a:xfrm>
+      </p:grpSpPr>
+      <p:sp>
+        <p:nvSpPr>
+          <p:cNvPr id="2" name="Header Placeholder 1"/>
+          <p:cNvSpPr>
+            <a:spLocks noGrp="1"/>
+          </p:cNvSpPr>
+          <p:nvPr>
+            <p:ph type="hdr" sz="quarter"/>
+          </p:nvPr>
+        </p:nvSpPr>
+        <p:spPr>
+          <a:xfrm>
+            <a:off x="0" y="0"/>
+            <a:ext cx="2971800" cy="458788"/>
+          </a:xfrm>
+          <a:prstGeom prst="rect">
+            <a:avLst/>
+          </a:prstGeom>
+        </p:spPr>
+        <p:txBody>
+          <a:bodyPr vert="horz" lIns="91440" tIns="45720" rIns="91440" bIns="45720" rtlCol="0"/>
+          <a:lstStyle>
+            <a:lvl1pPr algn="l">
+              <a:defRPr sz="1200"/>
+            </a:lvl1pPr>
+          </a:lstStyle>
+          <a:p>
+            <a:endParaRPr lang="en-US"/>
+          </a:p>
+        </p:txBody>
+      </p:sp>
+      <p:sp>
+        <p:nvSpPr>
+          <p:cNvPr id="3" name="Date Placeholder 2"/>
+          <p:cNvSpPr>
+            <a:spLocks noGrp="1"/>
+          </p:cNvSpPr>
+          <p:nvPr>
+            <p:ph type="dt" idx="1"/>
+          </p:nvPr>
+        </p:nvSpPr>
+        <p:spPr>
+          <a:xfrm>
+            <a:off x="3884613" y="0"/>
+            <a:ext cx="2971800" cy="458788"/>
+          </a:xfrm>
+          <a:prstGeom prst="rect">
+            <a:avLst/>
+          </a:prstGeom>
+        </p:spPr>
+        <p:txBody>
+          <a:bodyPr vert="horz" lIns="91440" tIns="45720" rIns="91440" bIns="45720" rtlCol="0"/>
+          <a:lstStyle>
+            <a:lvl1pPr algn="r">
+              <a:defRPr sz="1200"/>
+            </a:lvl1pPr>
+          </a:lstStyle>
+          <a:p>
+            <a:fld id="{F4C6F557-F08E-854B-AE48-783F54BBE294}" type="datetimeFigureOut">
+              <a:rPr lang="en-US" smtClean="0"/>
+              <a:t>7/29/25</a:t>
+            </a:fld>
+            <a:endParaRPr lang="en-US"/>
+          </a:p>
+        </p:txBody>
+      </p:sp>
+      <p:sp>
+        <p:nvSpPr>
+          <p:cNvPr id="4" name="Slide Image Placeholder 3"/>
+          <p:cNvSpPr>
+            <a:spLocks noGrp="1" noRot="1" noChangeAspect="1"/>
+          </p:cNvSpPr>
+          <p:nvPr>
+            <p:ph type="sldImg" idx="2"/>
+          </p:nvPr>
+        </p:nvSpPr>
+        <p:spPr>
+          <a:xfrm>
+            <a:off x="685800" y="1143000"/>
+            <a:ext cx="5486400" cy="3086100"/>
+          </a:xfrm>
+          <a:prstGeom prst="rect">
+            <a:avLst/>
+          </a:prstGeom>
+          <a:noFill/>
+          <a:ln w="12700">
+            <a:solidFill>
+              <a:prstClr val="black"/>
+            </a:solidFill>
+          </a:ln>
+        </p:spPr>
+        <p:txBody>
+          <a:bodyPr vert="horz" lIns="91440" tIns="45720" rIns="91440" bIns="45720" rtlCol="0" anchor="ctr"/>
+          <a:lstStyle/>
+          <a:p>
+            <a:endParaRPr lang="en-US"/>
+          </a:p>
+        </p:txBody>
+      </p:sp>
+      <p:sp>
+        <p:nvSpPr>
+          <p:cNvPr id="5" name="Notes Placeholder 4"/>
+          <p:cNvSpPr>
+            <a:spLocks noGrp="1"/>
+          </p:cNvSpPr>
+          <p:nvPr>
+            <p:ph type="body" sz="quarter" idx="3"/>
+          </p:nvPr>
+        </p:nvSpPr>
+        <p:spPr>
+          <a:xfrm>
+            <a:off x="685800" y="4400550"/>
+            <a:ext cx="5486400" cy="3600450"/>
+          </a:xfrm>
+          <a:prstGeom prst="rect">
+            <a:avLst/>
+          </a:prstGeom>
+        </p:spPr>
+        <p:txBody>
+          <a:bodyPr vert="horz" lIns="91440" tIns="45720" rIns="91440" bIns="45720" rtlCol="0"/>
+          <a:lstStyle/>
+          <a:p>
+            <a:pPr lvl="0"/>
+            <a:r>
+              <a:rPr lang="en-US"/>
+              <a:t>Click to edit Master text styles</a:t>
+            </a:r>
+          </a:p>
+          <a:p>
+            <a:pPr lvl="1"/>
+            <a:r>
+              <a:rPr lang="en-US"/>
+              <a:t>Second level</a:t>
+            </a:r>
+          </a:p>
+          <a:p>
+            <a:pPr lvl="2"/>
+            <a:r>
+              <a:rPr lang="en-US"/>
+              <a:t>Third level</a:t>
+            </a:r>
+          </a:p>
+          <a:p>
+            <a:pPr lvl="3"/>
+            <a:r>
+              <a:rPr lang="en-US"/>
+              <a:t>Fourth level</a:t>
+            </a:r>
+          </a:p>
+          <a:p>
+            <a:pPr lvl="4"/>
+            <a:r>
+              <a:rPr lang="en-US"/>
+              <a:t>Fifth level</a:t>
+            </a:r>
+          </a:p>
+        </p:txBody>
+      </p:sp>
+      <p:sp>
+        <p:nvSpPr>
+          <p:cNvPr id="6" name="Footer Placeholder 5"/>
+          <p:cNvSpPr>
+            <a:spLocks noGrp="1"/>
+          </p:cNvSpPr>
+          <p:nvPr>
+            <p:ph type="ftr" sz="quarter" idx="4"/>
+          </p:nvPr>
+        </p:nvSpPr>
+        <p:spPr>
+          <a:xfrm>
+            <a:off x="0" y="8685213"/>
+            <a:ext cx="2971800" cy="458787"/>
+          </a:xfrm>
+          <a:prstGeom prst="rect">
+            <a:avLst/>
+          </a:prstGeom>
+        </p:spPr>
+        <p:txBody>
+          <a:bodyPr vert="horz" lIns="91440" tIns="45720" rIns="91440" bIns="45720" rtlCol="0" anchor="b"/>
+          <a:lstStyle>
+            <a:lvl1pPr algn="l">
+              <a:defRPr sz="1200"/>
+            </a:lvl1pPr>
+          </a:lstStyle>
+          <a:p>
+            <a:endParaRPr lang="en-US"/>
+          </a:p>
+        </p:txBody>
+      </p:sp>
+      <p:sp>
+        <p:nvSpPr>
+          <p:cNvPr id="7" name="Slide Number Placeholder 6"/>
+          <p:cNvSpPr>
+            <a:spLocks noGrp="1"/>
+          </p:cNvSpPr>
+          <p:nvPr>
+            <p:ph type="sldNum" sz="quarter" idx="5"/>
+          </p:nvPr>
+        </p:nvSpPr>
+        <p:spPr>
+          <a:xfrm>
+            <a:off x="3884613" y="8685213"/>
+            <a:ext cx="2971800" cy="458787"/>
+          </a:xfrm>
+          <a:prstGeom prst="rect">
+            <a:avLst/>
+          </a:prstGeom>
+        </p:spPr>
+        <p:txBody>
+          <a:bodyPr vert="horz" lIns="91440" tIns="45720" rIns="91440" bIns="45720" rtlCol="0" anchor="b"/>
+          <a:lstStyle>
+            <a:lvl1pPr algn="r">
+              <a:defRPr sz="1200"/>
+            </a:lvl1pPr>
+          </a:lstStyle>
+          <a:p>
+            <a:fld id="{DEB63DFA-00F7-EA4E-9BDC-B3579D9222AC}" type="slidenum">
+              <a:rPr lang="en-US" smtClean="0"/>
+              <a:t>‹#›</a:t>
+            </a:fld>
+            <a:endParaRPr lang="en-US"/>
+          </a:p>
+        </p:txBody>
+      </p:sp>
+    </p:spTree>
+    <p:extLst>
+      <p:ext uri="{BB962C8B-B14F-4D97-AF65-F5344CB8AC3E}">
+        <p14:creationId xmlns:p14="http://schemas.microsoft.com/office/powerpoint/2010/main" val="2056872138"/>
+      </p:ext>
+    </p:extLst>
+  </p:cSld>
+  <p:clrMap bg1="lt1" tx1="dk1" bg2="lt2" tx2="dk2" accent1="accent1" accent2="accent2" accent3="accent3" accent4="accent4" accent5="accent5" accent6="accent6" hlink="hlink" folHlink="folHlink"/>
+  <p:notesStyle>
+    <a:lvl1pPr marL="0" algn="l" defTabSz="914400" rtl="0" eaLnBrk="1" latinLnBrk="0" hangingPunct="1">
+      <a:defRPr sz="1200" kern="1200">
+        <a:solidFill>
+          <a:schemeClr val="tx1"/>
+        </a:solidFill>
+        <a:latin typeface="+mn-lt"/>
+        <a:ea typeface="+mn-ea"/>
+        <a:cs typeface="+mn-cs"/>
+      </a:defRPr>
+    </a:lvl1pPr>
+    <a:lvl2pPr marL="457200" algn="l" defTabSz="914400" rtl="0" eaLnBrk="1" latinLnBrk="0" hangingPunct="1">
+      <a:defRPr sz="1200" kern="1200">
+        <a:solidFill>
+          <a:schemeClr val="tx1"/>
+        </a:solidFill>
+        <a:latin typeface="+mn-lt"/>
+        <a:ea typeface="+mn-ea"/>
+        <a:cs typeface="+mn-cs"/>
+      </a:defRPr>
+    </a:lvl2pPr>
+    <a:lvl3pPr marL="914400" algn="l" defTabSz="914400" rtl="0" eaLnBrk="1" latinLnBrk="0" hangingPunct="1">
+      <a:defRPr sz="1200" kern="1200">
+        <a:solidFill>
+          <a:schemeClr val="tx1"/>
+        </a:solidFill>
+        <a:latin typeface="+mn-lt"/>
+        <a:ea typeface="+mn-ea"/>
+        <a:cs typeface="+mn-cs"/>
+      </a:defRPr>
+    </a:lvl3pPr>
+    <a:lvl4pPr marL="1371600" algn="l" defTabSz="914400" rtl="0" eaLnBrk="1" latinLnBrk="0" hangingPunct="1">
+      <a:defRPr sz="1200" kern="1200">
+        <a:solidFill>
+          <a:schemeClr val="tx1"/>
+        </a:solidFill>
+        <a:latin typeface="+mn-lt"/>
+        <a:ea typeface="+mn-ea"/>
+        <a:cs typeface="+mn-cs"/>
+      </a:defRPr>
+    </a:lvl4pPr>
+    <a:lvl5pPr marL="1828800" algn="l" defTabSz="914400" rtl="0" eaLnBrk="1" latinLnBrk="0" hangingPunct="1">
+      <a:defRPr sz="1200" kern="1200">
+        <a:solidFill>
+          <a:schemeClr val="tx1"/>
+        </a:solidFill>
+        <a:latin typeface="+mn-lt"/>
+        <a:ea typeface="+mn-ea"/>
+        <a:cs typeface="+mn-cs"/>
+      </a:defRPr>
+    </a:lvl5pPr>
+    <a:lvl6pPr marL="2286000" algn="l" defTabSz="914400" rtl="0" eaLnBrk="1" latinLnBrk="0" hangingPunct="1">
+      <a:defRPr sz="1200" kern="1200">
+        <a:solidFill>
+          <a:schemeClr val="tx1"/>
+        </a:solidFill>
+        <a:latin typeface="+mn-lt"/>
+        <a:ea typeface="+mn-ea"/>
+        <a:cs typeface="+mn-cs"/>
+      </a:defRPr>
+    </a:lvl6pPr>
+    <a:lvl7pPr marL="2743200" algn="l" defTabSz="914400" rtl="0" eaLnBrk="1" latinLnBrk="0" hangingPunct="1">
+      <a:defRPr sz="1200" kern="1200">
+        <a:solidFill>
+          <a:schemeClr val="tx1"/>
+        </a:solidFill>
+        <a:latin typeface="+mn-lt"/>
+        <a:ea typeface="+mn-ea"/>
+        <a:cs typeface="+mn-cs"/>
+      </a:defRPr>
+    </a:lvl7pPr>
+    <a:lvl8pPr marL="3200400" algn="l" defTabSz="914400" rtl="0" eaLnBrk="1" latinLnBrk="0" hangingPunct="1">
+      <a:defRPr sz="1200" kern="1200">
+        <a:solidFill>
+          <a:schemeClr val="tx1"/>
+        </a:solidFill>
+        <a:latin typeface="+mn-lt"/>
+        <a:ea typeface="+mn-ea"/>
+        <a:cs typeface="+mn-cs"/>
+      </a:defRPr>
+    </a:lvl8pPr>
+    <a:lvl9pPr marL="3657600" algn="l" defTabSz="914400" rtl="0" eaLnBrk="1" latinLnBrk="0" hangingPunct="1">
+      <a:defRPr sz="1200" kern="1200">
+        <a:solidFill>
+          <a:schemeClr val="tx1"/>
+        </a:solidFill>
+        <a:latin typeface="+mn-lt"/>
+        <a:ea typeface="+mn-ea"/>
+        <a:cs typeface="+mn-cs"/>
+      </a:defRPr>
+    </a:lvl9pPr>
+  </p:notesStyle>
+</p:notesMaster>
+</file>
+
+<file path=ppt/notesSlides/notesSlide1.xml><?xml version="1.0" encoding="utf-8"?>
+<p:notes xmlns:a="http://schemas.openxmlformats.org/drawingml/2006/main" xmlns:r="http://schemas.openxmlformats.org/officeDocument/2006/relationships" xmlns:p="http://schemas.openxmlformats.org/presentationml/2006/main">
+  <p:cSld>
+    <p:spTree>
+      <p:nvGrpSpPr>
+        <p:cNvPr id="1" name=""/>
+        <p:cNvGrpSpPr/>
+        <p:nvPr/>
+      </p:nvGrpSpPr>
+      <p:grpSpPr>
+        <a:xfrm>
+          <a:off x="0" y="0"/>
+          <a:ext cx="0" cy="0"/>
+          <a:chOff x="0" y="0"/>
+          <a:chExt cx="0" cy="0"/>
+        </a:xfrm>
+      </p:grpSpPr>
+      <p:sp>
+        <p:nvSpPr>
+          <p:cNvPr id="2" name="Slide Image Placeholder 1"/>
+          <p:cNvSpPr>
+            <a:spLocks noGrp="1" noRot="1" noChangeAspect="1"/>
+          </p:cNvSpPr>
+          <p:nvPr>
+            <p:ph type="sldImg"/>
+          </p:nvPr>
+        </p:nvSpPr>
+        <p:spPr/>
+      </p:sp>
+      <p:sp>
+        <p:nvSpPr>
+          <p:cNvPr id="3" name="Notes Placeholder 2"/>
+          <p:cNvSpPr>
+            <a:spLocks noGrp="1"/>
+          </p:cNvSpPr>
+          <p:nvPr>
+            <p:ph type="body" idx="1"/>
+          </p:nvPr>
+        </p:nvSpPr>
+        <p:spPr/>
+        <p:txBody>
+          <a:bodyPr/>
+          <a:lstStyle/>
+          <a:p>
+            <a:endParaRPr lang="en-US" dirty="0"/>
+          </a:p>
+        </p:txBody>
+      </p:sp>
+      <p:sp>
+        <p:nvSpPr>
+          <p:cNvPr id="4" name="Slide Number Placeholder 3"/>
+          <p:cNvSpPr>
+            <a:spLocks noGrp="1"/>
+          </p:cNvSpPr>
+          <p:nvPr>
+            <p:ph type="sldNum" sz="quarter" idx="5"/>
+          </p:nvPr>
+        </p:nvSpPr>
+        <p:spPr/>
+        <p:txBody>
+          <a:bodyPr/>
+          <a:lstStyle/>
+          <a:p>
+            <a:fld id="{DEB63DFA-00F7-EA4E-9BDC-B3579D9222AC}" type="slidenum">
+              <a:rPr lang="en-US" smtClean="0"/>
+              <a:t>2</a:t>
+            </a:fld>
+            <a:endParaRPr lang="en-US"/>
+          </a:p>
+        </p:txBody>
+      </p:sp>
+    </p:spTree>
+    <p:extLst>
+      <p:ext uri="{BB962C8B-B14F-4D97-AF65-F5344CB8AC3E}">
+        <p14:creationId xmlns:p14="http://schemas.microsoft.com/office/powerpoint/2010/main" val="2698265400"/>
+      </p:ext>
+    </p:extLst>
+  </p:cSld>
+  <p:clrMapOvr>
+    <a:masterClrMapping/>
+  </p:clrMapOvr>
+</p:notes>
+</file>
+
 <file path=ppt/slideLayouts/slideLayout1.xml><?xml version="1.0" encoding="utf-8"?>
 <p:sldLayout xmlns:a="http://schemas.openxmlformats.org/drawingml/2006/main" xmlns:r="http://schemas.openxmlformats.org/officeDocument/2006/relationships" xmlns:p="http://schemas.openxmlformats.org/presentationml/2006/main" type="title" preserve="1">
   <p:cSld name="Title Slide">
@@ -270,7 +707,7 @@
           <a:p>
             <a:fld id="{0F4F3A10-1BBF-094E-8EF1-BA4BA81AAF48}" type="datetimeFigureOut">
               <a:rPr lang="en-US" smtClean="0"/>
-              <a:t>7/25/25</a:t>
+              <a:t>7/28/25</a:t>
             </a:fld>
             <a:endParaRPr lang="en-US"/>
           </a:p>
@@ -468,7 +905,7 @@
           <a:p>
             <a:fld id="{0F4F3A10-1BBF-094E-8EF1-BA4BA81AAF48}" type="datetimeFigureOut">
               <a:rPr lang="en-US" smtClean="0"/>
-              <a:t>7/25/25</a:t>
+              <a:t>7/28/25</a:t>
             </a:fld>
             <a:endParaRPr lang="en-US"/>
           </a:p>
@@ -676,7 +1113,7 @@
           <a:p>
             <a:fld id="{0F4F3A10-1BBF-094E-8EF1-BA4BA81AAF48}" type="datetimeFigureOut">
               <a:rPr lang="en-US" smtClean="0"/>
-              <a:t>7/25/25</a:t>
+              <a:t>7/28/25</a:t>
             </a:fld>
             <a:endParaRPr lang="en-US"/>
           </a:p>
@@ -874,7 +1311,7 @@
           <a:p>
             <a:fld id="{0F4F3A10-1BBF-094E-8EF1-BA4BA81AAF48}" type="datetimeFigureOut">
               <a:rPr lang="en-US" smtClean="0"/>
-              <a:t>7/25/25</a:t>
+              <a:t>7/28/25</a:t>
             </a:fld>
             <a:endParaRPr lang="en-US"/>
           </a:p>
@@ -1149,7 +1586,7 @@
           <a:p>
             <a:fld id="{0F4F3A10-1BBF-094E-8EF1-BA4BA81AAF48}" type="datetimeFigureOut">
               <a:rPr lang="en-US" smtClean="0"/>
-              <a:t>7/25/25</a:t>
+              <a:t>7/28/25</a:t>
             </a:fld>
             <a:endParaRPr lang="en-US"/>
           </a:p>
@@ -1414,7 +1851,7 @@
           <a:p>
             <a:fld id="{0F4F3A10-1BBF-094E-8EF1-BA4BA81AAF48}" type="datetimeFigureOut">
               <a:rPr lang="en-US" smtClean="0"/>
-              <a:t>7/25/25</a:t>
+              <a:t>7/28/25</a:t>
             </a:fld>
             <a:endParaRPr lang="en-US"/>
           </a:p>
@@ -1826,7 +2263,7 @@
           <a:p>
             <a:fld id="{0F4F3A10-1BBF-094E-8EF1-BA4BA81AAF48}" type="datetimeFigureOut">
               <a:rPr lang="en-US" smtClean="0"/>
-              <a:t>7/25/25</a:t>
+              <a:t>7/28/25</a:t>
             </a:fld>
             <a:endParaRPr lang="en-US"/>
           </a:p>
@@ -1967,7 +2404,7 @@
           <a:p>
             <a:fld id="{0F4F3A10-1BBF-094E-8EF1-BA4BA81AAF48}" type="datetimeFigureOut">
               <a:rPr lang="en-US" smtClean="0"/>
-              <a:t>7/25/25</a:t>
+              <a:t>7/28/25</a:t>
             </a:fld>
             <a:endParaRPr lang="en-US"/>
           </a:p>
@@ -2080,7 +2517,7 @@
           <a:p>
             <a:fld id="{0F4F3A10-1BBF-094E-8EF1-BA4BA81AAF48}" type="datetimeFigureOut">
               <a:rPr lang="en-US" smtClean="0"/>
-              <a:t>7/25/25</a:t>
+              <a:t>7/28/25</a:t>
             </a:fld>
             <a:endParaRPr lang="en-US"/>
           </a:p>
@@ -2391,7 +2828,7 @@
           <a:p>
             <a:fld id="{0F4F3A10-1BBF-094E-8EF1-BA4BA81AAF48}" type="datetimeFigureOut">
               <a:rPr lang="en-US" smtClean="0"/>
-              <a:t>7/25/25</a:t>
+              <a:t>7/28/25</a:t>
             </a:fld>
             <a:endParaRPr lang="en-US"/>
           </a:p>
@@ -2679,7 +3116,7 @@
           <a:p>
             <a:fld id="{0F4F3A10-1BBF-094E-8EF1-BA4BA81AAF48}" type="datetimeFigureOut">
               <a:rPr lang="en-US" smtClean="0"/>
-              <a:t>7/25/25</a:t>
+              <a:t>7/28/25</a:t>
             </a:fld>
             <a:endParaRPr lang="en-US"/>
           </a:p>
@@ -2920,7 +3357,7 @@
           <a:p>
             <a:fld id="{0F4F3A10-1BBF-094E-8EF1-BA4BA81AAF48}" type="datetimeFigureOut">
               <a:rPr lang="en-US" smtClean="0"/>
-              <a:t>7/25/25</a:t>
+              <a:t>7/28/25</a:t>
             </a:fld>
             <a:endParaRPr lang="en-US"/>
           </a:p>
@@ -4661,6 +5098,1560 @@
     <p:extLst>
       <p:ext uri="{BB962C8B-B14F-4D97-AF65-F5344CB8AC3E}">
         <p14:creationId xmlns:p14="http://schemas.microsoft.com/office/powerpoint/2010/main" val="529042958"/>
+      </p:ext>
+    </p:extLst>
+  </p:cSld>
+  <p:clrMapOvr>
+    <a:masterClrMapping/>
+  </p:clrMapOvr>
+</p:sld>
+</file>
+
+<file path=ppt/slides/slide2.xml><?xml version="1.0" encoding="utf-8"?>
+<p:sld xmlns:a="http://schemas.openxmlformats.org/drawingml/2006/main" xmlns:r="http://schemas.openxmlformats.org/officeDocument/2006/relationships" xmlns:p="http://schemas.openxmlformats.org/presentationml/2006/main">
+  <p:cSld>
+    <p:spTree>
+      <p:nvGrpSpPr>
+        <p:cNvPr id="1" name=""/>
+        <p:cNvGrpSpPr/>
+        <p:nvPr/>
+      </p:nvGrpSpPr>
+      <p:grpSpPr>
+        <a:xfrm>
+          <a:off x="0" y="0"/>
+          <a:ext cx="0" cy="0"/>
+          <a:chOff x="0" y="0"/>
+          <a:chExt cx="0" cy="0"/>
+        </a:xfrm>
+      </p:grpSpPr>
+      <p:cxnSp>
+        <p:nvCxnSpPr>
+          <p:cNvPr id="5" name="Straight Arrow Connector 4">
+            <a:extLst>
+              <a:ext uri="{FF2B5EF4-FFF2-40B4-BE49-F238E27FC236}">
+                <a16:creationId xmlns:a16="http://schemas.microsoft.com/office/drawing/2014/main" id="{20F0B8EB-8662-3FFC-9101-C3BE3B7E32F5}"/>
+              </a:ext>
+            </a:extLst>
+          </p:cNvPr>
+          <p:cNvCxnSpPr>
+            <a:cxnSpLocks/>
+          </p:cNvCxnSpPr>
+          <p:nvPr/>
+        </p:nvCxnSpPr>
+        <p:spPr>
+          <a:xfrm>
+            <a:off x="1843548" y="5255489"/>
+            <a:ext cx="9728342" cy="0"/>
+          </a:xfrm>
+          <a:prstGeom prst="straightConnector1">
+            <a:avLst/>
+          </a:prstGeom>
+          <a:ln w="38100">
+            <a:tailEnd type="triangle"/>
+          </a:ln>
+        </p:spPr>
+        <p:style>
+          <a:lnRef idx="2">
+            <a:schemeClr val="dk1"/>
+          </a:lnRef>
+          <a:fillRef idx="0">
+            <a:schemeClr val="dk1"/>
+          </a:fillRef>
+          <a:effectRef idx="1">
+            <a:schemeClr val="dk1"/>
+          </a:effectRef>
+          <a:fontRef idx="minor">
+            <a:schemeClr val="tx1"/>
+          </a:fontRef>
+        </p:style>
+      </p:cxnSp>
+      <p:cxnSp>
+        <p:nvCxnSpPr>
+          <p:cNvPr id="10" name="Straight Arrow Connector 9">
+            <a:extLst>
+              <a:ext uri="{FF2B5EF4-FFF2-40B4-BE49-F238E27FC236}">
+                <a16:creationId xmlns:a16="http://schemas.microsoft.com/office/drawing/2014/main" id="{E09093F2-9CE7-0A69-8985-3AB885000B9B}"/>
+              </a:ext>
+            </a:extLst>
+          </p:cNvPr>
+          <p:cNvCxnSpPr>
+            <a:cxnSpLocks/>
+          </p:cNvCxnSpPr>
+          <p:nvPr/>
+        </p:nvCxnSpPr>
+        <p:spPr>
+          <a:xfrm flipV="1">
+            <a:off x="1529721" y="690383"/>
+            <a:ext cx="0" cy="3919939"/>
+          </a:xfrm>
+          <a:prstGeom prst="straightConnector1">
+            <a:avLst/>
+          </a:prstGeom>
+          <a:ln w="38100">
+            <a:tailEnd type="triangle"/>
+          </a:ln>
+        </p:spPr>
+        <p:style>
+          <a:lnRef idx="2">
+            <a:schemeClr val="dk1"/>
+          </a:lnRef>
+          <a:fillRef idx="0">
+            <a:schemeClr val="dk1"/>
+          </a:fillRef>
+          <a:effectRef idx="1">
+            <a:schemeClr val="dk1"/>
+          </a:effectRef>
+          <a:fontRef idx="minor">
+            <a:schemeClr val="tx1"/>
+          </a:fontRef>
+        </p:style>
+      </p:cxnSp>
+      <p:cxnSp>
+        <p:nvCxnSpPr>
+          <p:cNvPr id="14" name="Straight Arrow Connector 13">
+            <a:extLst>
+              <a:ext uri="{FF2B5EF4-FFF2-40B4-BE49-F238E27FC236}">
+                <a16:creationId xmlns:a16="http://schemas.microsoft.com/office/drawing/2014/main" id="{303216B8-AD9B-6087-2E99-AF9A4658436E}"/>
+              </a:ext>
+            </a:extLst>
+          </p:cNvPr>
+          <p:cNvCxnSpPr>
+            <a:cxnSpLocks/>
+          </p:cNvCxnSpPr>
+          <p:nvPr/>
+        </p:nvCxnSpPr>
+        <p:spPr>
+          <a:xfrm flipV="1">
+            <a:off x="1767473" y="3759772"/>
+            <a:ext cx="1275741" cy="1235075"/>
+          </a:xfrm>
+          <a:prstGeom prst="straightConnector1">
+            <a:avLst/>
+          </a:prstGeom>
+          <a:ln w="38100">
+            <a:tailEnd type="triangle"/>
+          </a:ln>
+        </p:spPr>
+        <p:style>
+          <a:lnRef idx="2">
+            <a:schemeClr val="dk1"/>
+          </a:lnRef>
+          <a:fillRef idx="0">
+            <a:schemeClr val="dk1"/>
+          </a:fillRef>
+          <a:effectRef idx="1">
+            <a:schemeClr val="dk1"/>
+          </a:effectRef>
+          <a:fontRef idx="minor">
+            <a:schemeClr val="tx1"/>
+          </a:fontRef>
+        </p:style>
+      </p:cxnSp>
+      <p:sp>
+        <p:nvSpPr>
+          <p:cNvPr id="15" name="TextBox 14">
+            <a:extLst>
+              <a:ext uri="{FF2B5EF4-FFF2-40B4-BE49-F238E27FC236}">
+                <a16:creationId xmlns:a16="http://schemas.microsoft.com/office/drawing/2014/main" id="{9FF7CA0C-F2DD-3A59-8D44-6A27A70B4A74}"/>
+              </a:ext>
+            </a:extLst>
+          </p:cNvPr>
+          <p:cNvSpPr txBox="1"/>
+          <p:nvPr/>
+        </p:nvSpPr>
+        <p:spPr>
+          <a:xfrm>
+            <a:off x="11534209" y="5046026"/>
+            <a:ext cx="329609" cy="369332"/>
+          </a:xfrm>
+          <a:prstGeom prst="rect">
+            <a:avLst/>
+          </a:prstGeom>
+          <a:noFill/>
+        </p:spPr>
+        <p:txBody>
+          <a:bodyPr wrap="square" rtlCol="0">
+            <a:spAutoFit/>
+          </a:bodyPr>
+          <a:lstStyle/>
+          <a:p>
+            <a:r>
+              <a:rPr lang="en-US" i="1" dirty="0">
+                <a:latin typeface="Times New Roman" panose="02020603050405020304" pitchFamily="18" charset="0"/>
+                <a:cs typeface="Times New Roman" panose="02020603050405020304" pitchFamily="18" charset="0"/>
+              </a:rPr>
+              <a:t>x</a:t>
+            </a:r>
+          </a:p>
+        </p:txBody>
+      </p:sp>
+      <p:sp>
+        <p:nvSpPr>
+          <p:cNvPr id="16" name="TextBox 15">
+            <a:extLst>
+              <a:ext uri="{FF2B5EF4-FFF2-40B4-BE49-F238E27FC236}">
+                <a16:creationId xmlns:a16="http://schemas.microsoft.com/office/drawing/2014/main" id="{C336199D-39D6-6286-67B9-4D9B5CADF68A}"/>
+              </a:ext>
+            </a:extLst>
+          </p:cNvPr>
+          <p:cNvSpPr txBox="1"/>
+          <p:nvPr/>
+        </p:nvSpPr>
+        <p:spPr>
+          <a:xfrm>
+            <a:off x="2998058" y="3450772"/>
+            <a:ext cx="329609" cy="369332"/>
+          </a:xfrm>
+          <a:prstGeom prst="rect">
+            <a:avLst/>
+          </a:prstGeom>
+          <a:noFill/>
+        </p:spPr>
+        <p:txBody>
+          <a:bodyPr wrap="square" rtlCol="0">
+            <a:spAutoFit/>
+          </a:bodyPr>
+          <a:lstStyle/>
+          <a:p>
+            <a:r>
+              <a:rPr lang="en-US" i="1" dirty="0">
+                <a:latin typeface="Times New Roman" panose="02020603050405020304" pitchFamily="18" charset="0"/>
+                <a:cs typeface="Times New Roman" panose="02020603050405020304" pitchFamily="18" charset="0"/>
+              </a:rPr>
+              <a:t>z</a:t>
+            </a:r>
+          </a:p>
+        </p:txBody>
+      </p:sp>
+      <p:sp>
+        <p:nvSpPr>
+          <p:cNvPr id="17" name="TextBox 16">
+            <a:extLst>
+              <a:ext uri="{FF2B5EF4-FFF2-40B4-BE49-F238E27FC236}">
+                <a16:creationId xmlns:a16="http://schemas.microsoft.com/office/drawing/2014/main" id="{C874EC2D-B8F5-484A-1515-BE239B6D50BB}"/>
+              </a:ext>
+            </a:extLst>
+          </p:cNvPr>
+          <p:cNvSpPr txBox="1"/>
+          <p:nvPr/>
+        </p:nvSpPr>
+        <p:spPr>
+          <a:xfrm>
+            <a:off x="1382823" y="319071"/>
+            <a:ext cx="329609" cy="369332"/>
+          </a:xfrm>
+          <a:prstGeom prst="rect">
+            <a:avLst/>
+          </a:prstGeom>
+          <a:noFill/>
+        </p:spPr>
+        <p:txBody>
+          <a:bodyPr wrap="square" rtlCol="0">
+            <a:spAutoFit/>
+          </a:bodyPr>
+          <a:lstStyle/>
+          <a:p>
+            <a:r>
+              <a:rPr lang="en-US" i="1" dirty="0">
+                <a:latin typeface="Times New Roman" panose="02020603050405020304" pitchFamily="18" charset="0"/>
+                <a:cs typeface="Times New Roman" panose="02020603050405020304" pitchFamily="18" charset="0"/>
+              </a:rPr>
+              <a:t>y</a:t>
+            </a:r>
+          </a:p>
+        </p:txBody>
+      </p:sp>
+      <p:sp>
+        <p:nvSpPr>
+          <p:cNvPr id="29" name="Oval 28">
+            <a:extLst>
+              <a:ext uri="{FF2B5EF4-FFF2-40B4-BE49-F238E27FC236}">
+                <a16:creationId xmlns:a16="http://schemas.microsoft.com/office/drawing/2014/main" id="{0FCFDC40-6AEE-E365-C4B3-BB032BC4770D}"/>
+              </a:ext>
+            </a:extLst>
+          </p:cNvPr>
+          <p:cNvSpPr/>
+          <p:nvPr/>
+        </p:nvSpPr>
+        <p:spPr>
+          <a:xfrm>
+            <a:off x="4868062" y="2249068"/>
+            <a:ext cx="2917422" cy="1055303"/>
+          </a:xfrm>
+          <a:prstGeom prst="ellipse">
+            <a:avLst/>
+          </a:prstGeom>
+          <a:solidFill>
+            <a:schemeClr val="bg1"/>
+          </a:solidFill>
+          <a:ln>
+            <a:solidFill>
+              <a:srgbClr val="FF0000"/>
+            </a:solidFill>
+          </a:ln>
+        </p:spPr>
+        <p:style>
+          <a:lnRef idx="2">
+            <a:schemeClr val="accent1">
+              <a:shade val="15000"/>
+            </a:schemeClr>
+          </a:lnRef>
+          <a:fillRef idx="1">
+            <a:schemeClr val="accent1"/>
+          </a:fillRef>
+          <a:effectRef idx="0">
+            <a:schemeClr val="accent1"/>
+          </a:effectRef>
+          <a:fontRef idx="minor">
+            <a:schemeClr val="lt1"/>
+          </a:fontRef>
+        </p:style>
+        <p:txBody>
+          <a:bodyPr rtlCol="0" anchor="ctr"/>
+          <a:lstStyle/>
+          <a:p>
+            <a:pPr algn="ctr"/>
+            <a:endParaRPr lang="en-US" dirty="0"/>
+          </a:p>
+        </p:txBody>
+      </p:sp>
+      <p:sp>
+        <p:nvSpPr>
+          <p:cNvPr id="34" name="Oval 33">
+            <a:extLst>
+              <a:ext uri="{FF2B5EF4-FFF2-40B4-BE49-F238E27FC236}">
+                <a16:creationId xmlns:a16="http://schemas.microsoft.com/office/drawing/2014/main" id="{C58B3C79-EECE-0B1E-A1A0-4ED21DB33C6D}"/>
+              </a:ext>
+            </a:extLst>
+          </p:cNvPr>
+          <p:cNvSpPr/>
+          <p:nvPr/>
+        </p:nvSpPr>
+        <p:spPr>
+          <a:xfrm>
+            <a:off x="8441448" y="4699720"/>
+            <a:ext cx="2484700" cy="1119097"/>
+          </a:xfrm>
+          <a:prstGeom prst="ellipse">
+            <a:avLst/>
+          </a:prstGeom>
+          <a:solidFill>
+            <a:schemeClr val="bg1"/>
+          </a:solidFill>
+          <a:ln>
+            <a:solidFill>
+              <a:srgbClr val="FF0000"/>
+            </a:solidFill>
+          </a:ln>
+        </p:spPr>
+        <p:style>
+          <a:lnRef idx="2">
+            <a:schemeClr val="accent1">
+              <a:shade val="15000"/>
+            </a:schemeClr>
+          </a:lnRef>
+          <a:fillRef idx="1">
+            <a:schemeClr val="accent1"/>
+          </a:fillRef>
+          <a:effectRef idx="0">
+            <a:schemeClr val="accent1"/>
+          </a:effectRef>
+          <a:fontRef idx="minor">
+            <a:schemeClr val="lt1"/>
+          </a:fontRef>
+        </p:style>
+        <p:txBody>
+          <a:bodyPr rtlCol="0" anchor="ctr"/>
+          <a:lstStyle/>
+          <a:p>
+            <a:pPr algn="ctr"/>
+            <a:endParaRPr lang="en-US"/>
+          </a:p>
+        </p:txBody>
+      </p:sp>
+      <p:pic>
+        <p:nvPicPr>
+          <p:cNvPr id="36" name="Graphic 35" descr="Airplane with solid fill">
+            <a:extLst>
+              <a:ext uri="{FF2B5EF4-FFF2-40B4-BE49-F238E27FC236}">
+                <a16:creationId xmlns:a16="http://schemas.microsoft.com/office/drawing/2014/main" id="{BCCE69E0-6C12-CA24-3553-6623C1DA5A1F}"/>
+              </a:ext>
+            </a:extLst>
+          </p:cNvPr>
+          <p:cNvPicPr>
+            <a:picLocks noChangeAspect="1"/>
+          </p:cNvPicPr>
+          <p:nvPr/>
+        </p:nvPicPr>
+        <p:blipFill>
+          <a:blip r:embed="rId3">
+            <a:extLst>
+              <a:ext uri="{96DAC541-7B7A-43D3-8B79-37D633B846F1}">
+                <asvg:svgBlip xmlns:asvg="http://schemas.microsoft.com/office/drawing/2016/SVG/main" r:embed="rId4"/>
+              </a:ext>
+            </a:extLst>
+          </a:blip>
+          <a:stretch>
+            <a:fillRect/>
+          </a:stretch>
+        </p:blipFill>
+        <p:spPr>
+          <a:xfrm rot="5897188">
+            <a:off x="5404588" y="2994554"/>
+            <a:ext cx="496129" cy="496129"/>
+          </a:xfrm>
+          <a:prstGeom prst="rect">
+            <a:avLst/>
+          </a:prstGeom>
+        </p:spPr>
+      </p:pic>
+      <p:pic>
+        <p:nvPicPr>
+          <p:cNvPr id="38" name="Graphic 37" descr="Cell Tower with solid fill">
+            <a:extLst>
+              <a:ext uri="{FF2B5EF4-FFF2-40B4-BE49-F238E27FC236}">
+                <a16:creationId xmlns:a16="http://schemas.microsoft.com/office/drawing/2014/main" id="{48CE983C-0829-9204-451D-505BD832A454}"/>
+              </a:ext>
+            </a:extLst>
+          </p:cNvPr>
+          <p:cNvPicPr>
+            <a:picLocks noChangeAspect="1"/>
+          </p:cNvPicPr>
+          <p:nvPr/>
+        </p:nvPicPr>
+        <p:blipFill>
+          <a:blip r:embed="rId5">
+            <a:extLst>
+              <a:ext uri="{96DAC541-7B7A-43D3-8B79-37D633B846F1}">
+                <asvg:svgBlip xmlns:asvg="http://schemas.microsoft.com/office/drawing/2016/SVG/main" r:embed="rId6"/>
+              </a:ext>
+            </a:extLst>
+          </a:blip>
+          <a:stretch>
+            <a:fillRect/>
+          </a:stretch>
+        </p:blipFill>
+        <p:spPr>
+          <a:xfrm>
+            <a:off x="1134261" y="4516128"/>
+            <a:ext cx="797778" cy="797778"/>
+          </a:xfrm>
+          <a:prstGeom prst="rect">
+            <a:avLst/>
+          </a:prstGeom>
+        </p:spPr>
+      </p:pic>
+      <p:cxnSp>
+        <p:nvCxnSpPr>
+          <p:cNvPr id="41" name="Straight Connector 40">
+            <a:extLst>
+              <a:ext uri="{FF2B5EF4-FFF2-40B4-BE49-F238E27FC236}">
+                <a16:creationId xmlns:a16="http://schemas.microsoft.com/office/drawing/2014/main" id="{5F385213-4876-59CD-D32E-9FBC708F07D0}"/>
+              </a:ext>
+            </a:extLst>
+          </p:cNvPr>
+          <p:cNvCxnSpPr>
+            <a:cxnSpLocks/>
+          </p:cNvCxnSpPr>
+          <p:nvPr/>
+        </p:nvCxnSpPr>
+        <p:spPr>
+          <a:xfrm>
+            <a:off x="1527338" y="5553366"/>
+            <a:ext cx="0" cy="616231"/>
+          </a:xfrm>
+          <a:prstGeom prst="line">
+            <a:avLst/>
+          </a:prstGeom>
+          <a:ln w="38100">
+            <a:solidFill>
+              <a:schemeClr val="tx1"/>
+            </a:solidFill>
+          </a:ln>
+        </p:spPr>
+        <p:style>
+          <a:lnRef idx="2">
+            <a:schemeClr val="accent1"/>
+          </a:lnRef>
+          <a:fillRef idx="0">
+            <a:schemeClr val="accent1"/>
+          </a:fillRef>
+          <a:effectRef idx="1">
+            <a:schemeClr val="accent1"/>
+          </a:effectRef>
+          <a:fontRef idx="minor">
+            <a:schemeClr val="tx1"/>
+          </a:fontRef>
+        </p:style>
+      </p:cxnSp>
+      <p:cxnSp>
+        <p:nvCxnSpPr>
+          <p:cNvPr id="48" name="Straight Connector 47">
+            <a:extLst>
+              <a:ext uri="{FF2B5EF4-FFF2-40B4-BE49-F238E27FC236}">
+                <a16:creationId xmlns:a16="http://schemas.microsoft.com/office/drawing/2014/main" id="{E0D722A4-25A3-4BFF-ABB0-BD0BD133EE2A}"/>
+              </a:ext>
+            </a:extLst>
+          </p:cNvPr>
+          <p:cNvCxnSpPr>
+            <a:cxnSpLocks/>
+          </p:cNvCxnSpPr>
+          <p:nvPr/>
+        </p:nvCxnSpPr>
+        <p:spPr>
+          <a:xfrm flipH="1">
+            <a:off x="875654" y="5514759"/>
+            <a:ext cx="390198" cy="396124"/>
+          </a:xfrm>
+          <a:prstGeom prst="line">
+            <a:avLst/>
+          </a:prstGeom>
+          <a:ln w="38100">
+            <a:solidFill>
+              <a:schemeClr val="tx1"/>
+            </a:solidFill>
+          </a:ln>
+        </p:spPr>
+        <p:style>
+          <a:lnRef idx="2">
+            <a:schemeClr val="accent1"/>
+          </a:lnRef>
+          <a:fillRef idx="0">
+            <a:schemeClr val="accent1"/>
+          </a:fillRef>
+          <a:effectRef idx="1">
+            <a:schemeClr val="accent1"/>
+          </a:effectRef>
+          <a:fontRef idx="minor">
+            <a:schemeClr val="tx1"/>
+          </a:fontRef>
+        </p:style>
+      </p:cxnSp>
+      <p:sp>
+        <p:nvSpPr>
+          <p:cNvPr id="61" name="Oval 60">
+            <a:extLst>
+              <a:ext uri="{FF2B5EF4-FFF2-40B4-BE49-F238E27FC236}">
+                <a16:creationId xmlns:a16="http://schemas.microsoft.com/office/drawing/2014/main" id="{C0231D65-20E6-9428-0EB7-46CBF758BB49}"/>
+              </a:ext>
+            </a:extLst>
+          </p:cNvPr>
+          <p:cNvSpPr/>
+          <p:nvPr/>
+        </p:nvSpPr>
+        <p:spPr>
+          <a:xfrm>
+            <a:off x="6295022" y="2744970"/>
+            <a:ext cx="63500" cy="63500"/>
+          </a:xfrm>
+          <a:prstGeom prst="ellipse">
+            <a:avLst/>
+          </a:prstGeom>
+          <a:solidFill>
+            <a:srgbClr val="FF0000"/>
+          </a:solidFill>
+          <a:ln>
+            <a:noFill/>
+          </a:ln>
+        </p:spPr>
+        <p:style>
+          <a:lnRef idx="2">
+            <a:schemeClr val="accent1">
+              <a:shade val="15000"/>
+            </a:schemeClr>
+          </a:lnRef>
+          <a:fillRef idx="1">
+            <a:schemeClr val="accent1"/>
+          </a:fillRef>
+          <a:effectRef idx="0">
+            <a:schemeClr val="accent1"/>
+          </a:effectRef>
+          <a:fontRef idx="minor">
+            <a:schemeClr val="lt1"/>
+          </a:fontRef>
+        </p:style>
+        <p:txBody>
+          <a:bodyPr rtlCol="0" anchor="ctr"/>
+          <a:lstStyle/>
+          <a:p>
+            <a:pPr algn="ctr"/>
+            <a:endParaRPr lang="en-US"/>
+          </a:p>
+        </p:txBody>
+      </p:sp>
+      <p:sp>
+        <p:nvSpPr>
+          <p:cNvPr id="63" name="Oval 62">
+            <a:extLst>
+              <a:ext uri="{FF2B5EF4-FFF2-40B4-BE49-F238E27FC236}">
+                <a16:creationId xmlns:a16="http://schemas.microsoft.com/office/drawing/2014/main" id="{0DE1CE92-78A4-21F0-908E-596F1A40C903}"/>
+              </a:ext>
+            </a:extLst>
+          </p:cNvPr>
+          <p:cNvSpPr/>
+          <p:nvPr/>
+        </p:nvSpPr>
+        <p:spPr>
+          <a:xfrm>
+            <a:off x="9718312" y="5223739"/>
+            <a:ext cx="63500" cy="63500"/>
+          </a:xfrm>
+          <a:prstGeom prst="ellipse">
+            <a:avLst/>
+          </a:prstGeom>
+          <a:solidFill>
+            <a:srgbClr val="FF0000"/>
+          </a:solidFill>
+          <a:ln>
+            <a:noFill/>
+          </a:ln>
+        </p:spPr>
+        <p:style>
+          <a:lnRef idx="2">
+            <a:schemeClr val="accent1">
+              <a:shade val="15000"/>
+            </a:schemeClr>
+          </a:lnRef>
+          <a:fillRef idx="1">
+            <a:schemeClr val="accent1"/>
+          </a:fillRef>
+          <a:effectRef idx="0">
+            <a:schemeClr val="accent1"/>
+          </a:effectRef>
+          <a:fontRef idx="minor">
+            <a:schemeClr val="lt1"/>
+          </a:fontRef>
+        </p:style>
+        <p:txBody>
+          <a:bodyPr rtlCol="0" anchor="ctr"/>
+          <a:lstStyle/>
+          <a:p>
+            <a:pPr algn="ctr"/>
+            <a:endParaRPr lang="en-US" dirty="0"/>
+          </a:p>
+        </p:txBody>
+      </p:sp>
+      <p:pic>
+        <p:nvPicPr>
+          <p:cNvPr id="1030" name="Graphic 1029" descr="Man with solid fill">
+            <a:extLst>
+              <a:ext uri="{FF2B5EF4-FFF2-40B4-BE49-F238E27FC236}">
+                <a16:creationId xmlns:a16="http://schemas.microsoft.com/office/drawing/2014/main" id="{58C1CE4D-1B70-332D-98FE-EA02FBFF3A5E}"/>
+              </a:ext>
+            </a:extLst>
+          </p:cNvPr>
+          <p:cNvPicPr>
+            <a:picLocks noChangeAspect="1"/>
+          </p:cNvPicPr>
+          <p:nvPr/>
+        </p:nvPicPr>
+        <p:blipFill>
+          <a:blip r:embed="rId7">
+            <a:extLst>
+              <a:ext uri="{96DAC541-7B7A-43D3-8B79-37D633B846F1}">
+                <asvg:svgBlip xmlns:asvg="http://schemas.microsoft.com/office/drawing/2016/SVG/main" r:embed="rId8"/>
+              </a:ext>
+            </a:extLst>
+          </a:blip>
+          <a:stretch>
+            <a:fillRect/>
+          </a:stretch>
+        </p:blipFill>
+        <p:spPr>
+          <a:xfrm>
+            <a:off x="10302055" y="5262604"/>
+            <a:ext cx="362607" cy="362607"/>
+          </a:xfrm>
+          <a:prstGeom prst="rect">
+            <a:avLst/>
+          </a:prstGeom>
+        </p:spPr>
+      </p:pic>
+      <p:pic>
+        <p:nvPicPr>
+          <p:cNvPr id="1032" name="Graphic 1031" descr="Woman with solid fill">
+            <a:extLst>
+              <a:ext uri="{FF2B5EF4-FFF2-40B4-BE49-F238E27FC236}">
+                <a16:creationId xmlns:a16="http://schemas.microsoft.com/office/drawing/2014/main" id="{5E72C7F1-09D7-6C17-B039-02E016F24E4B}"/>
+              </a:ext>
+            </a:extLst>
+          </p:cNvPr>
+          <p:cNvPicPr>
+            <a:picLocks noChangeAspect="1"/>
+          </p:cNvPicPr>
+          <p:nvPr/>
+        </p:nvPicPr>
+        <p:blipFill>
+          <a:blip r:embed="rId9">
+            <a:extLst>
+              <a:ext uri="{96DAC541-7B7A-43D3-8B79-37D633B846F1}">
+                <asvg:svgBlip xmlns:asvg="http://schemas.microsoft.com/office/drawing/2016/SVG/main" r:embed="rId10"/>
+              </a:ext>
+            </a:extLst>
+          </a:blip>
+          <a:stretch>
+            <a:fillRect/>
+          </a:stretch>
+        </p:blipFill>
+        <p:spPr>
+          <a:xfrm flipH="1">
+            <a:off x="9611185" y="5436100"/>
+            <a:ext cx="362607" cy="362607"/>
+          </a:xfrm>
+          <a:prstGeom prst="rect">
+            <a:avLst/>
+          </a:prstGeom>
+        </p:spPr>
+      </p:pic>
+      <p:pic>
+        <p:nvPicPr>
+          <p:cNvPr id="1033" name="Graphic 1032" descr="Woman with solid fill">
+            <a:extLst>
+              <a:ext uri="{FF2B5EF4-FFF2-40B4-BE49-F238E27FC236}">
+                <a16:creationId xmlns:a16="http://schemas.microsoft.com/office/drawing/2014/main" id="{193CAE41-DBD1-4182-2CDE-EB5C4EF7D1DC}"/>
+              </a:ext>
+            </a:extLst>
+          </p:cNvPr>
+          <p:cNvPicPr>
+            <a:picLocks noChangeAspect="1"/>
+          </p:cNvPicPr>
+          <p:nvPr/>
+        </p:nvPicPr>
+        <p:blipFill>
+          <a:blip r:embed="rId9">
+            <a:extLst>
+              <a:ext uri="{96DAC541-7B7A-43D3-8B79-37D633B846F1}">
+                <asvg:svgBlip xmlns:asvg="http://schemas.microsoft.com/office/drawing/2016/SVG/main" r:embed="rId10"/>
+              </a:ext>
+            </a:extLst>
+          </a:blip>
+          <a:stretch>
+            <a:fillRect/>
+          </a:stretch>
+        </p:blipFill>
+        <p:spPr>
+          <a:xfrm flipH="1">
+            <a:off x="9702460" y="4523244"/>
+            <a:ext cx="362607" cy="362607"/>
+          </a:xfrm>
+          <a:prstGeom prst="rect">
+            <a:avLst/>
+          </a:prstGeom>
+        </p:spPr>
+      </p:pic>
+      <p:pic>
+        <p:nvPicPr>
+          <p:cNvPr id="1034" name="Graphic 1033" descr="Man with solid fill">
+            <a:extLst>
+              <a:ext uri="{FF2B5EF4-FFF2-40B4-BE49-F238E27FC236}">
+                <a16:creationId xmlns:a16="http://schemas.microsoft.com/office/drawing/2014/main" id="{21CC9128-9752-57FF-C033-58FB7F0C27AD}"/>
+              </a:ext>
+            </a:extLst>
+          </p:cNvPr>
+          <p:cNvPicPr>
+            <a:picLocks noChangeAspect="1"/>
+          </p:cNvPicPr>
+          <p:nvPr/>
+        </p:nvPicPr>
+        <p:blipFill>
+          <a:blip r:embed="rId7">
+            <a:extLst>
+              <a:ext uri="{96DAC541-7B7A-43D3-8B79-37D633B846F1}">
+                <asvg:svgBlip xmlns:asvg="http://schemas.microsoft.com/office/drawing/2016/SVG/main" r:embed="rId8"/>
+              </a:ext>
+            </a:extLst>
+          </a:blip>
+          <a:stretch>
+            <a:fillRect/>
+          </a:stretch>
+        </p:blipFill>
+        <p:spPr>
+          <a:xfrm>
+            <a:off x="8626805" y="4733713"/>
+            <a:ext cx="362607" cy="362607"/>
+          </a:xfrm>
+          <a:prstGeom prst="rect">
+            <a:avLst/>
+          </a:prstGeom>
+        </p:spPr>
+      </p:pic>
+      <p:sp>
+        <p:nvSpPr>
+          <p:cNvPr id="1041" name="TextBox 1040">
+            <a:extLst>
+              <a:ext uri="{FF2B5EF4-FFF2-40B4-BE49-F238E27FC236}">
+                <a16:creationId xmlns:a16="http://schemas.microsoft.com/office/drawing/2014/main" id="{56942331-E9AD-E5A2-FD86-381FCB0B8479}"/>
+              </a:ext>
+            </a:extLst>
+          </p:cNvPr>
+          <p:cNvSpPr txBox="1"/>
+          <p:nvPr/>
+        </p:nvSpPr>
+        <p:spPr>
+          <a:xfrm>
+            <a:off x="5933879" y="2782001"/>
+            <a:ext cx="808566" cy="307777"/>
+          </a:xfrm>
+          <a:prstGeom prst="rect">
+            <a:avLst/>
+          </a:prstGeom>
+          <a:noFill/>
+        </p:spPr>
+        <p:txBody>
+          <a:bodyPr wrap="square" rtlCol="0">
+            <a:spAutoFit/>
+          </a:bodyPr>
+          <a:lstStyle/>
+          <a:p>
+            <a:r>
+              <a:rPr lang="en-US" sz="1400" dirty="0">
+                <a:latin typeface="Times New Roman" panose="02020603050405020304" pitchFamily="18" charset="0"/>
+                <a:cs typeface="Times New Roman" panose="02020603050405020304" pitchFamily="18" charset="0"/>
+              </a:rPr>
+              <a:t>(</a:t>
+            </a:r>
+            <a:r>
+              <a:rPr lang="en-US" sz="1400" i="1" dirty="0">
+                <a:latin typeface="Times New Roman" panose="02020603050405020304" pitchFamily="18" charset="0"/>
+                <a:cs typeface="Times New Roman" panose="02020603050405020304" pitchFamily="18" charset="0"/>
+              </a:rPr>
+              <a:t>c</a:t>
+            </a:r>
+            <a:r>
+              <a:rPr lang="en-US" sz="1400" dirty="0">
+                <a:latin typeface="Times New Roman" panose="02020603050405020304" pitchFamily="18" charset="0"/>
+                <a:cs typeface="Times New Roman" panose="02020603050405020304" pitchFamily="18" charset="0"/>
+              </a:rPr>
+              <a:t>, </a:t>
+            </a:r>
+            <a:r>
+              <a:rPr lang="en-US" sz="1400" i="1" dirty="0">
+                <a:latin typeface="Times New Roman" panose="02020603050405020304" pitchFamily="18" charset="0"/>
+                <a:cs typeface="Times New Roman" panose="02020603050405020304" pitchFamily="18" charset="0"/>
+              </a:rPr>
+              <a:t>H</a:t>
+            </a:r>
+            <a:r>
+              <a:rPr lang="en-US" sz="1400" dirty="0">
+                <a:latin typeface="Times New Roman" panose="02020603050405020304" pitchFamily="18" charset="0"/>
+                <a:cs typeface="Times New Roman" panose="02020603050405020304" pitchFamily="18" charset="0"/>
+              </a:rPr>
+              <a:t>, 0)</a:t>
+            </a:r>
+          </a:p>
+        </p:txBody>
+      </p:sp>
+      <p:cxnSp>
+        <p:nvCxnSpPr>
+          <p:cNvPr id="1043" name="Straight Connector 1042">
+            <a:extLst>
+              <a:ext uri="{FF2B5EF4-FFF2-40B4-BE49-F238E27FC236}">
+                <a16:creationId xmlns:a16="http://schemas.microsoft.com/office/drawing/2014/main" id="{ED9102FE-0D27-1C58-707B-2194559B2EBF}"/>
+              </a:ext>
+            </a:extLst>
+          </p:cNvPr>
+          <p:cNvCxnSpPr>
+            <a:cxnSpLocks/>
+            <a:stCxn id="61" idx="6"/>
+            <a:endCxn id="29" idx="6"/>
+          </p:cNvCxnSpPr>
+          <p:nvPr/>
+        </p:nvCxnSpPr>
+        <p:spPr>
+          <a:xfrm>
+            <a:off x="6358522" y="2776720"/>
+            <a:ext cx="1426962" cy="0"/>
+          </a:xfrm>
+          <a:prstGeom prst="line">
+            <a:avLst/>
+          </a:prstGeom>
+          <a:ln w="38100">
+            <a:solidFill>
+              <a:srgbClr val="FF0000"/>
+            </a:solidFill>
+            <a:prstDash val="sysDot"/>
+          </a:ln>
+        </p:spPr>
+        <p:style>
+          <a:lnRef idx="2">
+            <a:schemeClr val="accent1"/>
+          </a:lnRef>
+          <a:fillRef idx="0">
+            <a:schemeClr val="accent1"/>
+          </a:fillRef>
+          <a:effectRef idx="1">
+            <a:schemeClr val="accent1"/>
+          </a:effectRef>
+          <a:fontRef idx="minor">
+            <a:schemeClr val="tx1"/>
+          </a:fontRef>
+        </p:style>
+      </p:cxnSp>
+      <p:sp>
+        <p:nvSpPr>
+          <p:cNvPr id="1045" name="Left Brace 1044">
+            <a:extLst>
+              <a:ext uri="{FF2B5EF4-FFF2-40B4-BE49-F238E27FC236}">
+                <a16:creationId xmlns:a16="http://schemas.microsoft.com/office/drawing/2014/main" id="{3702C3D3-5587-FEFF-0BB0-2D3D17FBA4A2}"/>
+              </a:ext>
+            </a:extLst>
+          </p:cNvPr>
+          <p:cNvSpPr/>
+          <p:nvPr/>
+        </p:nvSpPr>
+        <p:spPr>
+          <a:xfrm rot="5400000">
+            <a:off x="7013387" y="1941107"/>
+            <a:ext cx="85479" cy="1458712"/>
+          </a:xfrm>
+          <a:prstGeom prst="leftBrace">
+            <a:avLst>
+              <a:gd name="adj1" fmla="val 8333"/>
+              <a:gd name="adj2" fmla="val 50000"/>
+            </a:avLst>
+          </a:prstGeom>
+          <a:ln>
+            <a:solidFill>
+              <a:schemeClr val="tx1"/>
+            </a:solidFill>
+          </a:ln>
+        </p:spPr>
+        <p:style>
+          <a:lnRef idx="2">
+            <a:schemeClr val="accent1"/>
+          </a:lnRef>
+          <a:fillRef idx="0">
+            <a:schemeClr val="accent1"/>
+          </a:fillRef>
+          <a:effectRef idx="1">
+            <a:schemeClr val="accent1"/>
+          </a:effectRef>
+          <a:fontRef idx="minor">
+            <a:schemeClr val="tx1"/>
+          </a:fontRef>
+        </p:style>
+        <p:txBody>
+          <a:bodyPr rtlCol="0" anchor="ctr"/>
+          <a:lstStyle/>
+          <a:p>
+            <a:pPr algn="ctr"/>
+            <a:endParaRPr lang="en-US" dirty="0"/>
+          </a:p>
+        </p:txBody>
+      </p:sp>
+      <p:sp>
+        <p:nvSpPr>
+          <p:cNvPr id="1047" name="TextBox 1046">
+            <a:extLst>
+              <a:ext uri="{FF2B5EF4-FFF2-40B4-BE49-F238E27FC236}">
+                <a16:creationId xmlns:a16="http://schemas.microsoft.com/office/drawing/2014/main" id="{953A77B9-D97A-EB18-272F-38F47FF419A1}"/>
+              </a:ext>
+            </a:extLst>
+          </p:cNvPr>
+          <p:cNvSpPr txBox="1"/>
+          <p:nvPr/>
+        </p:nvSpPr>
+        <p:spPr>
+          <a:xfrm>
+            <a:off x="6944729" y="2364211"/>
+            <a:ext cx="222794" cy="307777"/>
+          </a:xfrm>
+          <a:prstGeom prst="rect">
+            <a:avLst/>
+          </a:prstGeom>
+          <a:noFill/>
+        </p:spPr>
+        <p:txBody>
+          <a:bodyPr wrap="square" rtlCol="0">
+            <a:spAutoFit/>
+          </a:bodyPr>
+          <a:lstStyle/>
+          <a:p>
+            <a:r>
+              <a:rPr lang="en-US" sz="1400" i="1" dirty="0">
+                <a:latin typeface="Times New Roman" panose="02020603050405020304" pitchFamily="18" charset="0"/>
+                <a:cs typeface="Times New Roman" panose="02020603050405020304" pitchFamily="18" charset="0"/>
+              </a:rPr>
+              <a:t>r</a:t>
+            </a:r>
+          </a:p>
+        </p:txBody>
+      </p:sp>
+      <p:sp>
+        <p:nvSpPr>
+          <p:cNvPr id="1048" name="TextBox 1047">
+            <a:extLst>
+              <a:ext uri="{FF2B5EF4-FFF2-40B4-BE49-F238E27FC236}">
+                <a16:creationId xmlns:a16="http://schemas.microsoft.com/office/drawing/2014/main" id="{0514740B-41D5-8CDC-39E4-02091A99857D}"/>
+              </a:ext>
+            </a:extLst>
+          </p:cNvPr>
+          <p:cNvSpPr txBox="1"/>
+          <p:nvPr/>
+        </p:nvSpPr>
+        <p:spPr>
+          <a:xfrm>
+            <a:off x="1162577" y="5206982"/>
+            <a:ext cx="770103" cy="307777"/>
+          </a:xfrm>
+          <a:prstGeom prst="rect">
+            <a:avLst/>
+          </a:prstGeom>
+          <a:noFill/>
+        </p:spPr>
+        <p:txBody>
+          <a:bodyPr wrap="square" rtlCol="0">
+            <a:spAutoFit/>
+          </a:bodyPr>
+          <a:lstStyle/>
+          <a:p>
+            <a:r>
+              <a:rPr lang="en-US" sz="1400" dirty="0">
+                <a:latin typeface="Times New Roman" panose="02020603050405020304" pitchFamily="18" charset="0"/>
+                <a:cs typeface="Times New Roman" panose="02020603050405020304" pitchFamily="18" charset="0"/>
+              </a:rPr>
+              <a:t>(0, 0, 0)</a:t>
+            </a:r>
+          </a:p>
+        </p:txBody>
+      </p:sp>
+      <p:cxnSp>
+        <p:nvCxnSpPr>
+          <p:cNvPr id="1064" name="Straight Connector 1063">
+            <a:extLst>
+              <a:ext uri="{FF2B5EF4-FFF2-40B4-BE49-F238E27FC236}">
+                <a16:creationId xmlns:a16="http://schemas.microsoft.com/office/drawing/2014/main" id="{09322E27-DA1B-FBEF-510D-42D2EDFEF95B}"/>
+              </a:ext>
+            </a:extLst>
+          </p:cNvPr>
+          <p:cNvCxnSpPr>
+            <a:cxnSpLocks/>
+          </p:cNvCxnSpPr>
+          <p:nvPr/>
+        </p:nvCxnSpPr>
+        <p:spPr>
+          <a:xfrm>
+            <a:off x="598608" y="5260164"/>
+            <a:ext cx="599133" cy="0"/>
+          </a:xfrm>
+          <a:prstGeom prst="line">
+            <a:avLst/>
+          </a:prstGeom>
+          <a:ln w="38100">
+            <a:solidFill>
+              <a:schemeClr val="tx1"/>
+            </a:solidFill>
+          </a:ln>
+        </p:spPr>
+        <p:style>
+          <a:lnRef idx="2">
+            <a:schemeClr val="accent1"/>
+          </a:lnRef>
+          <a:fillRef idx="0">
+            <a:schemeClr val="accent1"/>
+          </a:fillRef>
+          <a:effectRef idx="1">
+            <a:schemeClr val="accent1"/>
+          </a:effectRef>
+          <a:fontRef idx="minor">
+            <a:schemeClr val="tx1"/>
+          </a:fontRef>
+        </p:style>
+      </p:cxnSp>
+      <p:sp>
+        <p:nvSpPr>
+          <p:cNvPr id="1077" name="Left Brace 1076">
+            <a:extLst>
+              <a:ext uri="{FF2B5EF4-FFF2-40B4-BE49-F238E27FC236}">
+                <a16:creationId xmlns:a16="http://schemas.microsoft.com/office/drawing/2014/main" id="{82D9F142-A933-070F-CF27-5B5CC3D66D72}"/>
+              </a:ext>
+            </a:extLst>
+          </p:cNvPr>
+          <p:cNvSpPr/>
+          <p:nvPr/>
+        </p:nvSpPr>
+        <p:spPr>
+          <a:xfrm rot="16200000">
+            <a:off x="9039721" y="4717844"/>
+            <a:ext cx="112068" cy="1308614"/>
+          </a:xfrm>
+          <a:prstGeom prst="leftBrace">
+            <a:avLst/>
+          </a:prstGeom>
+          <a:ln>
+            <a:solidFill>
+              <a:schemeClr val="tx1"/>
+            </a:solidFill>
+          </a:ln>
+        </p:spPr>
+        <p:style>
+          <a:lnRef idx="2">
+            <a:schemeClr val="accent1"/>
+          </a:lnRef>
+          <a:fillRef idx="0">
+            <a:schemeClr val="accent1"/>
+          </a:fillRef>
+          <a:effectRef idx="1">
+            <a:schemeClr val="accent1"/>
+          </a:effectRef>
+          <a:fontRef idx="minor">
+            <a:schemeClr val="tx1"/>
+          </a:fontRef>
+        </p:style>
+        <p:txBody>
+          <a:bodyPr rtlCol="0" anchor="ctr"/>
+          <a:lstStyle/>
+          <a:p>
+            <a:pPr algn="ctr"/>
+            <a:endParaRPr lang="en-US" dirty="0"/>
+          </a:p>
+        </p:txBody>
+      </p:sp>
+      <p:sp>
+        <p:nvSpPr>
+          <p:cNvPr id="1079" name="TextBox 1078">
+            <a:extLst>
+              <a:ext uri="{FF2B5EF4-FFF2-40B4-BE49-F238E27FC236}">
+                <a16:creationId xmlns:a16="http://schemas.microsoft.com/office/drawing/2014/main" id="{4413326B-4B17-C47D-7D2F-0EF9750798EE}"/>
+              </a:ext>
+            </a:extLst>
+          </p:cNvPr>
+          <p:cNvSpPr txBox="1"/>
+          <p:nvPr/>
+        </p:nvSpPr>
+        <p:spPr>
+          <a:xfrm>
+            <a:off x="8888078" y="5399478"/>
+            <a:ext cx="415353" cy="307777"/>
+          </a:xfrm>
+          <a:prstGeom prst="rect">
+            <a:avLst/>
+          </a:prstGeom>
+          <a:noFill/>
+        </p:spPr>
+        <p:txBody>
+          <a:bodyPr wrap="square" rtlCol="0">
+            <a:spAutoFit/>
+          </a:bodyPr>
+          <a:lstStyle/>
+          <a:p>
+            <a:r>
+              <a:rPr lang="en-US" sz="1400" i="1" dirty="0">
+                <a:latin typeface="Times New Roman" panose="02020603050405020304" pitchFamily="18" charset="0"/>
+                <a:cs typeface="Times New Roman" panose="02020603050405020304" pitchFamily="18" charset="0"/>
+              </a:rPr>
+              <a:t>R</a:t>
+            </a:r>
+            <a:r>
+              <a:rPr lang="en-US" sz="1400" i="1" baseline="-25000" dirty="0">
+                <a:latin typeface="Times New Roman" panose="02020603050405020304" pitchFamily="18" charset="0"/>
+                <a:cs typeface="Times New Roman" panose="02020603050405020304" pitchFamily="18" charset="0"/>
+              </a:rPr>
+              <a:t>D</a:t>
+            </a:r>
+          </a:p>
+        </p:txBody>
+      </p:sp>
+      <p:sp>
+        <p:nvSpPr>
+          <p:cNvPr id="1080" name="TextBox 1079">
+            <a:extLst>
+              <a:ext uri="{FF2B5EF4-FFF2-40B4-BE49-F238E27FC236}">
+                <a16:creationId xmlns:a16="http://schemas.microsoft.com/office/drawing/2014/main" id="{D1CFE8FF-67A2-02B4-FD32-7788B949C398}"/>
+              </a:ext>
+            </a:extLst>
+          </p:cNvPr>
+          <p:cNvSpPr txBox="1"/>
+          <p:nvPr/>
+        </p:nvSpPr>
+        <p:spPr>
+          <a:xfrm>
+            <a:off x="9334624" y="4943933"/>
+            <a:ext cx="830876" cy="307777"/>
+          </a:xfrm>
+          <a:prstGeom prst="rect">
+            <a:avLst/>
+          </a:prstGeom>
+          <a:noFill/>
+        </p:spPr>
+        <p:txBody>
+          <a:bodyPr wrap="square" rtlCol="0">
+            <a:spAutoFit/>
+          </a:bodyPr>
+          <a:lstStyle/>
+          <a:p>
+            <a:r>
+              <a:rPr lang="en-US" sz="1400" dirty="0">
+                <a:latin typeface="Times New Roman" panose="02020603050405020304" pitchFamily="18" charset="0"/>
+                <a:cs typeface="Times New Roman" panose="02020603050405020304" pitchFamily="18" charset="0"/>
+              </a:rPr>
+              <a:t>(</a:t>
+            </a:r>
+            <a:r>
+              <a:rPr lang="en-US" sz="1400" i="1" dirty="0">
+                <a:latin typeface="Times New Roman" panose="02020603050405020304" pitchFamily="18" charset="0"/>
+                <a:cs typeface="Times New Roman" panose="02020603050405020304" pitchFamily="18" charset="0"/>
+              </a:rPr>
+              <a:t>D</a:t>
+            </a:r>
+            <a:r>
+              <a:rPr lang="en-US" sz="1400" dirty="0">
+                <a:latin typeface="Times New Roman" panose="02020603050405020304" pitchFamily="18" charset="0"/>
+                <a:cs typeface="Times New Roman" panose="02020603050405020304" pitchFamily="18" charset="0"/>
+              </a:rPr>
+              <a:t>, 0, 0)</a:t>
+            </a:r>
+          </a:p>
+        </p:txBody>
+      </p:sp>
+      <p:cxnSp>
+        <p:nvCxnSpPr>
+          <p:cNvPr id="1084" name="Straight Arrow Connector 1083">
+            <a:extLst>
+              <a:ext uri="{FF2B5EF4-FFF2-40B4-BE49-F238E27FC236}">
+                <a16:creationId xmlns:a16="http://schemas.microsoft.com/office/drawing/2014/main" id="{218371BC-637C-36C2-FAD4-10E8CEBA58C0}"/>
+              </a:ext>
+            </a:extLst>
+          </p:cNvPr>
+          <p:cNvCxnSpPr>
+            <a:cxnSpLocks/>
+          </p:cNvCxnSpPr>
+          <p:nvPr/>
+        </p:nvCxnSpPr>
+        <p:spPr>
+          <a:xfrm flipH="1" flipV="1">
+            <a:off x="5771431" y="3409530"/>
+            <a:ext cx="2670017" cy="1318309"/>
+          </a:xfrm>
+          <a:prstGeom prst="straightConnector1">
+            <a:avLst/>
+          </a:prstGeom>
+          <a:ln>
+            <a:solidFill>
+              <a:schemeClr val="accent1">
+                <a:alpha val="75000"/>
+              </a:schemeClr>
+            </a:solidFill>
+            <a:prstDash val="dash"/>
+            <a:tailEnd type="triangle"/>
+          </a:ln>
+        </p:spPr>
+        <p:style>
+          <a:lnRef idx="2">
+            <a:schemeClr val="accent1"/>
+          </a:lnRef>
+          <a:fillRef idx="0">
+            <a:schemeClr val="accent1"/>
+          </a:fillRef>
+          <a:effectRef idx="1">
+            <a:schemeClr val="accent1"/>
+          </a:effectRef>
+          <a:fontRef idx="minor">
+            <a:schemeClr val="tx1"/>
+          </a:fontRef>
+        </p:style>
+      </p:cxnSp>
+      <p:cxnSp>
+        <p:nvCxnSpPr>
+          <p:cNvPr id="1086" name="Straight Arrow Connector 1085">
+            <a:extLst>
+              <a:ext uri="{FF2B5EF4-FFF2-40B4-BE49-F238E27FC236}">
+                <a16:creationId xmlns:a16="http://schemas.microsoft.com/office/drawing/2014/main" id="{5DCBCC2F-01A7-4C78-B2FB-B9B554A16B0E}"/>
+              </a:ext>
+            </a:extLst>
+          </p:cNvPr>
+          <p:cNvCxnSpPr>
+            <a:cxnSpLocks/>
+          </p:cNvCxnSpPr>
+          <p:nvPr/>
+        </p:nvCxnSpPr>
+        <p:spPr>
+          <a:xfrm flipH="1">
+            <a:off x="2072273" y="3429000"/>
+            <a:ext cx="3353946" cy="1549972"/>
+          </a:xfrm>
+          <a:prstGeom prst="straightConnector1">
+            <a:avLst/>
+          </a:prstGeom>
+          <a:ln>
+            <a:solidFill>
+              <a:schemeClr val="accent1">
+                <a:alpha val="75000"/>
+              </a:schemeClr>
+            </a:solidFill>
+            <a:prstDash val="dash"/>
+            <a:tailEnd type="triangle"/>
+          </a:ln>
+        </p:spPr>
+        <p:style>
+          <a:lnRef idx="2">
+            <a:schemeClr val="accent1"/>
+          </a:lnRef>
+          <a:fillRef idx="0">
+            <a:schemeClr val="accent1"/>
+          </a:fillRef>
+          <a:effectRef idx="1">
+            <a:schemeClr val="accent1"/>
+          </a:effectRef>
+          <a:fontRef idx="minor">
+            <a:schemeClr val="tx1"/>
+          </a:fontRef>
+        </p:style>
+      </p:cxnSp>
+      <p:sp>
+        <p:nvSpPr>
+          <p:cNvPr id="1089" name="TextBox 1088">
+            <a:extLst>
+              <a:ext uri="{FF2B5EF4-FFF2-40B4-BE49-F238E27FC236}">
+                <a16:creationId xmlns:a16="http://schemas.microsoft.com/office/drawing/2014/main" id="{9B070498-D588-67B1-5100-BF758FD99313}"/>
+              </a:ext>
+            </a:extLst>
+          </p:cNvPr>
+          <p:cNvSpPr txBox="1"/>
+          <p:nvPr/>
+        </p:nvSpPr>
+        <p:spPr>
+          <a:xfrm>
+            <a:off x="222367" y="4633098"/>
+            <a:ext cx="1124535" cy="307777"/>
+          </a:xfrm>
+          <a:prstGeom prst="rect">
+            <a:avLst/>
+          </a:prstGeom>
+          <a:noFill/>
+        </p:spPr>
+        <p:txBody>
+          <a:bodyPr wrap="square" rtlCol="0">
+            <a:spAutoFit/>
+          </a:bodyPr>
+          <a:lstStyle/>
+          <a:p>
+            <a:r>
+              <a:rPr lang="en-US" sz="1400" dirty="0">
+                <a:solidFill>
+                  <a:srgbClr val="FF0000"/>
+                </a:solidFill>
+                <a:latin typeface="Times New Roman" panose="02020603050405020304" pitchFamily="18" charset="0"/>
+                <a:cs typeface="Times New Roman" panose="02020603050405020304" pitchFamily="18" charset="0"/>
+              </a:rPr>
+              <a:t>Base station</a:t>
+            </a:r>
+          </a:p>
+        </p:txBody>
+      </p:sp>
+      <p:sp>
+        <p:nvSpPr>
+          <p:cNvPr id="1090" name="TextBox 1089">
+            <a:extLst>
+              <a:ext uri="{FF2B5EF4-FFF2-40B4-BE49-F238E27FC236}">
+                <a16:creationId xmlns:a16="http://schemas.microsoft.com/office/drawing/2014/main" id="{E3F450EC-8F5E-617C-31CE-697EAADD9C3C}"/>
+              </a:ext>
+            </a:extLst>
+          </p:cNvPr>
+          <p:cNvSpPr txBox="1"/>
+          <p:nvPr/>
+        </p:nvSpPr>
+        <p:spPr>
+          <a:xfrm>
+            <a:off x="5371426" y="2791143"/>
+            <a:ext cx="562452" cy="307777"/>
+          </a:xfrm>
+          <a:prstGeom prst="rect">
+            <a:avLst/>
+          </a:prstGeom>
+          <a:noFill/>
+        </p:spPr>
+        <p:txBody>
+          <a:bodyPr wrap="square" rtlCol="0">
+            <a:spAutoFit/>
+          </a:bodyPr>
+          <a:lstStyle/>
+          <a:p>
+            <a:r>
+              <a:rPr lang="en-US" sz="1400" dirty="0">
+                <a:solidFill>
+                  <a:srgbClr val="FF0000"/>
+                </a:solidFill>
+                <a:latin typeface="Times New Roman" panose="02020603050405020304" pitchFamily="18" charset="0"/>
+                <a:cs typeface="Times New Roman" panose="02020603050405020304" pitchFamily="18" charset="0"/>
+              </a:rPr>
+              <a:t>UAV</a:t>
+            </a:r>
+          </a:p>
+        </p:txBody>
+      </p:sp>
+      <p:sp>
+        <p:nvSpPr>
+          <p:cNvPr id="1091" name="TextBox 1090">
+            <a:extLst>
+              <a:ext uri="{FF2B5EF4-FFF2-40B4-BE49-F238E27FC236}">
+                <a16:creationId xmlns:a16="http://schemas.microsoft.com/office/drawing/2014/main" id="{9861EFA3-E621-B0D9-3213-3D760CAE9AB4}"/>
+              </a:ext>
+            </a:extLst>
+          </p:cNvPr>
+          <p:cNvSpPr txBox="1"/>
+          <p:nvPr/>
+        </p:nvSpPr>
+        <p:spPr>
+          <a:xfrm>
+            <a:off x="9157922" y="4143471"/>
+            <a:ext cx="1184279" cy="307777"/>
+          </a:xfrm>
+          <a:prstGeom prst="rect">
+            <a:avLst/>
+          </a:prstGeom>
+          <a:noFill/>
+        </p:spPr>
+        <p:txBody>
+          <a:bodyPr wrap="square" rtlCol="0">
+            <a:spAutoFit/>
+          </a:bodyPr>
+          <a:lstStyle/>
+          <a:p>
+            <a:r>
+              <a:rPr lang="en-US" sz="1400" dirty="0">
+                <a:solidFill>
+                  <a:srgbClr val="FF0000"/>
+                </a:solidFill>
+                <a:latin typeface="Times New Roman" panose="02020603050405020304" pitchFamily="18" charset="0"/>
+                <a:cs typeface="Times New Roman" panose="02020603050405020304" pitchFamily="18" charset="0"/>
+              </a:rPr>
+              <a:t>Ground users</a:t>
+            </a:r>
+          </a:p>
+        </p:txBody>
+      </p:sp>
+      <p:sp>
+        <p:nvSpPr>
+          <p:cNvPr id="1092" name="TextBox 1091">
+            <a:extLst>
+              <a:ext uri="{FF2B5EF4-FFF2-40B4-BE49-F238E27FC236}">
+                <a16:creationId xmlns:a16="http://schemas.microsoft.com/office/drawing/2014/main" id="{C74B85CE-3F46-01E9-7A43-4C59422E4A71}"/>
+              </a:ext>
+            </a:extLst>
+          </p:cNvPr>
+          <p:cNvSpPr txBox="1"/>
+          <p:nvPr/>
+        </p:nvSpPr>
+        <p:spPr>
+          <a:xfrm>
+            <a:off x="7134004" y="4312748"/>
+            <a:ext cx="406400" cy="276999"/>
+          </a:xfrm>
+          <a:prstGeom prst="rect">
+            <a:avLst/>
+          </a:prstGeom>
+          <a:noFill/>
+        </p:spPr>
+        <p:txBody>
+          <a:bodyPr wrap="square" rtlCol="0">
+            <a:spAutoFit/>
+          </a:bodyPr>
+          <a:lstStyle/>
+          <a:p>
+            <a:r>
+              <a:rPr lang="en-US" sz="1200" dirty="0">
+                <a:solidFill>
+                  <a:schemeClr val="accent1"/>
+                </a:solidFill>
+                <a:latin typeface="Times New Roman" panose="02020603050405020304" pitchFamily="18" charset="0"/>
+                <a:cs typeface="Times New Roman" panose="02020603050405020304" pitchFamily="18" charset="0"/>
+              </a:rPr>
+              <a:t>UA</a:t>
+            </a:r>
+          </a:p>
+        </p:txBody>
+      </p:sp>
+      <p:sp>
+        <p:nvSpPr>
+          <p:cNvPr id="1093" name="TextBox 1092">
+            <a:extLst>
+              <a:ext uri="{FF2B5EF4-FFF2-40B4-BE49-F238E27FC236}">
+                <a16:creationId xmlns:a16="http://schemas.microsoft.com/office/drawing/2014/main" id="{CC88519B-38A4-8FB7-007B-13DBD2D48706}"/>
+              </a:ext>
+            </a:extLst>
+          </p:cNvPr>
+          <p:cNvSpPr txBox="1"/>
+          <p:nvPr/>
+        </p:nvSpPr>
+        <p:spPr>
+          <a:xfrm>
+            <a:off x="3539696" y="4317371"/>
+            <a:ext cx="419100" cy="276999"/>
+          </a:xfrm>
+          <a:prstGeom prst="rect">
+            <a:avLst/>
+          </a:prstGeom>
+          <a:noFill/>
+        </p:spPr>
+        <p:txBody>
+          <a:bodyPr wrap="square" rtlCol="0">
+            <a:spAutoFit/>
+          </a:bodyPr>
+          <a:lstStyle/>
+          <a:p>
+            <a:r>
+              <a:rPr lang="en-US" sz="1200" dirty="0">
+                <a:solidFill>
+                  <a:schemeClr val="accent1"/>
+                </a:solidFill>
+                <a:latin typeface="Times New Roman" panose="02020603050405020304" pitchFamily="18" charset="0"/>
+                <a:cs typeface="Times New Roman" panose="02020603050405020304" pitchFamily="18" charset="0"/>
+              </a:rPr>
+              <a:t>AB</a:t>
+            </a:r>
+          </a:p>
+        </p:txBody>
+      </p:sp>
+      <p:cxnSp>
+        <p:nvCxnSpPr>
+          <p:cNvPr id="1116" name="Straight Connector 1115">
+            <a:extLst>
+              <a:ext uri="{FF2B5EF4-FFF2-40B4-BE49-F238E27FC236}">
+                <a16:creationId xmlns:a16="http://schemas.microsoft.com/office/drawing/2014/main" id="{628C281E-8D75-894C-A57B-7C600FEDEF68}"/>
+              </a:ext>
+            </a:extLst>
+          </p:cNvPr>
+          <p:cNvCxnSpPr>
+            <a:stCxn id="34" idx="2"/>
+            <a:endCxn id="63" idx="2"/>
+          </p:cNvCxnSpPr>
+          <p:nvPr/>
+        </p:nvCxnSpPr>
+        <p:spPr>
+          <a:xfrm flipV="1">
+            <a:off x="8441448" y="5255489"/>
+            <a:ext cx="1276864" cy="3780"/>
+          </a:xfrm>
+          <a:prstGeom prst="line">
+            <a:avLst/>
+          </a:prstGeom>
+          <a:ln w="38100">
+            <a:solidFill>
+              <a:srgbClr val="FF0000"/>
+            </a:solidFill>
+            <a:prstDash val="sysDot"/>
+          </a:ln>
+        </p:spPr>
+        <p:style>
+          <a:lnRef idx="2">
+            <a:schemeClr val="accent1"/>
+          </a:lnRef>
+          <a:fillRef idx="0">
+            <a:schemeClr val="accent1"/>
+          </a:fillRef>
+          <a:effectRef idx="1">
+            <a:schemeClr val="accent1"/>
+          </a:effectRef>
+          <a:fontRef idx="minor">
+            <a:schemeClr val="tx1"/>
+          </a:fontRef>
+        </p:style>
+      </p:cxnSp>
+    </p:spTree>
+    <p:extLst>
+      <p:ext uri="{BB962C8B-B14F-4D97-AF65-F5344CB8AC3E}">
+        <p14:creationId xmlns:p14="http://schemas.microsoft.com/office/powerpoint/2010/main" val="429722824"/>
       </p:ext>
     </p:extLst>
   </p:cSld>
@@ -4983,4 +6974,319 @@
     </a:ext>
   </a:extLst>
 </a:theme>
+</file>
+
+<file path=ppt/theme/theme2.xml><?xml version="1.0" encoding="utf-8"?>
+<a:theme xmlns:a="http://schemas.openxmlformats.org/drawingml/2006/main" name="Office Theme">
+  <a:themeElements>
+    <a:clrScheme name="Office">
+      <a:dk1>
+        <a:sysClr val="windowText" lastClr="000000"/>
+      </a:dk1>
+      <a:lt1>
+        <a:sysClr val="window" lastClr="FFFFFF"/>
+      </a:lt1>
+      <a:dk2>
+        <a:srgbClr val="0E2841"/>
+      </a:dk2>
+      <a:lt2>
+        <a:srgbClr val="E8E8E8"/>
+      </a:lt2>
+      <a:accent1>
+        <a:srgbClr val="156082"/>
+      </a:accent1>
+      <a:accent2>
+        <a:srgbClr val="E97132"/>
+      </a:accent2>
+      <a:accent3>
+        <a:srgbClr val="196B24"/>
+      </a:accent3>
+      <a:accent4>
+        <a:srgbClr val="0F9ED5"/>
+      </a:accent4>
+      <a:accent5>
+        <a:srgbClr val="A02B93"/>
+      </a:accent5>
+      <a:accent6>
+        <a:srgbClr val="4EA72E"/>
+      </a:accent6>
+      <a:hlink>
+        <a:srgbClr val="467886"/>
+      </a:hlink>
+      <a:folHlink>
+        <a:srgbClr val="96607D"/>
+      </a:folHlink>
+    </a:clrScheme>
+    <a:fontScheme name="Office">
+      <a:majorFont>
+        <a:latin typeface="Aptos Display" panose="02110004020202020204"/>
+        <a:ea typeface=""/>
+        <a:cs typeface=""/>
+        <a:font script="Jpan" typeface="游ゴシック Light"/>
+        <a:font script="Hang" typeface="맑은 고딕"/>
+        <a:font script="Hans" typeface="等线 Light"/>
+        <a:font script="Hant" typeface="新細明體"/>
+        <a:font script="Arab" typeface="Times New Roman"/>
+        <a:font script="Hebr" typeface="Times New Roman"/>
+        <a:font script="Thai" typeface="Angsana New"/>
+        <a:font script="Ethi" typeface="Nyala"/>
+        <a:font script="Beng" typeface="Vrinda"/>
+        <a:font script="Gujr" typeface="Shruti"/>
+        <a:font script="Khmr" typeface="MoolBoran"/>
+        <a:font script="Knda" typeface="Tunga"/>
+        <a:font script="Guru" typeface="Raavi"/>
+        <a:font script="Cans" typeface="Euphemia"/>
+        <a:font script="Cher" typeface="Plantagenet Cherokee"/>
+        <a:font script="Yiii" typeface="Microsoft Yi Baiti"/>
+        <a:font script="Tibt" typeface="Microsoft Himalaya"/>
+        <a:font script="Thaa" typeface="MV Boli"/>
+        <a:font script="Deva" typeface="Mangal"/>
+        <a:font script="Telu" typeface="Gautami"/>
+        <a:font script="Taml" typeface="Latha"/>
+        <a:font script="Syrc" typeface="Estrangelo Edessa"/>
+        <a:font script="Orya" typeface="Kalinga"/>
+        <a:font script="Mlym" typeface="Kartika"/>
+        <a:font script="Laoo" typeface="DokChampa"/>
+        <a:font script="Sinh" typeface="Iskoola Pota"/>
+        <a:font script="Mong" typeface="Mongolian Baiti"/>
+        <a:font script="Viet" typeface="Times New Roman"/>
+        <a:font script="Uigh" typeface="Microsoft Uighur"/>
+        <a:font script="Geor" typeface="Sylfaen"/>
+        <a:font script="Armn" typeface="Arial"/>
+        <a:font script="Bugi" typeface="Leelawadee UI"/>
+        <a:font script="Bopo" typeface="Microsoft JhengHei"/>
+        <a:font script="Java" typeface="Javanese Text"/>
+        <a:font script="Lisu" typeface="Segoe UI"/>
+        <a:font script="Mymr" typeface="Myanmar Text"/>
+        <a:font script="Nkoo" typeface="Ebrima"/>
+        <a:font script="Olck" typeface="Nirmala UI"/>
+        <a:font script="Osma" typeface="Ebrima"/>
+        <a:font script="Phag" typeface="Phagspa"/>
+        <a:font script="Syrn" typeface="Estrangelo Edessa"/>
+        <a:font script="Syrj" typeface="Estrangelo Edessa"/>
+        <a:font script="Syre" typeface="Estrangelo Edessa"/>
+        <a:font script="Sora" typeface="Nirmala UI"/>
+        <a:font script="Tale" typeface="Microsoft Tai Le"/>
+        <a:font script="Talu" typeface="Microsoft New Tai Lue"/>
+        <a:font script="Tfng" typeface="Ebrima"/>
+      </a:majorFont>
+      <a:minorFont>
+        <a:latin typeface="Aptos" panose="02110004020202020204"/>
+        <a:ea typeface=""/>
+        <a:cs typeface=""/>
+        <a:font script="Jpan" typeface="游ゴシック"/>
+        <a:font script="Hang" typeface="맑은 고딕"/>
+        <a:font script="Hans" typeface="等线"/>
+        <a:font script="Hant" typeface="新細明體"/>
+        <a:font script="Arab" typeface="Arial"/>
+        <a:font script="Hebr" typeface="Arial"/>
+        <a:font script="Thai" typeface="Cordia New"/>
+        <a:font script="Ethi" typeface="Nyala"/>
+        <a:font script="Beng" typeface="Vrinda"/>
+        <a:font script="Gujr" typeface="Shruti"/>
+        <a:font script="Khmr" typeface="DaunPenh"/>
+        <a:font script="Knda" typeface="Tunga"/>
+        <a:font script="Guru" typeface="Raavi"/>
+        <a:font script="Cans" typeface="Euphemia"/>
+        <a:font script="Cher" typeface="Plantagenet Cherokee"/>
+        <a:font script="Yiii" typeface="Microsoft Yi Baiti"/>
+        <a:font script="Tibt" typeface="Microsoft Himalaya"/>
+        <a:font script="Thaa" typeface="MV Boli"/>
+        <a:font script="Deva" typeface="Mangal"/>
+        <a:font script="Telu" typeface="Gautami"/>
+        <a:font script="Taml" typeface="Latha"/>
+        <a:font script="Syrc" typeface="Estrangelo Edessa"/>
+        <a:font script="Orya" typeface="Kalinga"/>
+        <a:font script="Mlym" typeface="Kartika"/>
+        <a:font script="Laoo" typeface="DokChampa"/>
+        <a:font script="Sinh" typeface="Iskoola Pota"/>
+        <a:font script="Mong" typeface="Mongolian Baiti"/>
+        <a:font script="Viet" typeface="Arial"/>
+        <a:font script="Uigh" typeface="Microsoft Uighur"/>
+        <a:font script="Geor" typeface="Sylfaen"/>
+        <a:font script="Armn" typeface="Arial"/>
+        <a:font script="Bugi" typeface="Leelawadee UI"/>
+        <a:font script="Bopo" typeface="Microsoft JhengHei"/>
+        <a:font script="Java" typeface="Javanese Text"/>
+        <a:font script="Lisu" typeface="Segoe UI"/>
+        <a:font script="Mymr" typeface="Myanmar Text"/>
+        <a:font script="Nkoo" typeface="Ebrima"/>
+        <a:font script="Olck" typeface="Nirmala UI"/>
+        <a:font script="Osma" typeface="Ebrima"/>
+        <a:font script="Phag" typeface="Phagspa"/>
+        <a:font script="Syrn" typeface="Estrangelo Edessa"/>
+        <a:font script="Syrj" typeface="Estrangelo Edessa"/>
+        <a:font script="Syre" typeface="Estrangelo Edessa"/>
+        <a:font script="Sora" typeface="Nirmala UI"/>
+        <a:font script="Tale" typeface="Microsoft Tai Le"/>
+        <a:font script="Talu" typeface="Microsoft New Tai Lue"/>
+        <a:font script="Tfng" typeface="Ebrima"/>
+      </a:minorFont>
+    </a:fontScheme>
+    <a:fmtScheme name="Office">
+      <a:fillStyleLst>
+        <a:solidFill>
+          <a:schemeClr val="phClr"/>
+        </a:solidFill>
+        <a:gradFill rotWithShape="1">
+          <a:gsLst>
+            <a:gs pos="0">
+              <a:schemeClr val="phClr">
+                <a:lumMod val="110000"/>
+                <a:satMod val="105000"/>
+                <a:tint val="67000"/>
+              </a:schemeClr>
+            </a:gs>
+            <a:gs pos="50000">
+              <a:schemeClr val="phClr">
+                <a:lumMod val="105000"/>
+                <a:satMod val="103000"/>
+                <a:tint val="73000"/>
+              </a:schemeClr>
+            </a:gs>
+            <a:gs pos="100000">
+              <a:schemeClr val="phClr">
+                <a:lumMod val="105000"/>
+                <a:satMod val="109000"/>
+                <a:tint val="81000"/>
+              </a:schemeClr>
+            </a:gs>
+          </a:gsLst>
+          <a:lin ang="5400000" scaled="0"/>
+        </a:gradFill>
+        <a:gradFill rotWithShape="1">
+          <a:gsLst>
+            <a:gs pos="0">
+              <a:schemeClr val="phClr">
+                <a:satMod val="103000"/>
+                <a:lumMod val="102000"/>
+                <a:tint val="94000"/>
+              </a:schemeClr>
+            </a:gs>
+            <a:gs pos="50000">
+              <a:schemeClr val="phClr">
+                <a:satMod val="110000"/>
+                <a:lumMod val="100000"/>
+                <a:shade val="100000"/>
+              </a:schemeClr>
+            </a:gs>
+            <a:gs pos="100000">
+              <a:schemeClr val="phClr">
+                <a:lumMod val="99000"/>
+                <a:satMod val="120000"/>
+                <a:shade val="78000"/>
+              </a:schemeClr>
+            </a:gs>
+          </a:gsLst>
+          <a:lin ang="5400000" scaled="0"/>
+        </a:gradFill>
+      </a:fillStyleLst>
+      <a:lnStyleLst>
+        <a:ln w="12700" cap="flat" cmpd="sng" algn="ctr">
+          <a:solidFill>
+            <a:schemeClr val="phClr"/>
+          </a:solidFill>
+          <a:prstDash val="solid"/>
+          <a:miter lim="800000"/>
+        </a:ln>
+        <a:ln w="19050" cap="flat" cmpd="sng" algn="ctr">
+          <a:solidFill>
+            <a:schemeClr val="phClr"/>
+          </a:solidFill>
+          <a:prstDash val="solid"/>
+          <a:miter lim="800000"/>
+        </a:ln>
+        <a:ln w="25400" cap="flat" cmpd="sng" algn="ctr">
+          <a:solidFill>
+            <a:schemeClr val="phClr"/>
+          </a:solidFill>
+          <a:prstDash val="solid"/>
+          <a:miter lim="800000"/>
+        </a:ln>
+      </a:lnStyleLst>
+      <a:effectStyleLst>
+        <a:effectStyle>
+          <a:effectLst/>
+        </a:effectStyle>
+        <a:effectStyle>
+          <a:effectLst/>
+        </a:effectStyle>
+        <a:effectStyle>
+          <a:effectLst>
+            <a:outerShdw blurRad="57150" dist="19050" dir="5400000" algn="ctr" rotWithShape="0">
+              <a:srgbClr val="000000">
+                <a:alpha val="63000"/>
+              </a:srgbClr>
+            </a:outerShdw>
+          </a:effectLst>
+        </a:effectStyle>
+      </a:effectStyleLst>
+      <a:bgFillStyleLst>
+        <a:solidFill>
+          <a:schemeClr val="phClr"/>
+        </a:solidFill>
+        <a:solidFill>
+          <a:schemeClr val="phClr">
+            <a:tint val="95000"/>
+            <a:satMod val="170000"/>
+          </a:schemeClr>
+        </a:solidFill>
+        <a:gradFill rotWithShape="1">
+          <a:gsLst>
+            <a:gs pos="0">
+              <a:schemeClr val="phClr">
+                <a:tint val="93000"/>
+                <a:satMod val="150000"/>
+                <a:shade val="98000"/>
+                <a:lumMod val="102000"/>
+              </a:schemeClr>
+            </a:gs>
+            <a:gs pos="50000">
+              <a:schemeClr val="phClr">
+                <a:tint val="98000"/>
+                <a:satMod val="130000"/>
+                <a:shade val="90000"/>
+                <a:lumMod val="103000"/>
+              </a:schemeClr>
+            </a:gs>
+            <a:gs pos="100000">
+              <a:schemeClr val="phClr">
+                <a:shade val="63000"/>
+                <a:satMod val="120000"/>
+              </a:schemeClr>
+            </a:gs>
+          </a:gsLst>
+          <a:lin ang="5400000" scaled="0"/>
+        </a:gradFill>
+      </a:bgFillStyleLst>
+    </a:fmtScheme>
+  </a:themeElements>
+  <a:objectDefaults>
+    <a:lnDef>
+      <a:spPr/>
+      <a:bodyPr/>
+      <a:lstStyle/>
+      <a:style>
+        <a:lnRef idx="2">
+          <a:schemeClr val="accent1"/>
+        </a:lnRef>
+        <a:fillRef idx="0">
+          <a:schemeClr val="accent1"/>
+        </a:fillRef>
+        <a:effectRef idx="1">
+          <a:schemeClr val="accent1"/>
+        </a:effectRef>
+        <a:fontRef idx="minor">
+          <a:schemeClr val="tx1"/>
+        </a:fontRef>
+      </a:style>
+    </a:lnDef>
+  </a:objectDefaults>
+  <a:extraClrSchemeLst/>
+  <a:extLst>
+    <a:ext uri="{05A4C25C-085E-4340-85A3-A5531E510DB2}">
+      <thm15:themeFamily xmlns:thm15="http://schemas.microsoft.com/office/thememl/2012/main" name="Office Theme" id="{2E142A2C-CD16-42D6-873A-C26D2A0506FA}" vid="{1BDDFF52-6CD6-40A5-AB3C-68EB2F1E4D0A}"/>
+    </a:ext>
+  </a:extLst>
+</a:theme>
 </file>
</xml_diff>

<commit_message>
Added slide with new proposed system model
</commit_message>
<xml_diff>
--- a/system-model.pptx
+++ b/system-model.pptx
@@ -5,11 +5,12 @@
     <p:sldMasterId id="2147483648" r:id="rId1"/>
   </p:sldMasterIdLst>
   <p:notesMasterIdLst>
-    <p:notesMasterId r:id="rId4"/>
+    <p:notesMasterId r:id="rId5"/>
   </p:notesMasterIdLst>
   <p:sldIdLst>
     <p:sldId id="257" r:id="rId2"/>
     <p:sldId id="258" r:id="rId3"/>
+    <p:sldId id="259" r:id="rId4"/>
   </p:sldIdLst>
   <p:sldSz cx="12192000" cy="6858000"/>
   <p:notesSz cx="6858000" cy="9144000"/>
@@ -209,7 +210,7 @@
           <a:p>
             <a:fld id="{F4C6F557-F08E-854B-AE48-783F54BBE294}" type="datetimeFigureOut">
               <a:rPr lang="en-US" smtClean="0"/>
-              <a:t>7/31/25</a:t>
+              <a:t>9/12/25</a:t>
             </a:fld>
             <a:endParaRPr lang="en-US"/>
           </a:p>
@@ -560,6 +561,114 @@
 </p:notes>
 </file>
 
+<file path=ppt/notesSlides/notesSlide2.xml><?xml version="1.0" encoding="utf-8"?>
+<p:notes xmlns:a="http://schemas.openxmlformats.org/drawingml/2006/main" xmlns:r="http://schemas.openxmlformats.org/officeDocument/2006/relationships" xmlns:p="http://schemas.openxmlformats.org/presentationml/2006/main">
+  <p:cSld>
+    <p:spTree>
+      <p:nvGrpSpPr>
+        <p:cNvPr id="1" name="">
+          <a:extLst>
+            <a:ext uri="{FF2B5EF4-FFF2-40B4-BE49-F238E27FC236}">
+              <a16:creationId xmlns:a16="http://schemas.microsoft.com/office/drawing/2014/main" id="{EEF1E2FE-B005-D6AC-945F-626AA1169FBD}"/>
+            </a:ext>
+          </a:extLst>
+        </p:cNvPr>
+        <p:cNvGrpSpPr/>
+        <p:nvPr/>
+      </p:nvGrpSpPr>
+      <p:grpSpPr>
+        <a:xfrm>
+          <a:off x="0" y="0"/>
+          <a:ext cx="0" cy="0"/>
+          <a:chOff x="0" y="0"/>
+          <a:chExt cx="0" cy="0"/>
+        </a:xfrm>
+      </p:grpSpPr>
+      <p:sp>
+        <p:nvSpPr>
+          <p:cNvPr id="2" name="Slide Image Placeholder 1">
+            <a:extLst>
+              <a:ext uri="{FF2B5EF4-FFF2-40B4-BE49-F238E27FC236}">
+                <a16:creationId xmlns:a16="http://schemas.microsoft.com/office/drawing/2014/main" id="{C11F7A22-6602-C904-DE06-D7A8F58AC357}"/>
+              </a:ext>
+            </a:extLst>
+          </p:cNvPr>
+          <p:cNvSpPr>
+            <a:spLocks noGrp="1" noRot="1" noChangeAspect="1"/>
+          </p:cNvSpPr>
+          <p:nvPr>
+            <p:ph type="sldImg"/>
+          </p:nvPr>
+        </p:nvSpPr>
+        <p:spPr/>
+      </p:sp>
+      <p:sp>
+        <p:nvSpPr>
+          <p:cNvPr id="3" name="Notes Placeholder 2">
+            <a:extLst>
+              <a:ext uri="{FF2B5EF4-FFF2-40B4-BE49-F238E27FC236}">
+                <a16:creationId xmlns:a16="http://schemas.microsoft.com/office/drawing/2014/main" id="{C7AC697F-9524-848C-F9B9-D3ABFE2B9224}"/>
+              </a:ext>
+            </a:extLst>
+          </p:cNvPr>
+          <p:cNvSpPr>
+            <a:spLocks noGrp="1"/>
+          </p:cNvSpPr>
+          <p:nvPr>
+            <p:ph type="body" idx="1"/>
+          </p:nvPr>
+        </p:nvSpPr>
+        <p:spPr/>
+        <p:txBody>
+          <a:bodyPr/>
+          <a:lstStyle/>
+          <a:p>
+            <a:endParaRPr lang="en-US" dirty="0"/>
+          </a:p>
+        </p:txBody>
+      </p:sp>
+      <p:sp>
+        <p:nvSpPr>
+          <p:cNvPr id="4" name="Slide Number Placeholder 3">
+            <a:extLst>
+              <a:ext uri="{FF2B5EF4-FFF2-40B4-BE49-F238E27FC236}">
+                <a16:creationId xmlns:a16="http://schemas.microsoft.com/office/drawing/2014/main" id="{878B6CBF-4847-C9C4-C928-230573E2C781}"/>
+              </a:ext>
+            </a:extLst>
+          </p:cNvPr>
+          <p:cNvSpPr>
+            <a:spLocks noGrp="1"/>
+          </p:cNvSpPr>
+          <p:nvPr>
+            <p:ph type="sldNum" sz="quarter" idx="5"/>
+          </p:nvPr>
+        </p:nvSpPr>
+        <p:spPr/>
+        <p:txBody>
+          <a:bodyPr/>
+          <a:lstStyle/>
+          <a:p>
+            <a:fld id="{DEB63DFA-00F7-EA4E-9BDC-B3579D9222AC}" type="slidenum">
+              <a:rPr lang="en-US" smtClean="0"/>
+              <a:t>3</a:t>
+            </a:fld>
+            <a:endParaRPr lang="en-US"/>
+          </a:p>
+        </p:txBody>
+      </p:sp>
+    </p:spTree>
+    <p:extLst>
+      <p:ext uri="{BB962C8B-B14F-4D97-AF65-F5344CB8AC3E}">
+        <p14:creationId xmlns:p14="http://schemas.microsoft.com/office/powerpoint/2010/main" val="731813603"/>
+      </p:ext>
+    </p:extLst>
+  </p:cSld>
+  <p:clrMapOvr>
+    <a:masterClrMapping/>
+  </p:clrMapOvr>
+</p:notes>
+</file>
+
 <file path=ppt/slideLayouts/slideLayout1.xml><?xml version="1.0" encoding="utf-8"?>
 <p:sldLayout xmlns:a="http://schemas.openxmlformats.org/drawingml/2006/main" xmlns:r="http://schemas.openxmlformats.org/officeDocument/2006/relationships" xmlns:p="http://schemas.openxmlformats.org/presentationml/2006/main" type="title" preserve="1">
   <p:cSld name="Title Slide">
@@ -707,7 +816,7 @@
           <a:p>
             <a:fld id="{0F4F3A10-1BBF-094E-8EF1-BA4BA81AAF48}" type="datetimeFigureOut">
               <a:rPr lang="en-US" smtClean="0"/>
-              <a:t>7/31/25</a:t>
+              <a:t>9/12/25</a:t>
             </a:fld>
             <a:endParaRPr lang="en-US"/>
           </a:p>
@@ -905,7 +1014,7 @@
           <a:p>
             <a:fld id="{0F4F3A10-1BBF-094E-8EF1-BA4BA81AAF48}" type="datetimeFigureOut">
               <a:rPr lang="en-US" smtClean="0"/>
-              <a:t>7/31/25</a:t>
+              <a:t>9/12/25</a:t>
             </a:fld>
             <a:endParaRPr lang="en-US"/>
           </a:p>
@@ -1113,7 +1222,7 @@
           <a:p>
             <a:fld id="{0F4F3A10-1BBF-094E-8EF1-BA4BA81AAF48}" type="datetimeFigureOut">
               <a:rPr lang="en-US" smtClean="0"/>
-              <a:t>7/31/25</a:t>
+              <a:t>9/12/25</a:t>
             </a:fld>
             <a:endParaRPr lang="en-US"/>
           </a:p>
@@ -1311,7 +1420,7 @@
           <a:p>
             <a:fld id="{0F4F3A10-1BBF-094E-8EF1-BA4BA81AAF48}" type="datetimeFigureOut">
               <a:rPr lang="en-US" smtClean="0"/>
-              <a:t>7/31/25</a:t>
+              <a:t>9/12/25</a:t>
             </a:fld>
             <a:endParaRPr lang="en-US"/>
           </a:p>
@@ -1586,7 +1695,7 @@
           <a:p>
             <a:fld id="{0F4F3A10-1BBF-094E-8EF1-BA4BA81AAF48}" type="datetimeFigureOut">
               <a:rPr lang="en-US" smtClean="0"/>
-              <a:t>7/31/25</a:t>
+              <a:t>9/12/25</a:t>
             </a:fld>
             <a:endParaRPr lang="en-US"/>
           </a:p>
@@ -1851,7 +1960,7 @@
           <a:p>
             <a:fld id="{0F4F3A10-1BBF-094E-8EF1-BA4BA81AAF48}" type="datetimeFigureOut">
               <a:rPr lang="en-US" smtClean="0"/>
-              <a:t>7/31/25</a:t>
+              <a:t>9/12/25</a:t>
             </a:fld>
             <a:endParaRPr lang="en-US"/>
           </a:p>
@@ -2263,7 +2372,7 @@
           <a:p>
             <a:fld id="{0F4F3A10-1BBF-094E-8EF1-BA4BA81AAF48}" type="datetimeFigureOut">
               <a:rPr lang="en-US" smtClean="0"/>
-              <a:t>7/31/25</a:t>
+              <a:t>9/12/25</a:t>
             </a:fld>
             <a:endParaRPr lang="en-US"/>
           </a:p>
@@ -2404,7 +2513,7 @@
           <a:p>
             <a:fld id="{0F4F3A10-1BBF-094E-8EF1-BA4BA81AAF48}" type="datetimeFigureOut">
               <a:rPr lang="en-US" smtClean="0"/>
-              <a:t>7/31/25</a:t>
+              <a:t>9/12/25</a:t>
             </a:fld>
             <a:endParaRPr lang="en-US"/>
           </a:p>
@@ -2517,7 +2626,7 @@
           <a:p>
             <a:fld id="{0F4F3A10-1BBF-094E-8EF1-BA4BA81AAF48}" type="datetimeFigureOut">
               <a:rPr lang="en-US" smtClean="0"/>
-              <a:t>7/31/25</a:t>
+              <a:t>9/12/25</a:t>
             </a:fld>
             <a:endParaRPr lang="en-US"/>
           </a:p>
@@ -2828,7 +2937,7 @@
           <a:p>
             <a:fld id="{0F4F3A10-1BBF-094E-8EF1-BA4BA81AAF48}" type="datetimeFigureOut">
               <a:rPr lang="en-US" smtClean="0"/>
-              <a:t>7/31/25</a:t>
+              <a:t>9/12/25</a:t>
             </a:fld>
             <a:endParaRPr lang="en-US"/>
           </a:p>
@@ -3116,7 +3225,7 @@
           <a:p>
             <a:fld id="{0F4F3A10-1BBF-094E-8EF1-BA4BA81AAF48}" type="datetimeFigureOut">
               <a:rPr lang="en-US" smtClean="0"/>
-              <a:t>7/31/25</a:t>
+              <a:t>9/12/25</a:t>
             </a:fld>
             <a:endParaRPr lang="en-US"/>
           </a:p>
@@ -3357,7 +3466,7 @@
           <a:p>
             <a:fld id="{0F4F3A10-1BBF-094E-8EF1-BA4BA81AAF48}" type="datetimeFigureOut">
               <a:rPr lang="en-US" smtClean="0"/>
-              <a:t>7/31/25</a:t>
+              <a:t>9/12/25</a:t>
             </a:fld>
             <a:endParaRPr lang="en-US"/>
           </a:p>
@@ -6459,6 +6568,700 @@
     <p:extLst>
       <p:ext uri="{BB962C8B-B14F-4D97-AF65-F5344CB8AC3E}">
         <p14:creationId xmlns:p14="http://schemas.microsoft.com/office/powerpoint/2010/main" val="429722824"/>
+      </p:ext>
+    </p:extLst>
+  </p:cSld>
+  <p:clrMapOvr>
+    <a:masterClrMapping/>
+  </p:clrMapOvr>
+</p:sld>
+</file>
+
+<file path=ppt/slides/slide3.xml><?xml version="1.0" encoding="utf-8"?>
+<p:sld xmlns:a="http://schemas.openxmlformats.org/drawingml/2006/main" xmlns:r="http://schemas.openxmlformats.org/officeDocument/2006/relationships" xmlns:p="http://schemas.openxmlformats.org/presentationml/2006/main">
+  <p:cSld>
+    <p:spTree>
+      <p:nvGrpSpPr>
+        <p:cNvPr id="1" name="">
+          <a:extLst>
+            <a:ext uri="{FF2B5EF4-FFF2-40B4-BE49-F238E27FC236}">
+              <a16:creationId xmlns:a16="http://schemas.microsoft.com/office/drawing/2014/main" id="{6B0B4F72-B0B2-91D3-0467-1B25C3A6FE19}"/>
+            </a:ext>
+          </a:extLst>
+        </p:cNvPr>
+        <p:cNvGrpSpPr/>
+        <p:nvPr/>
+      </p:nvGrpSpPr>
+      <p:grpSpPr>
+        <a:xfrm>
+          <a:off x="0" y="0"/>
+          <a:ext cx="0" cy="0"/>
+          <a:chOff x="0" y="0"/>
+          <a:chExt cx="0" cy="0"/>
+        </a:xfrm>
+      </p:grpSpPr>
+      <p:pic>
+        <p:nvPicPr>
+          <p:cNvPr id="36" name="Graphic 35" descr="Airplane with solid fill">
+            <a:extLst>
+              <a:ext uri="{FF2B5EF4-FFF2-40B4-BE49-F238E27FC236}">
+                <a16:creationId xmlns:a16="http://schemas.microsoft.com/office/drawing/2014/main" id="{2C10E446-CA51-4F93-6E59-8A187B92AB81}"/>
+              </a:ext>
+            </a:extLst>
+          </p:cNvPr>
+          <p:cNvPicPr>
+            <a:picLocks noChangeAspect="1"/>
+          </p:cNvPicPr>
+          <p:nvPr/>
+        </p:nvPicPr>
+        <p:blipFill>
+          <a:blip r:embed="rId3">
+            <a:extLst>
+              <a:ext uri="{96DAC541-7B7A-43D3-8B79-37D633B846F1}">
+                <asvg:svgBlip xmlns:asvg="http://schemas.microsoft.com/office/drawing/2016/SVG/main" r:embed="rId4"/>
+              </a:ext>
+            </a:extLst>
+          </a:blip>
+          <a:stretch>
+            <a:fillRect/>
+          </a:stretch>
+        </p:blipFill>
+        <p:spPr>
+          <a:xfrm rot="5897188">
+            <a:off x="3585507" y="2678781"/>
+            <a:ext cx="496129" cy="496129"/>
+          </a:xfrm>
+          <a:prstGeom prst="rect">
+            <a:avLst/>
+          </a:prstGeom>
+        </p:spPr>
+      </p:pic>
+      <p:pic>
+        <p:nvPicPr>
+          <p:cNvPr id="38" name="Graphic 37" descr="Cell Tower with solid fill">
+            <a:extLst>
+              <a:ext uri="{FF2B5EF4-FFF2-40B4-BE49-F238E27FC236}">
+                <a16:creationId xmlns:a16="http://schemas.microsoft.com/office/drawing/2014/main" id="{30230C98-FAB7-A324-70E4-708717853AAA}"/>
+              </a:ext>
+            </a:extLst>
+          </p:cNvPr>
+          <p:cNvPicPr>
+            <a:picLocks noChangeAspect="1"/>
+          </p:cNvPicPr>
+          <p:nvPr/>
+        </p:nvPicPr>
+        <p:blipFill>
+          <a:blip r:embed="rId5">
+            <a:extLst>
+              <a:ext uri="{96DAC541-7B7A-43D3-8B79-37D633B846F1}">
+                <asvg:svgBlip xmlns:asvg="http://schemas.microsoft.com/office/drawing/2016/SVG/main" r:embed="rId6"/>
+              </a:ext>
+            </a:extLst>
+          </a:blip>
+          <a:stretch>
+            <a:fillRect/>
+          </a:stretch>
+        </p:blipFill>
+        <p:spPr>
+          <a:xfrm>
+            <a:off x="5697111" y="3779528"/>
+            <a:ext cx="797778" cy="797778"/>
+          </a:xfrm>
+          <a:prstGeom prst="rect">
+            <a:avLst/>
+          </a:prstGeom>
+        </p:spPr>
+      </p:pic>
+      <p:sp>
+        <p:nvSpPr>
+          <p:cNvPr id="61" name="Oval 60">
+            <a:extLst>
+              <a:ext uri="{FF2B5EF4-FFF2-40B4-BE49-F238E27FC236}">
+                <a16:creationId xmlns:a16="http://schemas.microsoft.com/office/drawing/2014/main" id="{7A7583E4-2119-D93F-CA78-6E521E7EE528}"/>
+              </a:ext>
+            </a:extLst>
+          </p:cNvPr>
+          <p:cNvSpPr/>
+          <p:nvPr/>
+        </p:nvSpPr>
+        <p:spPr>
+          <a:xfrm>
+            <a:off x="5911849" y="2688840"/>
+            <a:ext cx="63500" cy="63500"/>
+          </a:xfrm>
+          <a:prstGeom prst="ellipse">
+            <a:avLst/>
+          </a:prstGeom>
+          <a:solidFill>
+            <a:srgbClr val="FF0000"/>
+          </a:solidFill>
+          <a:ln>
+            <a:noFill/>
+          </a:ln>
+        </p:spPr>
+        <p:style>
+          <a:lnRef idx="2">
+            <a:schemeClr val="accent1">
+              <a:shade val="15000"/>
+            </a:schemeClr>
+          </a:lnRef>
+          <a:fillRef idx="1">
+            <a:schemeClr val="accent1"/>
+          </a:fillRef>
+          <a:effectRef idx="0">
+            <a:schemeClr val="accent1"/>
+          </a:effectRef>
+          <a:fontRef idx="minor">
+            <a:schemeClr val="lt1"/>
+          </a:fontRef>
+        </p:style>
+        <p:txBody>
+          <a:bodyPr rtlCol="0" anchor="ctr"/>
+          <a:lstStyle/>
+          <a:p>
+            <a:pPr algn="ctr"/>
+            <a:endParaRPr lang="en-US"/>
+          </a:p>
+        </p:txBody>
+      </p:sp>
+      <p:sp>
+        <p:nvSpPr>
+          <p:cNvPr id="1041" name="TextBox 1040">
+            <a:extLst>
+              <a:ext uri="{FF2B5EF4-FFF2-40B4-BE49-F238E27FC236}">
+                <a16:creationId xmlns:a16="http://schemas.microsoft.com/office/drawing/2014/main" id="{02D85BA2-D67E-1B9F-2A7B-738DF1F8A4EB}"/>
+              </a:ext>
+            </a:extLst>
+          </p:cNvPr>
+          <p:cNvSpPr txBox="1"/>
+          <p:nvPr/>
+        </p:nvSpPr>
+        <p:spPr>
+          <a:xfrm>
+            <a:off x="5550706" y="2713171"/>
+            <a:ext cx="926294" cy="307777"/>
+          </a:xfrm>
+          <a:prstGeom prst="rect">
+            <a:avLst/>
+          </a:prstGeom>
+          <a:noFill/>
+        </p:spPr>
+        <p:txBody>
+          <a:bodyPr wrap="square" rtlCol="0">
+            <a:spAutoFit/>
+          </a:bodyPr>
+          <a:lstStyle/>
+          <a:p>
+            <a:r>
+              <a:rPr lang="en-US" sz="1400" dirty="0">
+                <a:latin typeface="Times New Roman" panose="02020603050405020304" pitchFamily="18" charset="0"/>
+                <a:cs typeface="Times New Roman" panose="02020603050405020304" pitchFamily="18" charset="0"/>
+              </a:rPr>
+              <a:t>(</a:t>
+            </a:r>
+            <a:r>
+              <a:rPr lang="en-US" sz="1400" i="1" dirty="0">
+                <a:latin typeface="Times New Roman" panose="02020603050405020304" pitchFamily="18" charset="0"/>
+                <a:cs typeface="Times New Roman" panose="02020603050405020304" pitchFamily="18" charset="0"/>
+              </a:rPr>
+              <a:t>c</a:t>
+            </a:r>
+            <a:r>
+              <a:rPr lang="en-US" sz="1400" baseline="-25000" dirty="0">
+                <a:latin typeface="Times New Roman" panose="02020603050405020304" pitchFamily="18" charset="0"/>
+                <a:cs typeface="Times New Roman" panose="02020603050405020304" pitchFamily="18" charset="0"/>
+              </a:rPr>
+              <a:t>x</a:t>
+            </a:r>
+            <a:r>
+              <a:rPr lang="en-US" sz="1400" dirty="0">
+                <a:latin typeface="Times New Roman" panose="02020603050405020304" pitchFamily="18" charset="0"/>
+                <a:cs typeface="Times New Roman" panose="02020603050405020304" pitchFamily="18" charset="0"/>
+              </a:rPr>
+              <a:t>, </a:t>
+            </a:r>
+            <a:r>
+              <a:rPr lang="en-US" sz="1400" i="1" dirty="0">
+                <a:latin typeface="Times New Roman" panose="02020603050405020304" pitchFamily="18" charset="0"/>
+                <a:cs typeface="Times New Roman" panose="02020603050405020304" pitchFamily="18" charset="0"/>
+              </a:rPr>
+              <a:t>c</a:t>
+            </a:r>
+            <a:r>
+              <a:rPr lang="en-US" sz="1400" baseline="-25000" dirty="0">
+                <a:latin typeface="Times New Roman" panose="02020603050405020304" pitchFamily="18" charset="0"/>
+                <a:cs typeface="Times New Roman" panose="02020603050405020304" pitchFamily="18" charset="0"/>
+              </a:rPr>
+              <a:t>y</a:t>
+            </a:r>
+            <a:r>
+              <a:rPr lang="en-US" sz="1400" dirty="0">
+                <a:latin typeface="Times New Roman" panose="02020603050405020304" pitchFamily="18" charset="0"/>
+                <a:cs typeface="Times New Roman" panose="02020603050405020304" pitchFamily="18" charset="0"/>
+              </a:rPr>
+              <a:t>, </a:t>
+            </a:r>
+            <a:r>
+              <a:rPr lang="en-US" sz="1400" i="1" dirty="0">
+                <a:latin typeface="Times New Roman" panose="02020603050405020304" pitchFamily="18" charset="0"/>
+                <a:cs typeface="Times New Roman" panose="02020603050405020304" pitchFamily="18" charset="0"/>
+              </a:rPr>
+              <a:t>H</a:t>
+            </a:r>
+            <a:r>
+              <a:rPr lang="en-US" sz="1400" dirty="0">
+                <a:latin typeface="Times New Roman" panose="02020603050405020304" pitchFamily="18" charset="0"/>
+                <a:cs typeface="Times New Roman" panose="02020603050405020304" pitchFamily="18" charset="0"/>
+              </a:rPr>
+              <a:t>)</a:t>
+            </a:r>
+          </a:p>
+        </p:txBody>
+      </p:sp>
+      <p:sp>
+        <p:nvSpPr>
+          <p:cNvPr id="1045" name="Left Brace 1044">
+            <a:extLst>
+              <a:ext uri="{FF2B5EF4-FFF2-40B4-BE49-F238E27FC236}">
+                <a16:creationId xmlns:a16="http://schemas.microsoft.com/office/drawing/2014/main" id="{F48BCF26-0B10-A928-0066-23E271C21C66}"/>
+              </a:ext>
+            </a:extLst>
+          </p:cNvPr>
+          <p:cNvSpPr/>
+          <p:nvPr/>
+        </p:nvSpPr>
+        <p:spPr>
+          <a:xfrm rot="5400000" flipH="1">
+            <a:off x="7391400" y="1320800"/>
+            <a:ext cx="63497" cy="2882902"/>
+          </a:xfrm>
+          <a:prstGeom prst="leftBrace">
+            <a:avLst>
+              <a:gd name="adj1" fmla="val 8333"/>
+              <a:gd name="adj2" fmla="val 50000"/>
+            </a:avLst>
+          </a:prstGeom>
+          <a:ln>
+            <a:solidFill>
+              <a:schemeClr val="tx1"/>
+            </a:solidFill>
+          </a:ln>
+        </p:spPr>
+        <p:style>
+          <a:lnRef idx="2">
+            <a:schemeClr val="accent1"/>
+          </a:lnRef>
+          <a:fillRef idx="0">
+            <a:schemeClr val="accent1"/>
+          </a:fillRef>
+          <a:effectRef idx="1">
+            <a:schemeClr val="accent1"/>
+          </a:effectRef>
+          <a:fontRef idx="minor">
+            <a:schemeClr val="tx1"/>
+          </a:fontRef>
+        </p:style>
+        <p:txBody>
+          <a:bodyPr rtlCol="0" anchor="ctr"/>
+          <a:lstStyle/>
+          <a:p>
+            <a:pPr algn="ctr"/>
+            <a:endParaRPr lang="en-US" dirty="0"/>
+          </a:p>
+        </p:txBody>
+      </p:sp>
+      <p:sp>
+        <p:nvSpPr>
+          <p:cNvPr id="1047" name="TextBox 1046">
+            <a:extLst>
+              <a:ext uri="{FF2B5EF4-FFF2-40B4-BE49-F238E27FC236}">
+                <a16:creationId xmlns:a16="http://schemas.microsoft.com/office/drawing/2014/main" id="{7F9735B7-EE86-EA08-DFE2-147610DFF963}"/>
+              </a:ext>
+            </a:extLst>
+          </p:cNvPr>
+          <p:cNvSpPr txBox="1"/>
+          <p:nvPr/>
+        </p:nvSpPr>
+        <p:spPr>
+          <a:xfrm>
+            <a:off x="7298156" y="2714482"/>
+            <a:ext cx="222794" cy="307777"/>
+          </a:xfrm>
+          <a:prstGeom prst="rect">
+            <a:avLst/>
+          </a:prstGeom>
+          <a:noFill/>
+        </p:spPr>
+        <p:txBody>
+          <a:bodyPr wrap="square" rtlCol="0">
+            <a:spAutoFit/>
+          </a:bodyPr>
+          <a:lstStyle/>
+          <a:p>
+            <a:r>
+              <a:rPr lang="en-US" sz="1400" i="1" dirty="0">
+                <a:latin typeface="Times New Roman" panose="02020603050405020304" pitchFamily="18" charset="0"/>
+                <a:cs typeface="Times New Roman" panose="02020603050405020304" pitchFamily="18" charset="0"/>
+              </a:rPr>
+              <a:t>r</a:t>
+            </a:r>
+          </a:p>
+        </p:txBody>
+      </p:sp>
+      <p:sp>
+        <p:nvSpPr>
+          <p:cNvPr id="1048" name="TextBox 1047">
+            <a:extLst>
+              <a:ext uri="{FF2B5EF4-FFF2-40B4-BE49-F238E27FC236}">
+                <a16:creationId xmlns:a16="http://schemas.microsoft.com/office/drawing/2014/main" id="{FCF9EA5B-4211-7E0A-3E6B-DD531C5B21DD}"/>
+              </a:ext>
+            </a:extLst>
+          </p:cNvPr>
+          <p:cNvSpPr txBox="1"/>
+          <p:nvPr/>
+        </p:nvSpPr>
+        <p:spPr>
+          <a:xfrm>
+            <a:off x="5725427" y="4470382"/>
+            <a:ext cx="770103" cy="307777"/>
+          </a:xfrm>
+          <a:prstGeom prst="rect">
+            <a:avLst/>
+          </a:prstGeom>
+          <a:noFill/>
+        </p:spPr>
+        <p:txBody>
+          <a:bodyPr wrap="square" rtlCol="0">
+            <a:spAutoFit/>
+          </a:bodyPr>
+          <a:lstStyle/>
+          <a:p>
+            <a:r>
+              <a:rPr lang="en-US" sz="1400" dirty="0">
+                <a:latin typeface="Times New Roman" panose="02020603050405020304" pitchFamily="18" charset="0"/>
+                <a:cs typeface="Times New Roman" panose="02020603050405020304" pitchFamily="18" charset="0"/>
+              </a:rPr>
+              <a:t>(0, 0, 0)</a:t>
+            </a:r>
+          </a:p>
+        </p:txBody>
+      </p:sp>
+      <p:sp>
+        <p:nvSpPr>
+          <p:cNvPr id="1089" name="TextBox 1088">
+            <a:extLst>
+              <a:ext uri="{FF2B5EF4-FFF2-40B4-BE49-F238E27FC236}">
+                <a16:creationId xmlns:a16="http://schemas.microsoft.com/office/drawing/2014/main" id="{4155D82B-D2F4-D13F-29EC-6E63EF0F7F69}"/>
+              </a:ext>
+            </a:extLst>
+          </p:cNvPr>
+          <p:cNvSpPr txBox="1"/>
+          <p:nvPr/>
+        </p:nvSpPr>
+        <p:spPr>
+          <a:xfrm>
+            <a:off x="4785217" y="3896498"/>
+            <a:ext cx="1124535" cy="307777"/>
+          </a:xfrm>
+          <a:prstGeom prst="rect">
+            <a:avLst/>
+          </a:prstGeom>
+          <a:noFill/>
+        </p:spPr>
+        <p:txBody>
+          <a:bodyPr wrap="square" rtlCol="0">
+            <a:spAutoFit/>
+          </a:bodyPr>
+          <a:lstStyle/>
+          <a:p>
+            <a:r>
+              <a:rPr lang="en-US" sz="1400" dirty="0">
+                <a:solidFill>
+                  <a:srgbClr val="FF0000"/>
+                </a:solidFill>
+                <a:latin typeface="Times New Roman" panose="02020603050405020304" pitchFamily="18" charset="0"/>
+                <a:cs typeface="Times New Roman" panose="02020603050405020304" pitchFamily="18" charset="0"/>
+              </a:rPr>
+              <a:t>Base station</a:t>
+            </a:r>
+          </a:p>
+        </p:txBody>
+      </p:sp>
+      <p:sp>
+        <p:nvSpPr>
+          <p:cNvPr id="1090" name="TextBox 1089">
+            <a:extLst>
+              <a:ext uri="{FF2B5EF4-FFF2-40B4-BE49-F238E27FC236}">
+                <a16:creationId xmlns:a16="http://schemas.microsoft.com/office/drawing/2014/main" id="{19CCD2F3-3C7D-6855-4754-BB54E7B1727B}"/>
+              </a:ext>
+            </a:extLst>
+          </p:cNvPr>
+          <p:cNvSpPr txBox="1"/>
+          <p:nvPr/>
+        </p:nvSpPr>
+        <p:spPr>
+          <a:xfrm>
+            <a:off x="3476953" y="3039813"/>
+            <a:ext cx="562452" cy="307777"/>
+          </a:xfrm>
+          <a:prstGeom prst="rect">
+            <a:avLst/>
+          </a:prstGeom>
+          <a:noFill/>
+        </p:spPr>
+        <p:txBody>
+          <a:bodyPr wrap="square" rtlCol="0">
+            <a:spAutoFit/>
+          </a:bodyPr>
+          <a:lstStyle/>
+          <a:p>
+            <a:r>
+              <a:rPr lang="en-US" sz="1400" dirty="0">
+                <a:solidFill>
+                  <a:srgbClr val="FF0000"/>
+                </a:solidFill>
+                <a:latin typeface="Times New Roman" panose="02020603050405020304" pitchFamily="18" charset="0"/>
+                <a:cs typeface="Times New Roman" panose="02020603050405020304" pitchFamily="18" charset="0"/>
+              </a:rPr>
+              <a:t>UAV</a:t>
+            </a:r>
+          </a:p>
+        </p:txBody>
+      </p:sp>
+      <p:sp>
+        <p:nvSpPr>
+          <p:cNvPr id="2" name="Oval 1">
+            <a:extLst>
+              <a:ext uri="{FF2B5EF4-FFF2-40B4-BE49-F238E27FC236}">
+                <a16:creationId xmlns:a16="http://schemas.microsoft.com/office/drawing/2014/main" id="{82A70633-16F2-1253-3689-FBE17D1F7189}"/>
+              </a:ext>
+            </a:extLst>
+          </p:cNvPr>
+          <p:cNvSpPr/>
+          <p:nvPr/>
+        </p:nvSpPr>
+        <p:spPr>
+          <a:xfrm>
+            <a:off x="4178299" y="4204275"/>
+            <a:ext cx="3898900" cy="573884"/>
+          </a:xfrm>
+          <a:prstGeom prst="ellipse">
+            <a:avLst/>
+          </a:prstGeom>
+          <a:noFill/>
+          <a:ln>
+            <a:solidFill>
+              <a:srgbClr val="FF0000"/>
+            </a:solidFill>
+          </a:ln>
+        </p:spPr>
+        <p:style>
+          <a:lnRef idx="2">
+            <a:schemeClr val="accent1">
+              <a:shade val="15000"/>
+            </a:schemeClr>
+          </a:lnRef>
+          <a:fillRef idx="1">
+            <a:schemeClr val="accent1"/>
+          </a:fillRef>
+          <a:effectRef idx="0">
+            <a:schemeClr val="accent1"/>
+          </a:effectRef>
+          <a:fontRef idx="minor">
+            <a:schemeClr val="lt1"/>
+          </a:fontRef>
+        </p:style>
+        <p:txBody>
+          <a:bodyPr rtlCol="0" anchor="ctr"/>
+          <a:lstStyle/>
+          <a:p>
+            <a:pPr algn="ctr"/>
+            <a:endParaRPr lang="en-US"/>
+          </a:p>
+        </p:txBody>
+      </p:sp>
+      <p:sp>
+        <p:nvSpPr>
+          <p:cNvPr id="3" name="TextBox 2">
+            <a:extLst>
+              <a:ext uri="{FF2B5EF4-FFF2-40B4-BE49-F238E27FC236}">
+                <a16:creationId xmlns:a16="http://schemas.microsoft.com/office/drawing/2014/main" id="{0760D122-FBEB-3CC3-9C32-23D91EA91EA8}"/>
+              </a:ext>
+            </a:extLst>
+          </p:cNvPr>
+          <p:cNvSpPr txBox="1"/>
+          <p:nvPr/>
+        </p:nvSpPr>
+        <p:spPr>
+          <a:xfrm>
+            <a:off x="5418210" y="4890377"/>
+            <a:ext cx="1292077" cy="307777"/>
+          </a:xfrm>
+          <a:prstGeom prst="rect">
+            <a:avLst/>
+          </a:prstGeom>
+          <a:noFill/>
+        </p:spPr>
+        <p:txBody>
+          <a:bodyPr wrap="square" rtlCol="0">
+            <a:spAutoFit/>
+          </a:bodyPr>
+          <a:lstStyle/>
+          <a:p>
+            <a:r>
+              <a:rPr lang="en-US" sz="1400" dirty="0">
+                <a:solidFill>
+                  <a:srgbClr val="FF0000"/>
+                </a:solidFill>
+                <a:latin typeface="Times New Roman" panose="02020603050405020304" pitchFamily="18" charset="0"/>
+                <a:cs typeface="Times New Roman" panose="02020603050405020304" pitchFamily="18" charset="0"/>
+              </a:rPr>
+              <a:t>Coverage Zone</a:t>
+            </a:r>
+          </a:p>
+        </p:txBody>
+      </p:sp>
+      <p:sp>
+        <p:nvSpPr>
+          <p:cNvPr id="4" name="Oval 3">
+            <a:extLst>
+              <a:ext uri="{FF2B5EF4-FFF2-40B4-BE49-F238E27FC236}">
+                <a16:creationId xmlns:a16="http://schemas.microsoft.com/office/drawing/2014/main" id="{3D4E154F-0244-5AED-CF2B-ECE5FC8CB00C}"/>
+              </a:ext>
+            </a:extLst>
+          </p:cNvPr>
+          <p:cNvSpPr/>
+          <p:nvPr/>
+        </p:nvSpPr>
+        <p:spPr>
+          <a:xfrm>
+            <a:off x="1236152" y="3523206"/>
+            <a:ext cx="9728200" cy="2057400"/>
+          </a:xfrm>
+          <a:prstGeom prst="ellipse">
+            <a:avLst/>
+          </a:prstGeom>
+          <a:noFill/>
+        </p:spPr>
+        <p:style>
+          <a:lnRef idx="2">
+            <a:schemeClr val="accent1">
+              <a:shade val="15000"/>
+            </a:schemeClr>
+          </a:lnRef>
+          <a:fillRef idx="1">
+            <a:schemeClr val="accent1"/>
+          </a:fillRef>
+          <a:effectRef idx="0">
+            <a:schemeClr val="accent1"/>
+          </a:effectRef>
+          <a:fontRef idx="minor">
+            <a:schemeClr val="lt1"/>
+          </a:fontRef>
+        </p:style>
+        <p:txBody>
+          <a:bodyPr rtlCol="0" anchor="ctr"/>
+          <a:lstStyle/>
+          <a:p>
+            <a:pPr algn="ctr"/>
+            <a:endParaRPr lang="en-US"/>
+          </a:p>
+        </p:txBody>
+      </p:sp>
+      <p:sp>
+        <p:nvSpPr>
+          <p:cNvPr id="6" name="TextBox 5">
+            <a:extLst>
+              <a:ext uri="{FF2B5EF4-FFF2-40B4-BE49-F238E27FC236}">
+                <a16:creationId xmlns:a16="http://schemas.microsoft.com/office/drawing/2014/main" id="{7E920B76-E667-C4C0-E96A-4517313F2E76}"/>
+              </a:ext>
+            </a:extLst>
+          </p:cNvPr>
+          <p:cNvSpPr txBox="1"/>
+          <p:nvPr/>
+        </p:nvSpPr>
+        <p:spPr>
+          <a:xfrm>
+            <a:off x="5482154" y="5662047"/>
+            <a:ext cx="1164188" cy="369332"/>
+          </a:xfrm>
+          <a:prstGeom prst="rect">
+            <a:avLst/>
+          </a:prstGeom>
+          <a:noFill/>
+        </p:spPr>
+        <p:txBody>
+          <a:bodyPr wrap="square" rtlCol="0">
+            <a:spAutoFit/>
+          </a:bodyPr>
+          <a:lstStyle/>
+          <a:p>
+            <a:r>
+              <a:rPr lang="en-US" dirty="0">
+                <a:latin typeface="Times New Roman" panose="02020603050405020304" pitchFamily="18" charset="0"/>
+                <a:cs typeface="Times New Roman" panose="02020603050405020304" pitchFamily="18" charset="0"/>
+              </a:rPr>
+              <a:t>Dead zone</a:t>
+            </a:r>
+          </a:p>
+        </p:txBody>
+      </p:sp>
+      <p:sp>
+        <p:nvSpPr>
+          <p:cNvPr id="7" name="Oval 6">
+            <a:extLst>
+              <a:ext uri="{FF2B5EF4-FFF2-40B4-BE49-F238E27FC236}">
+                <a16:creationId xmlns:a16="http://schemas.microsoft.com/office/drawing/2014/main" id="{C0D48B8B-E165-BB1F-52B4-56A67BFCE393}"/>
+              </a:ext>
+            </a:extLst>
+          </p:cNvPr>
+          <p:cNvSpPr/>
+          <p:nvPr/>
+        </p:nvSpPr>
+        <p:spPr>
+          <a:xfrm>
+            <a:off x="2946400" y="2425700"/>
+            <a:ext cx="5943600" cy="584200"/>
+          </a:xfrm>
+          <a:prstGeom prst="ellipse">
+            <a:avLst/>
+          </a:prstGeom>
+          <a:noFill/>
+          <a:ln>
+            <a:solidFill>
+              <a:srgbClr val="FF0000"/>
+            </a:solidFill>
+          </a:ln>
+        </p:spPr>
+        <p:style>
+          <a:lnRef idx="2">
+            <a:schemeClr val="accent1">
+              <a:shade val="15000"/>
+            </a:schemeClr>
+          </a:lnRef>
+          <a:fillRef idx="1">
+            <a:schemeClr val="accent1"/>
+          </a:fillRef>
+          <a:effectRef idx="0">
+            <a:schemeClr val="accent1"/>
+          </a:effectRef>
+          <a:fontRef idx="minor">
+            <a:schemeClr val="lt1"/>
+          </a:fontRef>
+        </p:style>
+        <p:txBody>
+          <a:bodyPr rtlCol="0" anchor="ctr"/>
+          <a:lstStyle/>
+          <a:p>
+            <a:pPr algn="ctr"/>
+            <a:endParaRPr lang="en-US"/>
+          </a:p>
+        </p:txBody>
+      </p:sp>
+    </p:spTree>
+    <p:extLst>
+      <p:ext uri="{BB962C8B-B14F-4D97-AF65-F5344CB8AC3E}">
+        <p14:creationId xmlns:p14="http://schemas.microsoft.com/office/powerpoint/2010/main" val="74907807"/>
       </p:ext>
     </p:extLst>
   </p:cSld>

</xml_diff>

<commit_message>
Made system model bigger
</commit_message>
<xml_diff>
--- a/system-model.pptx
+++ b/system-model.pptx
@@ -210,7 +210,7 @@
           <a:p>
             <a:fld id="{F4C6F557-F08E-854B-AE48-783F54BBE294}" type="datetimeFigureOut">
               <a:rPr lang="en-US" smtClean="0"/>
-              <a:t>9/12/25</a:t>
+              <a:t>10/2/25</a:t>
             </a:fld>
             <a:endParaRPr lang="en-US"/>
           </a:p>
@@ -816,7 +816,7 @@
           <a:p>
             <a:fld id="{0F4F3A10-1BBF-094E-8EF1-BA4BA81AAF48}" type="datetimeFigureOut">
               <a:rPr lang="en-US" smtClean="0"/>
-              <a:t>9/12/25</a:t>
+              <a:t>10/2/25</a:t>
             </a:fld>
             <a:endParaRPr lang="en-US"/>
           </a:p>
@@ -1014,7 +1014,7 @@
           <a:p>
             <a:fld id="{0F4F3A10-1BBF-094E-8EF1-BA4BA81AAF48}" type="datetimeFigureOut">
               <a:rPr lang="en-US" smtClean="0"/>
-              <a:t>9/12/25</a:t>
+              <a:t>10/2/25</a:t>
             </a:fld>
             <a:endParaRPr lang="en-US"/>
           </a:p>
@@ -1222,7 +1222,7 @@
           <a:p>
             <a:fld id="{0F4F3A10-1BBF-094E-8EF1-BA4BA81AAF48}" type="datetimeFigureOut">
               <a:rPr lang="en-US" smtClean="0"/>
-              <a:t>9/12/25</a:t>
+              <a:t>10/2/25</a:t>
             </a:fld>
             <a:endParaRPr lang="en-US"/>
           </a:p>
@@ -1420,7 +1420,7 @@
           <a:p>
             <a:fld id="{0F4F3A10-1BBF-094E-8EF1-BA4BA81AAF48}" type="datetimeFigureOut">
               <a:rPr lang="en-US" smtClean="0"/>
-              <a:t>9/12/25</a:t>
+              <a:t>10/2/25</a:t>
             </a:fld>
             <a:endParaRPr lang="en-US"/>
           </a:p>
@@ -1695,7 +1695,7 @@
           <a:p>
             <a:fld id="{0F4F3A10-1BBF-094E-8EF1-BA4BA81AAF48}" type="datetimeFigureOut">
               <a:rPr lang="en-US" smtClean="0"/>
-              <a:t>9/12/25</a:t>
+              <a:t>10/2/25</a:t>
             </a:fld>
             <a:endParaRPr lang="en-US"/>
           </a:p>
@@ -1960,7 +1960,7 @@
           <a:p>
             <a:fld id="{0F4F3A10-1BBF-094E-8EF1-BA4BA81AAF48}" type="datetimeFigureOut">
               <a:rPr lang="en-US" smtClean="0"/>
-              <a:t>9/12/25</a:t>
+              <a:t>10/2/25</a:t>
             </a:fld>
             <a:endParaRPr lang="en-US"/>
           </a:p>
@@ -2372,7 +2372,7 @@
           <a:p>
             <a:fld id="{0F4F3A10-1BBF-094E-8EF1-BA4BA81AAF48}" type="datetimeFigureOut">
               <a:rPr lang="en-US" smtClean="0"/>
-              <a:t>9/12/25</a:t>
+              <a:t>10/2/25</a:t>
             </a:fld>
             <a:endParaRPr lang="en-US"/>
           </a:p>
@@ -2513,7 +2513,7 @@
           <a:p>
             <a:fld id="{0F4F3A10-1BBF-094E-8EF1-BA4BA81AAF48}" type="datetimeFigureOut">
               <a:rPr lang="en-US" smtClean="0"/>
-              <a:t>9/12/25</a:t>
+              <a:t>10/2/25</a:t>
             </a:fld>
             <a:endParaRPr lang="en-US"/>
           </a:p>
@@ -2626,7 +2626,7 @@
           <a:p>
             <a:fld id="{0F4F3A10-1BBF-094E-8EF1-BA4BA81AAF48}" type="datetimeFigureOut">
               <a:rPr lang="en-US" smtClean="0"/>
-              <a:t>9/12/25</a:t>
+              <a:t>10/2/25</a:t>
             </a:fld>
             <a:endParaRPr lang="en-US"/>
           </a:p>
@@ -2937,7 +2937,7 @@
           <a:p>
             <a:fld id="{0F4F3A10-1BBF-094E-8EF1-BA4BA81AAF48}" type="datetimeFigureOut">
               <a:rPr lang="en-US" smtClean="0"/>
-              <a:t>9/12/25</a:t>
+              <a:t>10/2/25</a:t>
             </a:fld>
             <a:endParaRPr lang="en-US"/>
           </a:p>
@@ -3225,7 +3225,7 @@
           <a:p>
             <a:fld id="{0F4F3A10-1BBF-094E-8EF1-BA4BA81AAF48}" type="datetimeFigureOut">
               <a:rPr lang="en-US" smtClean="0"/>
-              <a:t>9/12/25</a:t>
+              <a:t>10/2/25</a:t>
             </a:fld>
             <a:endParaRPr lang="en-US"/>
           </a:p>
@@ -3466,7 +3466,7 @@
           <a:p>
             <a:fld id="{0F4F3A10-1BBF-094E-8EF1-BA4BA81AAF48}" type="datetimeFigureOut">
               <a:rPr lang="en-US" smtClean="0"/>
-              <a:t>9/12/25</a:t>
+              <a:t>10/2/25</a:t>
             </a:fld>
             <a:endParaRPr lang="en-US"/>
           </a:p>
@@ -5249,8 +5249,8 @@
         </p:nvCxnSpPr>
         <p:spPr>
           <a:xfrm>
-            <a:off x="1843548" y="5255489"/>
-            <a:ext cx="9728342" cy="0"/>
+            <a:off x="2188029" y="5255489"/>
+            <a:ext cx="9383861" cy="0"/>
           </a:xfrm>
           <a:prstGeom prst="straightConnector1">
             <a:avLst/>
@@ -5291,7 +5291,7 @@
         <p:spPr>
           <a:xfrm flipV="1">
             <a:off x="1529721" y="690383"/>
-            <a:ext cx="0" cy="3919939"/>
+            <a:ext cx="0" cy="3302493"/>
           </a:xfrm>
           <a:prstGeom prst="straightConnector1">
             <a:avLst/>
@@ -5331,8 +5331,8 @@
         </p:nvCxnSpPr>
         <p:spPr>
           <a:xfrm flipV="1">
-            <a:off x="1767473" y="3759772"/>
-            <a:ext cx="1275741" cy="1235075"/>
+            <a:off x="1957520" y="3759772"/>
+            <a:ext cx="1085694" cy="1051086"/>
           </a:xfrm>
           <a:prstGeom prst="straightConnector1">
             <a:avLst/>
@@ -5370,8 +5370,8 @@
         </p:nvSpPr>
         <p:spPr>
           <a:xfrm>
-            <a:off x="11534209" y="5046026"/>
-            <a:ext cx="329609" cy="369332"/>
+            <a:off x="11571890" y="5010125"/>
+            <a:ext cx="329609" cy="400110"/>
           </a:xfrm>
           <a:prstGeom prst="rect">
             <a:avLst/>
@@ -5385,7 +5385,7 @@
           <a:lstStyle/>
           <a:p>
             <a:r>
-              <a:rPr lang="en-US" i="1" dirty="0">
+              <a:rPr lang="en-US" sz="2000" i="1" dirty="0">
                 <a:latin typeface="Times New Roman" panose="02020603050405020304" pitchFamily="18" charset="0"/>
                 <a:cs typeface="Times New Roman" panose="02020603050405020304" pitchFamily="18" charset="0"/>
               </a:rPr>
@@ -5408,8 +5408,8 @@
         </p:nvSpPr>
         <p:spPr>
           <a:xfrm>
-            <a:off x="2998058" y="3450772"/>
-            <a:ext cx="329609" cy="369332"/>
+            <a:off x="3027940" y="3386385"/>
+            <a:ext cx="329609" cy="400110"/>
           </a:xfrm>
           <a:prstGeom prst="rect">
             <a:avLst/>
@@ -5423,7 +5423,7 @@
           <a:lstStyle/>
           <a:p>
             <a:r>
-              <a:rPr lang="en-US" i="1" dirty="0">
+              <a:rPr lang="en-US" sz="2000" i="1" dirty="0">
                 <a:latin typeface="Times New Roman" panose="02020603050405020304" pitchFamily="18" charset="0"/>
                 <a:cs typeface="Times New Roman" panose="02020603050405020304" pitchFamily="18" charset="0"/>
               </a:rPr>
@@ -5446,8 +5446,8 @@
         </p:nvSpPr>
         <p:spPr>
           <a:xfrm>
-            <a:off x="1382823" y="319071"/>
-            <a:ext cx="329609" cy="369332"/>
+            <a:off x="1389262" y="312632"/>
+            <a:ext cx="329609" cy="400110"/>
           </a:xfrm>
           <a:prstGeom prst="rect">
             <a:avLst/>
@@ -5461,7 +5461,7 @@
           <a:lstStyle/>
           <a:p>
             <a:r>
-              <a:rPr lang="en-US" i="1" dirty="0">
+              <a:rPr lang="en-US" sz="2000" i="1" dirty="0">
                 <a:latin typeface="Times New Roman" panose="02020603050405020304" pitchFamily="18" charset="0"/>
                 <a:cs typeface="Times New Roman" panose="02020603050405020304" pitchFamily="18" charset="0"/>
               </a:rPr>
@@ -5484,8 +5484,8 @@
         </p:nvSpPr>
         <p:spPr>
           <a:xfrm>
-            <a:off x="4868062" y="2249068"/>
-            <a:ext cx="2917422" cy="1055303"/>
+            <a:off x="2705251" y="583932"/>
+            <a:ext cx="7634895" cy="2824222"/>
           </a:xfrm>
           <a:prstGeom prst="ellipse">
             <a:avLst/>
@@ -5551,9 +5551,9 @@
           </a:stretch>
         </p:blipFill>
         <p:spPr>
-          <a:xfrm rot="5897188">
-            <a:off x="5404588" y="2994554"/>
-            <a:ext cx="496129" cy="496129"/>
+          <a:xfrm rot="5905963">
+            <a:off x="4533621" y="2822863"/>
+            <a:ext cx="944607" cy="944607"/>
           </a:xfrm>
           <a:prstGeom prst="rect">
             <a:avLst/>
@@ -5588,8 +5588,8 @@
         </p:blipFill>
         <p:spPr>
           <a:xfrm>
-            <a:off x="1134261" y="4516128"/>
-            <a:ext cx="797778" cy="797778"/>
+            <a:off x="755740" y="3831625"/>
+            <a:ext cx="1592806" cy="1592806"/>
           </a:xfrm>
           <a:prstGeom prst="rect">
             <a:avLst/>
@@ -5612,8 +5612,8 @@
         </p:nvCxnSpPr>
         <p:spPr>
           <a:xfrm>
-            <a:off x="1527338" y="5553366"/>
-            <a:ext cx="0" cy="616231"/>
+            <a:off x="1527338" y="5753888"/>
+            <a:ext cx="0" cy="415709"/>
           </a:xfrm>
           <a:prstGeom prst="line">
             <a:avLst/>
@@ -5655,8 +5655,8 @@
         </p:nvCxnSpPr>
         <p:spPr>
           <a:xfrm flipH="1">
-            <a:off x="875654" y="5514759"/>
-            <a:ext cx="390198" cy="396124"/>
+            <a:off x="875654" y="5699202"/>
+            <a:ext cx="208514" cy="211681"/>
           </a:xfrm>
           <a:prstGeom prst="line">
             <a:avLst/>
@@ -5696,8 +5696,8 @@
         </p:nvSpPr>
         <p:spPr>
           <a:xfrm>
-            <a:off x="6295022" y="2744970"/>
-            <a:ext cx="63500" cy="63500"/>
+            <a:off x="6483510" y="1955969"/>
+            <a:ext cx="78375" cy="80148"/>
           </a:xfrm>
           <a:prstGeom prst="ellipse">
             <a:avLst/>
@@ -5748,8 +5748,8 @@
         </p:nvSpPr>
         <p:spPr>
           <a:xfrm>
-            <a:off x="9718312" y="5223739"/>
-            <a:ext cx="63500" cy="63500"/>
+            <a:off x="9705432" y="5206566"/>
+            <a:ext cx="97457" cy="97457"/>
           </a:xfrm>
           <a:prstGeom prst="ellipse">
             <a:avLst/>
@@ -5788,10 +5788,10 @@
       </p:sp>
       <p:pic>
         <p:nvPicPr>
-          <p:cNvPr id="1030" name="Graphic 1029" descr="Man with solid fill">
-            <a:extLst>
-              <a:ext uri="{FF2B5EF4-FFF2-40B4-BE49-F238E27FC236}">
-                <a16:creationId xmlns:a16="http://schemas.microsoft.com/office/drawing/2014/main" id="{58C1CE4D-1B70-332D-98FE-EA02FBFF3A5E}"/>
+          <p:cNvPr id="1033" name="Graphic 1032" descr="Woman with solid fill">
+            <a:extLst>
+              <a:ext uri="{FF2B5EF4-FFF2-40B4-BE49-F238E27FC236}">
+                <a16:creationId xmlns:a16="http://schemas.microsoft.com/office/drawing/2014/main" id="{193CAE41-DBD1-4182-2CDE-EB5C4EF7D1DC}"/>
               </a:ext>
             </a:extLst>
           </p:cNvPr>
@@ -5813,9 +5813,9 @@
           </a:stretch>
         </p:blipFill>
         <p:spPr>
-          <a:xfrm>
-            <a:off x="10279527" y="5132602"/>
-            <a:ext cx="362607" cy="362607"/>
+          <a:xfrm flipH="1">
+            <a:off x="10042289" y="4151894"/>
+            <a:ext cx="687307" cy="687307"/>
           </a:xfrm>
           <a:prstGeom prst="rect">
             <a:avLst/>
@@ -5824,10 +5824,10 @@
       </p:pic>
       <p:pic>
         <p:nvPicPr>
-          <p:cNvPr id="1032" name="Graphic 1031" descr="Woman with solid fill">
-            <a:extLst>
-              <a:ext uri="{FF2B5EF4-FFF2-40B4-BE49-F238E27FC236}">
-                <a16:creationId xmlns:a16="http://schemas.microsoft.com/office/drawing/2014/main" id="{5E72C7F1-09D7-6C17-B039-02E016F24E4B}"/>
+          <p:cNvPr id="1034" name="Graphic 1033" descr="Man with solid fill">
+            <a:extLst>
+              <a:ext uri="{FF2B5EF4-FFF2-40B4-BE49-F238E27FC236}">
+                <a16:creationId xmlns:a16="http://schemas.microsoft.com/office/drawing/2014/main" id="{21CC9128-9752-57FF-C033-58FB7F0C27AD}"/>
               </a:ext>
             </a:extLst>
           </p:cNvPr>
@@ -5849,81 +5849,9 @@
           </a:stretch>
         </p:blipFill>
         <p:spPr>
-          <a:xfrm flipH="1">
-            <a:off x="9206148" y="5287239"/>
-            <a:ext cx="362607" cy="362607"/>
-          </a:xfrm>
-          <a:prstGeom prst="rect">
-            <a:avLst/>
-          </a:prstGeom>
-        </p:spPr>
-      </p:pic>
-      <p:pic>
-        <p:nvPicPr>
-          <p:cNvPr id="1033" name="Graphic 1032" descr="Woman with solid fill">
-            <a:extLst>
-              <a:ext uri="{FF2B5EF4-FFF2-40B4-BE49-F238E27FC236}">
-                <a16:creationId xmlns:a16="http://schemas.microsoft.com/office/drawing/2014/main" id="{193CAE41-DBD1-4182-2CDE-EB5C4EF7D1DC}"/>
-              </a:ext>
-            </a:extLst>
-          </p:cNvPr>
-          <p:cNvPicPr>
-            <a:picLocks noChangeAspect="1"/>
-          </p:cNvPicPr>
-          <p:nvPr/>
-        </p:nvPicPr>
-        <p:blipFill>
-          <a:blip r:embed="rId9">
-            <a:extLst>
-              <a:ext uri="{96DAC541-7B7A-43D3-8B79-37D633B846F1}">
-                <asvg:svgBlip xmlns:asvg="http://schemas.microsoft.com/office/drawing/2016/SVG/main" r:embed="rId10"/>
-              </a:ext>
-            </a:extLst>
-          </a:blip>
-          <a:stretch>
-            <a:fillRect/>
-          </a:stretch>
-        </p:blipFill>
-        <p:spPr>
-          <a:xfrm flipH="1">
-            <a:off x="9802893" y="4610322"/>
-            <a:ext cx="362607" cy="362607"/>
-          </a:xfrm>
-          <a:prstGeom prst="rect">
-            <a:avLst/>
-          </a:prstGeom>
-        </p:spPr>
-      </p:pic>
-      <p:pic>
-        <p:nvPicPr>
-          <p:cNvPr id="1034" name="Graphic 1033" descr="Man with solid fill">
-            <a:extLst>
-              <a:ext uri="{FF2B5EF4-FFF2-40B4-BE49-F238E27FC236}">
-                <a16:creationId xmlns:a16="http://schemas.microsoft.com/office/drawing/2014/main" id="{21CC9128-9752-57FF-C033-58FB7F0C27AD}"/>
-              </a:ext>
-            </a:extLst>
-          </p:cNvPr>
-          <p:cNvPicPr>
-            <a:picLocks noChangeAspect="1"/>
-          </p:cNvPicPr>
-          <p:nvPr/>
-        </p:nvPicPr>
-        <p:blipFill>
-          <a:blip r:embed="rId7">
-            <a:extLst>
-              <a:ext uri="{96DAC541-7B7A-43D3-8B79-37D633B846F1}">
-                <asvg:svgBlip xmlns:asvg="http://schemas.microsoft.com/office/drawing/2016/SVG/main" r:embed="rId8"/>
-              </a:ext>
-            </a:extLst>
-          </a:blip>
-          <a:stretch>
-            <a:fillRect/>
-          </a:stretch>
-        </p:blipFill>
-        <p:spPr>
-          <a:xfrm>
-            <a:off x="8857990" y="4786986"/>
-            <a:ext cx="362607" cy="362607"/>
+          <a:xfrm>
+            <a:off x="8556988" y="4500039"/>
+            <a:ext cx="698897" cy="698897"/>
           </a:xfrm>
           <a:prstGeom prst="rect">
             <a:avLst/>
@@ -5944,8 +5872,8 @@
         </p:nvSpPr>
         <p:spPr>
           <a:xfrm>
-            <a:off x="5933879" y="2782001"/>
-            <a:ext cx="808566" cy="307777"/>
+            <a:off x="5837810" y="2003737"/>
+            <a:ext cx="1369773" cy="430887"/>
           </a:xfrm>
           <a:prstGeom prst="rect">
             <a:avLst/>
@@ -5959,35 +5887,63 @@
           <a:lstStyle/>
           <a:p>
             <a:r>
-              <a:rPr lang="en-US" sz="1400" dirty="0">
+              <a:rPr lang="en-US" sz="2200" dirty="0">
                 <a:latin typeface="Times New Roman" panose="02020603050405020304" pitchFamily="18" charset="0"/>
                 <a:cs typeface="Times New Roman" panose="02020603050405020304" pitchFamily="18" charset="0"/>
               </a:rPr>
               <a:t>(</a:t>
             </a:r>
             <a:r>
-              <a:rPr lang="en-US" sz="1400" i="1" dirty="0">
+              <a:rPr lang="en-US" sz="2200" i="1" dirty="0">
                 <a:latin typeface="Times New Roman" panose="02020603050405020304" pitchFamily="18" charset="0"/>
                 <a:cs typeface="Times New Roman" panose="02020603050405020304" pitchFamily="18" charset="0"/>
               </a:rPr>
               <a:t>c</a:t>
             </a:r>
             <a:r>
-              <a:rPr lang="en-US" sz="1400" dirty="0">
+              <a:rPr lang="en-US" sz="2200" baseline="-25000" dirty="0">
                 <a:latin typeface="Times New Roman" panose="02020603050405020304" pitchFamily="18" charset="0"/>
                 <a:cs typeface="Times New Roman" panose="02020603050405020304" pitchFamily="18" charset="0"/>
               </a:rPr>
-              <a:t>, 0, </a:t>
-            </a:r>
-            <a:r>
-              <a:rPr lang="en-US" sz="1400" i="1" dirty="0">
+              <a:t>x</a:t>
+            </a:r>
+            <a:r>
+              <a:rPr lang="en-US" sz="2200" dirty="0">
+                <a:latin typeface="Times New Roman" panose="02020603050405020304" pitchFamily="18" charset="0"/>
+                <a:cs typeface="Times New Roman" panose="02020603050405020304" pitchFamily="18" charset="0"/>
+              </a:rPr>
+              <a:t>, </a:t>
+            </a:r>
+            <a:r>
+              <a:rPr lang="en-US" sz="2200" i="1" dirty="0">
+                <a:latin typeface="Times New Roman" panose="02020603050405020304" pitchFamily="18" charset="0"/>
+                <a:cs typeface="Times New Roman" panose="02020603050405020304" pitchFamily="18" charset="0"/>
+              </a:rPr>
+              <a:t>c</a:t>
+            </a:r>
+            <a:r>
+              <a:rPr lang="en-US" sz="2200" baseline="-25000" dirty="0">
+                <a:latin typeface="Times New Roman" panose="02020603050405020304" pitchFamily="18" charset="0"/>
+                <a:cs typeface="Times New Roman" panose="02020603050405020304" pitchFamily="18" charset="0"/>
+              </a:rPr>
+              <a:t>y</a:t>
+            </a:r>
+            <a:r>
+              <a:rPr lang="en-US" sz="2200" dirty="0">
+                <a:latin typeface="Times New Roman" panose="02020603050405020304" pitchFamily="18" charset="0"/>
+                <a:cs typeface="Times New Roman" panose="02020603050405020304" pitchFamily="18" charset="0"/>
+              </a:rPr>
+              <a:t>, </a:t>
+            </a:r>
+            <a:r>
+              <a:rPr lang="en-US" sz="2200" i="1" dirty="0">
                 <a:latin typeface="Times New Roman" panose="02020603050405020304" pitchFamily="18" charset="0"/>
                 <a:cs typeface="Times New Roman" panose="02020603050405020304" pitchFamily="18" charset="0"/>
               </a:rPr>
               <a:t>H</a:t>
             </a:r>
             <a:r>
-              <a:rPr lang="en-US" sz="1400" dirty="0">
+              <a:rPr lang="en-US" sz="2200" dirty="0">
                 <a:latin typeface="Times New Roman" panose="02020603050405020304" pitchFamily="18" charset="0"/>
                 <a:cs typeface="Times New Roman" panose="02020603050405020304" pitchFamily="18" charset="0"/>
               </a:rPr>
@@ -6014,8 +5970,8 @@
         </p:nvCxnSpPr>
         <p:spPr>
           <a:xfrm>
-            <a:off x="6358522" y="2776720"/>
-            <a:ext cx="1426962" cy="0"/>
+            <a:off x="6561885" y="1996043"/>
+            <a:ext cx="3778261" cy="0"/>
           </a:xfrm>
           <a:prstGeom prst="line">
             <a:avLst/>
@@ -6056,12 +6012,12 @@
         </p:nvSpPr>
         <p:spPr>
           <a:xfrm rot="5400000">
-            <a:off x="7013387" y="1941107"/>
-            <a:ext cx="85479" cy="1458712"/>
+            <a:off x="8294918" y="-103119"/>
+            <a:ext cx="299842" cy="3778260"/>
           </a:xfrm>
           <a:prstGeom prst="leftBrace">
             <a:avLst>
-              <a:gd name="adj1" fmla="val 8333"/>
+              <a:gd name="adj1" fmla="val 0"/>
               <a:gd name="adj2" fmla="val 50000"/>
             </a:avLst>
           </a:prstGeom>
@@ -6108,8 +6064,8 @@
         </p:nvSpPr>
         <p:spPr>
           <a:xfrm>
-            <a:off x="6944729" y="2364211"/>
-            <a:ext cx="222794" cy="307777"/>
+            <a:off x="8282004" y="1233381"/>
+            <a:ext cx="274984" cy="430887"/>
           </a:xfrm>
           <a:prstGeom prst="rect">
             <a:avLst/>
@@ -6123,7 +6079,7 @@
           <a:lstStyle/>
           <a:p>
             <a:r>
-              <a:rPr lang="en-US" sz="1400" i="1" dirty="0">
+              <a:rPr lang="en-US" sz="2200" i="1" dirty="0">
                 <a:latin typeface="Times New Roman" panose="02020603050405020304" pitchFamily="18" charset="0"/>
                 <a:cs typeface="Times New Roman" panose="02020603050405020304" pitchFamily="18" charset="0"/>
               </a:rPr>
@@ -6146,8 +6102,8 @@
         </p:nvSpPr>
         <p:spPr>
           <a:xfrm>
-            <a:off x="1162577" y="5206982"/>
-            <a:ext cx="770103" cy="307777"/>
+            <a:off x="922041" y="5235817"/>
+            <a:ext cx="1300233" cy="430887"/>
           </a:xfrm>
           <a:prstGeom prst="rect">
             <a:avLst/>
@@ -6161,11 +6117,11 @@
           <a:lstStyle/>
           <a:p>
             <a:r>
-              <a:rPr lang="en-US" sz="1400" dirty="0">
+              <a:rPr lang="en-US" sz="2200" dirty="0">
                 <a:latin typeface="Times New Roman" panose="02020603050405020304" pitchFamily="18" charset="0"/>
                 <a:cs typeface="Times New Roman" panose="02020603050405020304" pitchFamily="18" charset="0"/>
               </a:rPr>
-              <a:t>(0, 0, 0)</a:t>
+              <a:t>(0, 0, 15)</a:t>
             </a:r>
           </a:p>
         </p:txBody>
@@ -6187,7 +6143,7 @@
         <p:spPr>
           <a:xfrm>
             <a:off x="598608" y="5260164"/>
-            <a:ext cx="599133" cy="0"/>
+            <a:ext cx="361512" cy="0"/>
           </a:xfrm>
           <a:prstGeom prst="line">
             <a:avLst/>
@@ -6227,8 +6183,8 @@
         </p:nvSpPr>
         <p:spPr>
           <a:xfrm>
-            <a:off x="9334624" y="4943933"/>
-            <a:ext cx="830876" cy="307777"/>
+            <a:off x="9125918" y="4761873"/>
+            <a:ext cx="1260024" cy="430887"/>
           </a:xfrm>
           <a:prstGeom prst="rect">
             <a:avLst/>
@@ -6242,25 +6198,53 @@
           <a:lstStyle/>
           <a:p>
             <a:r>
-              <a:rPr lang="en-US" sz="1400" dirty="0">
+              <a:rPr lang="en-US" sz="2200" dirty="0">
                 <a:latin typeface="Times New Roman" panose="02020603050405020304" pitchFamily="18" charset="0"/>
                 <a:cs typeface="Times New Roman" panose="02020603050405020304" pitchFamily="18" charset="0"/>
               </a:rPr>
               <a:t>(</a:t>
             </a:r>
             <a:r>
-              <a:rPr lang="en-US" sz="1400" i="1" dirty="0">
+              <a:rPr lang="el-GR" sz="2200" i="1" dirty="0">
                 <a:latin typeface="Times New Roman" panose="02020603050405020304" pitchFamily="18" charset="0"/>
                 <a:cs typeface="Times New Roman" panose="02020603050405020304" pitchFamily="18" charset="0"/>
               </a:rPr>
-              <a:t>D</a:t>
-            </a:r>
-            <a:r>
-              <a:rPr lang="en-US" sz="1400" dirty="0">
+              <a:t>μ</a:t>
+            </a:r>
+            <a:r>
+              <a:rPr lang="en-US" sz="2200" baseline="-25000" dirty="0">
                 <a:latin typeface="Times New Roman" panose="02020603050405020304" pitchFamily="18" charset="0"/>
                 <a:cs typeface="Times New Roman" panose="02020603050405020304" pitchFamily="18" charset="0"/>
               </a:rPr>
-              <a:t>, 0, 0)</a:t>
+              <a:t>x</a:t>
+            </a:r>
+            <a:r>
+              <a:rPr lang="en-US" sz="2200" dirty="0">
+                <a:latin typeface="Times New Roman" panose="02020603050405020304" pitchFamily="18" charset="0"/>
+                <a:cs typeface="Times New Roman" panose="02020603050405020304" pitchFamily="18" charset="0"/>
+              </a:rPr>
+              <a:t>, </a:t>
+            </a:r>
+            <a:r>
+              <a:rPr lang="el-GR" sz="2200" i="1" dirty="0">
+                <a:latin typeface="Times New Roman" panose="02020603050405020304" pitchFamily="18" charset="0"/>
+                <a:cs typeface="Times New Roman" panose="02020603050405020304" pitchFamily="18" charset="0"/>
+              </a:rPr>
+              <a:t>μ</a:t>
+            </a:r>
+            <a:r>
+              <a:rPr lang="en-US" sz="2200" baseline="-25000" dirty="0">
+                <a:latin typeface="Times New Roman" panose="02020603050405020304" pitchFamily="18" charset="0"/>
+                <a:cs typeface="Times New Roman" panose="02020603050405020304" pitchFamily="18" charset="0"/>
+              </a:rPr>
+              <a:t>y</a:t>
+            </a:r>
+            <a:r>
+              <a:rPr lang="en-US" sz="2200" dirty="0">
+                <a:latin typeface="Times New Roman" panose="02020603050405020304" pitchFamily="18" charset="0"/>
+                <a:cs typeface="Times New Roman" panose="02020603050405020304" pitchFamily="18" charset="0"/>
+              </a:rPr>
+              <a:t>, 0)</a:t>
             </a:r>
           </a:p>
         </p:txBody>
@@ -6281,8 +6265,8 @@
         </p:nvCxnSpPr>
         <p:spPr>
           <a:xfrm flipH="1" flipV="1">
-            <a:off x="5771431" y="3409530"/>
-            <a:ext cx="3267862" cy="1166693"/>
+            <a:off x="5255869" y="3586440"/>
+            <a:ext cx="3218131" cy="1164020"/>
           </a:xfrm>
           <a:prstGeom prst="straightConnector1">
             <a:avLst/>
@@ -6328,8 +6312,8 @@
         </p:nvCxnSpPr>
         <p:spPr>
           <a:xfrm flipH="1">
-            <a:off x="2072273" y="3429000"/>
-            <a:ext cx="3353946" cy="1549972"/>
+            <a:off x="2217273" y="3586440"/>
+            <a:ext cx="2343928" cy="1200546"/>
           </a:xfrm>
           <a:prstGeom prst="straightConnector1">
             <a:avLst/>
@@ -6373,8 +6357,8 @@
         </p:nvSpPr>
         <p:spPr>
           <a:xfrm>
-            <a:off x="222367" y="4633098"/>
-            <a:ext cx="1124535" cy="307777"/>
+            <a:off x="153153" y="4294890"/>
+            <a:ext cx="1300238" cy="769441"/>
           </a:xfrm>
           <a:prstGeom prst="rect">
             <a:avLst/>
@@ -6388,7 +6372,7 @@
           <a:lstStyle/>
           <a:p>
             <a:r>
-              <a:rPr lang="en-US" sz="1400" dirty="0">
+              <a:rPr lang="en-US" sz="2200" dirty="0">
                 <a:solidFill>
                   <a:srgbClr val="FF0000"/>
                 </a:solidFill>
@@ -6414,8 +6398,8 @@
         </p:nvSpPr>
         <p:spPr>
           <a:xfrm>
-            <a:off x="5371426" y="2791143"/>
-            <a:ext cx="562452" cy="307777"/>
+            <a:off x="4579858" y="2481059"/>
+            <a:ext cx="861174" cy="430887"/>
           </a:xfrm>
           <a:prstGeom prst="rect">
             <a:avLst/>
@@ -6429,7 +6413,7 @@
           <a:lstStyle/>
           <a:p>
             <a:r>
-              <a:rPr lang="en-US" sz="1400" dirty="0">
+              <a:rPr lang="en-US" sz="2200" dirty="0">
                 <a:solidFill>
                   <a:srgbClr val="FF0000"/>
                 </a:solidFill>
@@ -6455,8 +6439,8 @@
         </p:nvSpPr>
         <p:spPr>
           <a:xfrm>
-            <a:off x="9077474" y="4216714"/>
-            <a:ext cx="1184279" cy="307777"/>
+            <a:off x="8474000" y="3914779"/>
+            <a:ext cx="1731208" cy="430887"/>
           </a:xfrm>
           <a:prstGeom prst="rect">
             <a:avLst/>
@@ -6470,7 +6454,7 @@
           <a:lstStyle/>
           <a:p>
             <a:r>
-              <a:rPr lang="en-US" sz="1400" dirty="0">
+              <a:rPr lang="en-US" sz="2200" dirty="0">
                 <a:solidFill>
                   <a:srgbClr val="FF0000"/>
                 </a:solidFill>
@@ -6496,8 +6480,8 @@
         </p:nvSpPr>
         <p:spPr>
           <a:xfrm>
-            <a:off x="7202162" y="4167848"/>
-            <a:ext cx="406400" cy="276999"/>
+            <a:off x="7007311" y="3845161"/>
+            <a:ext cx="598573" cy="400110"/>
           </a:xfrm>
           <a:prstGeom prst="rect">
             <a:avLst/>
@@ -6511,14 +6495,14 @@
           <a:lstStyle/>
           <a:p>
             <a:r>
-              <a:rPr lang="en-US" sz="1200" dirty="0">
+              <a:rPr lang="en-US" sz="2000" dirty="0">
                 <a:solidFill>
                   <a:schemeClr val="accent1"/>
                 </a:solidFill>
                 <a:latin typeface="Times New Roman" panose="02020603050405020304" pitchFamily="18" charset="0"/>
                 <a:cs typeface="Times New Roman" panose="02020603050405020304" pitchFamily="18" charset="0"/>
               </a:rPr>
-              <a:t>UA</a:t>
+              <a:t>UV</a:t>
             </a:r>
           </a:p>
         </p:txBody>
@@ -6537,8 +6521,8 @@
         </p:nvSpPr>
         <p:spPr>
           <a:xfrm>
-            <a:off x="3539696" y="4317371"/>
-            <a:ext cx="419100" cy="276999"/>
+            <a:off x="3427795" y="4143448"/>
+            <a:ext cx="605940" cy="400110"/>
           </a:xfrm>
           <a:prstGeom prst="rect">
             <a:avLst/>
@@ -6552,7 +6536,7 @@
           <a:lstStyle/>
           <a:p>
             <a:r>
-              <a:rPr lang="en-US" sz="1200" dirty="0">
+              <a:rPr lang="en-US" sz="2000" dirty="0">
                 <a:solidFill>
                   <a:schemeClr val="accent1"/>
                 </a:solidFill>
@@ -6564,6 +6548,78 @@
           </a:p>
         </p:txBody>
       </p:sp>
+      <p:pic>
+        <p:nvPicPr>
+          <p:cNvPr id="6" name="Graphic 5" descr="Man with solid fill">
+            <a:extLst>
+              <a:ext uri="{FF2B5EF4-FFF2-40B4-BE49-F238E27FC236}">
+                <a16:creationId xmlns:a16="http://schemas.microsoft.com/office/drawing/2014/main" id="{C7448486-5C4F-80FE-9003-58C0CACC113F}"/>
+              </a:ext>
+            </a:extLst>
+          </p:cNvPr>
+          <p:cNvPicPr>
+            <a:picLocks noChangeAspect="1"/>
+          </p:cNvPicPr>
+          <p:nvPr/>
+        </p:nvPicPr>
+        <p:blipFill>
+          <a:blip r:embed="rId9">
+            <a:extLst>
+              <a:ext uri="{96DAC541-7B7A-43D3-8B79-37D633B846F1}">
+                <asvg:svgBlip xmlns:asvg="http://schemas.microsoft.com/office/drawing/2016/SVG/main" r:embed="rId10"/>
+              </a:ext>
+            </a:extLst>
+          </a:blip>
+          <a:stretch>
+            <a:fillRect/>
+          </a:stretch>
+        </p:blipFill>
+        <p:spPr>
+          <a:xfrm>
+            <a:off x="10145378" y="5136437"/>
+            <a:ext cx="698897" cy="698897"/>
+          </a:xfrm>
+          <a:prstGeom prst="rect">
+            <a:avLst/>
+          </a:prstGeom>
+        </p:spPr>
+      </p:pic>
+      <p:pic>
+        <p:nvPicPr>
+          <p:cNvPr id="7" name="Graphic 6" descr="Woman with solid fill">
+            <a:extLst>
+              <a:ext uri="{FF2B5EF4-FFF2-40B4-BE49-F238E27FC236}">
+                <a16:creationId xmlns:a16="http://schemas.microsoft.com/office/drawing/2014/main" id="{E8098398-6639-6090-0601-750FA727B485}"/>
+              </a:ext>
+            </a:extLst>
+          </p:cNvPr>
+          <p:cNvPicPr>
+            <a:picLocks noChangeAspect="1"/>
+          </p:cNvPicPr>
+          <p:nvPr/>
+        </p:nvPicPr>
+        <p:blipFill>
+          <a:blip r:embed="rId7">
+            <a:extLst>
+              <a:ext uri="{96DAC541-7B7A-43D3-8B79-37D633B846F1}">
+                <asvg:svgBlip xmlns:asvg="http://schemas.microsoft.com/office/drawing/2016/SVG/main" r:embed="rId8"/>
+              </a:ext>
+            </a:extLst>
+          </a:blip>
+          <a:stretch>
+            <a:fillRect/>
+          </a:stretch>
+        </p:blipFill>
+        <p:spPr>
+          <a:xfrm flipH="1">
+            <a:off x="8562784" y="5410235"/>
+            <a:ext cx="687307" cy="687307"/>
+          </a:xfrm>
+          <a:prstGeom prst="rect">
+            <a:avLst/>
+          </a:prstGeom>
+        </p:spPr>
+      </p:pic>
     </p:spTree>
     <p:extLst>
       <p:ext uri="{BB962C8B-B14F-4D97-AF65-F5344CB8AC3E}">

</xml_diff>

<commit_message>
Updated AB link to be VB link
</commit_message>
<xml_diff>
--- a/system-model.pptx
+++ b/system-model.pptx
@@ -210,7 +210,7 @@
           <a:p>
             <a:fld id="{F4C6F557-F08E-854B-AE48-783F54BBE294}" type="datetimeFigureOut">
               <a:rPr lang="en-US" smtClean="0"/>
-              <a:t>10/2/25</a:t>
+              <a:t>10/4/25</a:t>
             </a:fld>
             <a:endParaRPr lang="en-US"/>
           </a:p>
@@ -816,7 +816,7 @@
           <a:p>
             <a:fld id="{0F4F3A10-1BBF-094E-8EF1-BA4BA81AAF48}" type="datetimeFigureOut">
               <a:rPr lang="en-US" smtClean="0"/>
-              <a:t>10/2/25</a:t>
+              <a:t>10/4/25</a:t>
             </a:fld>
             <a:endParaRPr lang="en-US"/>
           </a:p>
@@ -1014,7 +1014,7 @@
           <a:p>
             <a:fld id="{0F4F3A10-1BBF-094E-8EF1-BA4BA81AAF48}" type="datetimeFigureOut">
               <a:rPr lang="en-US" smtClean="0"/>
-              <a:t>10/2/25</a:t>
+              <a:t>10/4/25</a:t>
             </a:fld>
             <a:endParaRPr lang="en-US"/>
           </a:p>
@@ -1222,7 +1222,7 @@
           <a:p>
             <a:fld id="{0F4F3A10-1BBF-094E-8EF1-BA4BA81AAF48}" type="datetimeFigureOut">
               <a:rPr lang="en-US" smtClean="0"/>
-              <a:t>10/2/25</a:t>
+              <a:t>10/4/25</a:t>
             </a:fld>
             <a:endParaRPr lang="en-US"/>
           </a:p>
@@ -1420,7 +1420,7 @@
           <a:p>
             <a:fld id="{0F4F3A10-1BBF-094E-8EF1-BA4BA81AAF48}" type="datetimeFigureOut">
               <a:rPr lang="en-US" smtClean="0"/>
-              <a:t>10/2/25</a:t>
+              <a:t>10/4/25</a:t>
             </a:fld>
             <a:endParaRPr lang="en-US"/>
           </a:p>
@@ -1695,7 +1695,7 @@
           <a:p>
             <a:fld id="{0F4F3A10-1BBF-094E-8EF1-BA4BA81AAF48}" type="datetimeFigureOut">
               <a:rPr lang="en-US" smtClean="0"/>
-              <a:t>10/2/25</a:t>
+              <a:t>10/4/25</a:t>
             </a:fld>
             <a:endParaRPr lang="en-US"/>
           </a:p>
@@ -1960,7 +1960,7 @@
           <a:p>
             <a:fld id="{0F4F3A10-1BBF-094E-8EF1-BA4BA81AAF48}" type="datetimeFigureOut">
               <a:rPr lang="en-US" smtClean="0"/>
-              <a:t>10/2/25</a:t>
+              <a:t>10/4/25</a:t>
             </a:fld>
             <a:endParaRPr lang="en-US"/>
           </a:p>
@@ -2372,7 +2372,7 @@
           <a:p>
             <a:fld id="{0F4F3A10-1BBF-094E-8EF1-BA4BA81AAF48}" type="datetimeFigureOut">
               <a:rPr lang="en-US" smtClean="0"/>
-              <a:t>10/2/25</a:t>
+              <a:t>10/4/25</a:t>
             </a:fld>
             <a:endParaRPr lang="en-US"/>
           </a:p>
@@ -2513,7 +2513,7 @@
           <a:p>
             <a:fld id="{0F4F3A10-1BBF-094E-8EF1-BA4BA81AAF48}" type="datetimeFigureOut">
               <a:rPr lang="en-US" smtClean="0"/>
-              <a:t>10/2/25</a:t>
+              <a:t>10/4/25</a:t>
             </a:fld>
             <a:endParaRPr lang="en-US"/>
           </a:p>
@@ -2626,7 +2626,7 @@
           <a:p>
             <a:fld id="{0F4F3A10-1BBF-094E-8EF1-BA4BA81AAF48}" type="datetimeFigureOut">
               <a:rPr lang="en-US" smtClean="0"/>
-              <a:t>10/2/25</a:t>
+              <a:t>10/4/25</a:t>
             </a:fld>
             <a:endParaRPr lang="en-US"/>
           </a:p>
@@ -2937,7 +2937,7 @@
           <a:p>
             <a:fld id="{0F4F3A10-1BBF-094E-8EF1-BA4BA81AAF48}" type="datetimeFigureOut">
               <a:rPr lang="en-US" smtClean="0"/>
-              <a:t>10/2/25</a:t>
+              <a:t>10/4/25</a:t>
             </a:fld>
             <a:endParaRPr lang="en-US"/>
           </a:p>
@@ -3225,7 +3225,7 @@
           <a:p>
             <a:fld id="{0F4F3A10-1BBF-094E-8EF1-BA4BA81AAF48}" type="datetimeFigureOut">
               <a:rPr lang="en-US" smtClean="0"/>
-              <a:t>10/2/25</a:t>
+              <a:t>10/4/25</a:t>
             </a:fld>
             <a:endParaRPr lang="en-US"/>
           </a:p>
@@ -3466,7 +3466,7 @@
           <a:p>
             <a:fld id="{0F4F3A10-1BBF-094E-8EF1-BA4BA81AAF48}" type="datetimeFigureOut">
               <a:rPr lang="en-US" smtClean="0"/>
-              <a:t>10/2/25</a:t>
+              <a:t>10/4/25</a:t>
             </a:fld>
             <a:endParaRPr lang="en-US"/>
           </a:p>
@@ -6543,7 +6543,7 @@
                 <a:latin typeface="Times New Roman" panose="02020603050405020304" pitchFamily="18" charset="0"/>
                 <a:cs typeface="Times New Roman" panose="02020603050405020304" pitchFamily="18" charset="0"/>
               </a:rPr>
-              <a:t>AB</a:t>
+              <a:t>VB</a:t>
             </a:r>
           </a:p>
         </p:txBody>

</xml_diff>